<commit_message>
[Design] Update design document for VaildChecker
</commit_message>
<xml_diff>
--- a/Doc/CRA팀프로젝트_22년_9차_H팀_Hit.pptx
+++ b/Doc/CRA팀프로젝트_22년_9차_H팀_Hit.pptx
@@ -287,38 +287,37 @@
           <a:p>
             <a:pPr lvl="0"/>
             <a:r>
-              <a:rPr lang="ko-KR" altLang="en-US" smtClean="0"/>
+              <a:rPr lang="ko-KR" altLang="en-US"/>
               <a:t>마스터 텍스트 스타일을 편집합니다</a:t>
             </a:r>
           </a:p>
           <a:p>
             <a:pPr lvl="1"/>
             <a:r>
-              <a:rPr lang="ko-KR" altLang="en-US" smtClean="0"/>
+              <a:rPr lang="ko-KR" altLang="en-US"/>
               <a:t>둘째 수준</a:t>
             </a:r>
           </a:p>
           <a:p>
             <a:pPr lvl="2"/>
             <a:r>
-              <a:rPr lang="ko-KR" altLang="en-US" smtClean="0"/>
+              <a:rPr lang="ko-KR" altLang="en-US"/>
               <a:t>셋째 수준</a:t>
             </a:r>
           </a:p>
           <a:p>
             <a:pPr lvl="3"/>
             <a:r>
-              <a:rPr lang="ko-KR" altLang="en-US" smtClean="0"/>
+              <a:rPr lang="ko-KR" altLang="en-US"/>
               <a:t>넷째 수준</a:t>
             </a:r>
           </a:p>
           <a:p>
             <a:pPr lvl="4"/>
             <a:r>
-              <a:rPr lang="ko-KR" altLang="en-US" smtClean="0"/>
+              <a:rPr lang="ko-KR" altLang="en-US"/>
               <a:t>다섯째 수준</a:t>
             </a:r>
-            <a:endParaRPr lang="ko-KR" altLang="en-US"/>
           </a:p>
         </p:txBody>
       </p:sp>
@@ -1117,10 +1116,9 @@
           <a:lstStyle/>
           <a:p>
             <a:r>
-              <a:rPr lang="ko-KR" altLang="en-US" smtClean="0"/>
+              <a:rPr lang="ko-KR" altLang="en-US"/>
               <a:t>마스터 제목 스타일 편집</a:t>
             </a:r>
-            <a:endParaRPr lang="ko-KR" altLang="en-US"/>
           </a:p>
         </p:txBody>
       </p:sp>
@@ -1236,10 +1234,9 @@
           </a:lstStyle>
           <a:p>
             <a:r>
-              <a:rPr lang="ko-KR" altLang="en-US" smtClean="0"/>
+              <a:rPr lang="ko-KR" altLang="en-US"/>
               <a:t>마스터 부제목 스타일 편집</a:t>
             </a:r>
-            <a:endParaRPr lang="ko-KR" altLang="en-US"/>
           </a:p>
         </p:txBody>
       </p:sp>
@@ -1354,10 +1351,9 @@
           <a:lstStyle/>
           <a:p>
             <a:r>
-              <a:rPr lang="ko-KR" altLang="en-US" smtClean="0"/>
+              <a:rPr lang="ko-KR" altLang="en-US"/>
               <a:t>마스터 제목 스타일 편집</a:t>
             </a:r>
-            <a:endParaRPr lang="ko-KR" altLang="en-US"/>
           </a:p>
         </p:txBody>
       </p:sp>
@@ -1378,38 +1374,37 @@
           <a:p>
             <a:pPr lvl="0"/>
             <a:r>
-              <a:rPr lang="ko-KR" altLang="en-US" smtClean="0"/>
+              <a:rPr lang="ko-KR" altLang="en-US"/>
               <a:t>마스터 텍스트 스타일을 편집합니다</a:t>
             </a:r>
           </a:p>
           <a:p>
             <a:pPr lvl="1"/>
             <a:r>
-              <a:rPr lang="ko-KR" altLang="en-US" smtClean="0"/>
+              <a:rPr lang="ko-KR" altLang="en-US"/>
               <a:t>둘째 수준</a:t>
             </a:r>
           </a:p>
           <a:p>
             <a:pPr lvl="2"/>
             <a:r>
-              <a:rPr lang="ko-KR" altLang="en-US" smtClean="0"/>
+              <a:rPr lang="ko-KR" altLang="en-US"/>
               <a:t>셋째 수준</a:t>
             </a:r>
           </a:p>
           <a:p>
             <a:pPr lvl="3"/>
             <a:r>
-              <a:rPr lang="ko-KR" altLang="en-US" smtClean="0"/>
+              <a:rPr lang="ko-KR" altLang="en-US"/>
               <a:t>넷째 수준</a:t>
             </a:r>
           </a:p>
           <a:p>
             <a:pPr lvl="4"/>
             <a:r>
-              <a:rPr lang="ko-KR" altLang="en-US" smtClean="0"/>
+              <a:rPr lang="ko-KR" altLang="en-US"/>
               <a:t>다섯째 수준</a:t>
             </a:r>
-            <a:endParaRPr lang="ko-KR" altLang="en-US"/>
           </a:p>
         </p:txBody>
       </p:sp>
@@ -1529,10 +1524,9 @@
           <a:lstStyle/>
           <a:p>
             <a:r>
-              <a:rPr lang="ko-KR" altLang="en-US" smtClean="0"/>
+              <a:rPr lang="ko-KR" altLang="en-US"/>
               <a:t>마스터 제목 스타일 편집</a:t>
             </a:r>
-            <a:endParaRPr lang="ko-KR" altLang="en-US"/>
           </a:p>
         </p:txBody>
       </p:sp>
@@ -1558,38 +1552,37 @@
           <a:p>
             <a:pPr lvl="0"/>
             <a:r>
-              <a:rPr lang="ko-KR" altLang="en-US" smtClean="0"/>
+              <a:rPr lang="ko-KR" altLang="en-US"/>
               <a:t>마스터 텍스트 스타일을 편집합니다</a:t>
             </a:r>
           </a:p>
           <a:p>
             <a:pPr lvl="1"/>
             <a:r>
-              <a:rPr lang="ko-KR" altLang="en-US" smtClean="0"/>
+              <a:rPr lang="ko-KR" altLang="en-US"/>
               <a:t>둘째 수준</a:t>
             </a:r>
           </a:p>
           <a:p>
             <a:pPr lvl="2"/>
             <a:r>
-              <a:rPr lang="ko-KR" altLang="en-US" smtClean="0"/>
+              <a:rPr lang="ko-KR" altLang="en-US"/>
               <a:t>셋째 수준</a:t>
             </a:r>
           </a:p>
           <a:p>
             <a:pPr lvl="3"/>
             <a:r>
-              <a:rPr lang="ko-KR" altLang="en-US" smtClean="0"/>
+              <a:rPr lang="ko-KR" altLang="en-US"/>
               <a:t>넷째 수준</a:t>
             </a:r>
           </a:p>
           <a:p>
             <a:pPr lvl="4"/>
             <a:r>
-              <a:rPr lang="ko-KR" altLang="en-US" smtClean="0"/>
+              <a:rPr lang="ko-KR" altLang="en-US"/>
               <a:t>다섯째 수준</a:t>
             </a:r>
-            <a:endParaRPr lang="ko-KR" altLang="en-US"/>
           </a:p>
         </p:txBody>
       </p:sp>
@@ -1704,10 +1697,9 @@
           <a:lstStyle/>
           <a:p>
             <a:r>
-              <a:rPr lang="ko-KR" altLang="en-US" smtClean="0"/>
+              <a:rPr lang="ko-KR" altLang="en-US"/>
               <a:t>마스터 제목 스타일 편집</a:t>
             </a:r>
-            <a:endParaRPr lang="ko-KR" altLang="en-US"/>
           </a:p>
         </p:txBody>
       </p:sp>
@@ -1728,38 +1720,37 @@
           <a:p>
             <a:pPr lvl="0"/>
             <a:r>
-              <a:rPr lang="ko-KR" altLang="en-US" smtClean="0"/>
+              <a:rPr lang="ko-KR" altLang="en-US"/>
               <a:t>마스터 텍스트 스타일을 편집합니다</a:t>
             </a:r>
           </a:p>
           <a:p>
             <a:pPr lvl="1"/>
             <a:r>
-              <a:rPr lang="ko-KR" altLang="en-US" smtClean="0"/>
+              <a:rPr lang="ko-KR" altLang="en-US"/>
               <a:t>둘째 수준</a:t>
             </a:r>
           </a:p>
           <a:p>
             <a:pPr lvl="2"/>
             <a:r>
-              <a:rPr lang="ko-KR" altLang="en-US" smtClean="0"/>
+              <a:rPr lang="ko-KR" altLang="en-US"/>
               <a:t>셋째 수준</a:t>
             </a:r>
           </a:p>
           <a:p>
             <a:pPr lvl="3"/>
             <a:r>
-              <a:rPr lang="ko-KR" altLang="en-US" smtClean="0"/>
+              <a:rPr lang="ko-KR" altLang="en-US"/>
               <a:t>넷째 수준</a:t>
             </a:r>
           </a:p>
           <a:p>
             <a:pPr lvl="4"/>
             <a:r>
-              <a:rPr lang="ko-KR" altLang="en-US" smtClean="0"/>
+              <a:rPr lang="ko-KR" altLang="en-US"/>
               <a:t>다섯째 수준</a:t>
             </a:r>
-            <a:endParaRPr lang="ko-KR" altLang="en-US"/>
           </a:p>
         </p:txBody>
       </p:sp>
@@ -1883,10 +1874,9 @@
           </a:lstStyle>
           <a:p>
             <a:r>
-              <a:rPr lang="ko-KR" altLang="en-US" smtClean="0"/>
+              <a:rPr lang="ko-KR" altLang="en-US"/>
               <a:t>마스터 제목 스타일 편집</a:t>
             </a:r>
-            <a:endParaRPr lang="ko-KR" altLang="en-US"/>
           </a:p>
         </p:txBody>
       </p:sp>
@@ -2003,7 +1993,7 @@
           <a:p>
             <a:pPr lvl="0"/>
             <a:r>
-              <a:rPr lang="ko-KR" altLang="en-US" smtClean="0"/>
+              <a:rPr lang="ko-KR" altLang="en-US"/>
               <a:t>마스터 텍스트 스타일을 편집합니다</a:t>
             </a:r>
           </a:p>
@@ -2120,10 +2110,9 @@
           <a:lstStyle/>
           <a:p>
             <a:r>
-              <a:rPr lang="ko-KR" altLang="en-US" smtClean="0"/>
+              <a:rPr lang="ko-KR" altLang="en-US"/>
               <a:t>마스터 제목 스타일 편집</a:t>
             </a:r>
-            <a:endParaRPr lang="ko-KR" altLang="en-US"/>
           </a:p>
         </p:txBody>
       </p:sp>
@@ -2177,38 +2166,37 @@
           <a:p>
             <a:pPr lvl="0"/>
             <a:r>
-              <a:rPr lang="ko-KR" altLang="en-US" smtClean="0"/>
+              <a:rPr lang="ko-KR" altLang="en-US"/>
               <a:t>마스터 텍스트 스타일을 편집합니다</a:t>
             </a:r>
           </a:p>
           <a:p>
             <a:pPr lvl="1"/>
             <a:r>
-              <a:rPr lang="ko-KR" altLang="en-US" smtClean="0"/>
+              <a:rPr lang="ko-KR" altLang="en-US"/>
               <a:t>둘째 수준</a:t>
             </a:r>
           </a:p>
           <a:p>
             <a:pPr lvl="2"/>
             <a:r>
-              <a:rPr lang="ko-KR" altLang="en-US" smtClean="0"/>
+              <a:rPr lang="ko-KR" altLang="en-US"/>
               <a:t>셋째 수준</a:t>
             </a:r>
           </a:p>
           <a:p>
             <a:pPr lvl="3"/>
             <a:r>
-              <a:rPr lang="ko-KR" altLang="en-US" smtClean="0"/>
+              <a:rPr lang="ko-KR" altLang="en-US"/>
               <a:t>넷째 수준</a:t>
             </a:r>
           </a:p>
           <a:p>
             <a:pPr lvl="4"/>
             <a:r>
-              <a:rPr lang="ko-KR" altLang="en-US" smtClean="0"/>
+              <a:rPr lang="ko-KR" altLang="en-US"/>
               <a:t>다섯째 수준</a:t>
             </a:r>
-            <a:endParaRPr lang="ko-KR" altLang="en-US"/>
           </a:p>
         </p:txBody>
       </p:sp>
@@ -2262,38 +2250,37 @@
           <a:p>
             <a:pPr lvl="0"/>
             <a:r>
-              <a:rPr lang="ko-KR" altLang="en-US" smtClean="0"/>
+              <a:rPr lang="ko-KR" altLang="en-US"/>
               <a:t>마스터 텍스트 스타일을 편집합니다</a:t>
             </a:r>
           </a:p>
           <a:p>
             <a:pPr lvl="1"/>
             <a:r>
-              <a:rPr lang="ko-KR" altLang="en-US" smtClean="0"/>
+              <a:rPr lang="ko-KR" altLang="en-US"/>
               <a:t>둘째 수준</a:t>
             </a:r>
           </a:p>
           <a:p>
             <a:pPr lvl="2"/>
             <a:r>
-              <a:rPr lang="ko-KR" altLang="en-US" smtClean="0"/>
+              <a:rPr lang="ko-KR" altLang="en-US"/>
               <a:t>셋째 수준</a:t>
             </a:r>
           </a:p>
           <a:p>
             <a:pPr lvl="3"/>
             <a:r>
-              <a:rPr lang="ko-KR" altLang="en-US" smtClean="0"/>
+              <a:rPr lang="ko-KR" altLang="en-US"/>
               <a:t>넷째 수준</a:t>
             </a:r>
           </a:p>
           <a:p>
             <a:pPr lvl="4"/>
             <a:r>
-              <a:rPr lang="ko-KR" altLang="en-US" smtClean="0"/>
+              <a:rPr lang="ko-KR" altLang="en-US"/>
               <a:t>다섯째 수준</a:t>
             </a:r>
-            <a:endParaRPr lang="ko-KR" altLang="en-US"/>
           </a:p>
         </p:txBody>
       </p:sp>
@@ -2412,10 +2399,9 @@
           </a:lstStyle>
           <a:p>
             <a:r>
-              <a:rPr lang="ko-KR" altLang="en-US" smtClean="0"/>
+              <a:rPr lang="ko-KR" altLang="en-US"/>
               <a:t>마스터 제목 스타일 편집</a:t>
             </a:r>
-            <a:endParaRPr lang="ko-KR" altLang="en-US"/>
           </a:p>
         </p:txBody>
       </p:sp>
@@ -2478,7 +2464,7 @@
           <a:p>
             <a:pPr lvl="0"/>
             <a:r>
-              <a:rPr lang="ko-KR" altLang="en-US" smtClean="0"/>
+              <a:rPr lang="ko-KR" altLang="en-US"/>
               <a:t>마스터 텍스트 스타일을 편집합니다</a:t>
             </a:r>
           </a:p>
@@ -2534,38 +2520,37 @@
           <a:p>
             <a:pPr lvl="0"/>
             <a:r>
-              <a:rPr lang="ko-KR" altLang="en-US" smtClean="0"/>
+              <a:rPr lang="ko-KR" altLang="en-US"/>
               <a:t>마스터 텍스트 스타일을 편집합니다</a:t>
             </a:r>
           </a:p>
           <a:p>
             <a:pPr lvl="1"/>
             <a:r>
-              <a:rPr lang="ko-KR" altLang="en-US" smtClean="0"/>
+              <a:rPr lang="ko-KR" altLang="en-US"/>
               <a:t>둘째 수준</a:t>
             </a:r>
           </a:p>
           <a:p>
             <a:pPr lvl="2"/>
             <a:r>
-              <a:rPr lang="ko-KR" altLang="en-US" smtClean="0"/>
+              <a:rPr lang="ko-KR" altLang="en-US"/>
               <a:t>셋째 수준</a:t>
             </a:r>
           </a:p>
           <a:p>
             <a:pPr lvl="3"/>
             <a:r>
-              <a:rPr lang="ko-KR" altLang="en-US" smtClean="0"/>
+              <a:rPr lang="ko-KR" altLang="en-US"/>
               <a:t>넷째 수준</a:t>
             </a:r>
           </a:p>
           <a:p>
             <a:pPr lvl="4"/>
             <a:r>
-              <a:rPr lang="ko-KR" altLang="en-US" smtClean="0"/>
+              <a:rPr lang="ko-KR" altLang="en-US"/>
               <a:t>다섯째 수준</a:t>
             </a:r>
-            <a:endParaRPr lang="ko-KR" altLang="en-US"/>
           </a:p>
         </p:txBody>
       </p:sp>
@@ -2628,7 +2613,7 @@
           <a:p>
             <a:pPr lvl="0"/>
             <a:r>
-              <a:rPr lang="ko-KR" altLang="en-US" smtClean="0"/>
+              <a:rPr lang="ko-KR" altLang="en-US"/>
               <a:t>마스터 텍스트 스타일을 편집합니다</a:t>
             </a:r>
           </a:p>
@@ -2684,38 +2669,37 @@
           <a:p>
             <a:pPr lvl="0"/>
             <a:r>
-              <a:rPr lang="ko-KR" altLang="en-US" smtClean="0"/>
+              <a:rPr lang="ko-KR" altLang="en-US"/>
               <a:t>마스터 텍스트 스타일을 편집합니다</a:t>
             </a:r>
           </a:p>
           <a:p>
             <a:pPr lvl="1"/>
             <a:r>
-              <a:rPr lang="ko-KR" altLang="en-US" smtClean="0"/>
+              <a:rPr lang="ko-KR" altLang="en-US"/>
               <a:t>둘째 수준</a:t>
             </a:r>
           </a:p>
           <a:p>
             <a:pPr lvl="2"/>
             <a:r>
-              <a:rPr lang="ko-KR" altLang="en-US" smtClean="0"/>
+              <a:rPr lang="ko-KR" altLang="en-US"/>
               <a:t>셋째 수준</a:t>
             </a:r>
           </a:p>
           <a:p>
             <a:pPr lvl="3"/>
             <a:r>
-              <a:rPr lang="ko-KR" altLang="en-US" smtClean="0"/>
+              <a:rPr lang="ko-KR" altLang="en-US"/>
               <a:t>넷째 수준</a:t>
             </a:r>
           </a:p>
           <a:p>
             <a:pPr lvl="4"/>
             <a:r>
-              <a:rPr lang="ko-KR" altLang="en-US" smtClean="0"/>
+              <a:rPr lang="ko-KR" altLang="en-US"/>
               <a:t>다섯째 수준</a:t>
             </a:r>
-            <a:endParaRPr lang="ko-KR" altLang="en-US"/>
           </a:p>
         </p:txBody>
       </p:sp>
@@ -2830,10 +2814,9 @@
           <a:lstStyle/>
           <a:p>
             <a:r>
-              <a:rPr lang="ko-KR" altLang="en-US" smtClean="0"/>
+              <a:rPr lang="ko-KR" altLang="en-US"/>
               <a:t>마스터 제목 스타일 편집</a:t>
             </a:r>
-            <a:endParaRPr lang="ko-KR" altLang="en-US"/>
           </a:p>
         </p:txBody>
       </p:sp>
@@ -3052,10 +3035,9 @@
           </a:lstStyle>
           <a:p>
             <a:r>
-              <a:rPr lang="ko-KR" altLang="en-US" smtClean="0"/>
+              <a:rPr lang="ko-KR" altLang="en-US"/>
               <a:t>마스터 제목 스타일 편집</a:t>
             </a:r>
-            <a:endParaRPr lang="ko-KR" altLang="en-US"/>
           </a:p>
         </p:txBody>
       </p:sp>
@@ -3109,38 +3091,37 @@
           <a:p>
             <a:pPr lvl="0"/>
             <a:r>
-              <a:rPr lang="ko-KR" altLang="en-US" smtClean="0"/>
+              <a:rPr lang="ko-KR" altLang="en-US"/>
               <a:t>마스터 텍스트 스타일을 편집합니다</a:t>
             </a:r>
           </a:p>
           <a:p>
             <a:pPr lvl="1"/>
             <a:r>
-              <a:rPr lang="ko-KR" altLang="en-US" smtClean="0"/>
+              <a:rPr lang="ko-KR" altLang="en-US"/>
               <a:t>둘째 수준</a:t>
             </a:r>
           </a:p>
           <a:p>
             <a:pPr lvl="2"/>
             <a:r>
-              <a:rPr lang="ko-KR" altLang="en-US" smtClean="0"/>
+              <a:rPr lang="ko-KR" altLang="en-US"/>
               <a:t>셋째 수준</a:t>
             </a:r>
           </a:p>
           <a:p>
             <a:pPr lvl="3"/>
             <a:r>
-              <a:rPr lang="ko-KR" altLang="en-US" smtClean="0"/>
+              <a:rPr lang="ko-KR" altLang="en-US"/>
               <a:t>넷째 수준</a:t>
             </a:r>
           </a:p>
           <a:p>
             <a:pPr lvl="4"/>
             <a:r>
-              <a:rPr lang="ko-KR" altLang="en-US" smtClean="0"/>
+              <a:rPr lang="ko-KR" altLang="en-US"/>
               <a:t>다섯째 수준</a:t>
             </a:r>
-            <a:endParaRPr lang="ko-KR" altLang="en-US"/>
           </a:p>
         </p:txBody>
       </p:sp>
@@ -3203,7 +3184,7 @@
           <a:p>
             <a:pPr lvl="0"/>
             <a:r>
-              <a:rPr lang="ko-KR" altLang="en-US" smtClean="0"/>
+              <a:rPr lang="ko-KR" altLang="en-US"/>
               <a:t>마스터 텍스트 스타일을 편집합니다</a:t>
             </a:r>
           </a:p>
@@ -3329,10 +3310,9 @@
           </a:lstStyle>
           <a:p>
             <a:r>
-              <a:rPr lang="ko-KR" altLang="en-US" smtClean="0"/>
+              <a:rPr lang="ko-KR" altLang="en-US"/>
               <a:t>마스터 제목 스타일 편집</a:t>
             </a:r>
-            <a:endParaRPr lang="ko-KR" altLang="en-US"/>
           </a:p>
         </p:txBody>
       </p:sp>
@@ -3456,7 +3436,7 @@
           <a:p>
             <a:pPr lvl="0"/>
             <a:r>
-              <a:rPr lang="ko-KR" altLang="en-US" smtClean="0"/>
+              <a:rPr lang="ko-KR" altLang="en-US"/>
               <a:t>마스터 텍스트 스타일을 편집합니다</a:t>
             </a:r>
           </a:p>
@@ -3588,10 +3568,9 @@
           <a:lstStyle/>
           <a:p>
             <a:r>
-              <a:rPr lang="ko-KR" altLang="en-US" smtClean="0"/>
+              <a:rPr lang="ko-KR" altLang="en-US"/>
               <a:t>마스터 제목 스타일 편집</a:t>
             </a:r>
-            <a:endParaRPr lang="ko-KR" altLang="en-US"/>
           </a:p>
         </p:txBody>
       </p:sp>
@@ -3622,38 +3601,37 @@
           <a:p>
             <a:pPr lvl="0"/>
             <a:r>
-              <a:rPr lang="ko-KR" altLang="en-US" smtClean="0"/>
+              <a:rPr lang="ko-KR" altLang="en-US"/>
               <a:t>마스터 텍스트 스타일을 편집합니다</a:t>
             </a:r>
           </a:p>
           <a:p>
             <a:pPr lvl="1"/>
             <a:r>
-              <a:rPr lang="ko-KR" altLang="en-US" smtClean="0"/>
+              <a:rPr lang="ko-KR" altLang="en-US"/>
               <a:t>둘째 수준</a:t>
             </a:r>
           </a:p>
           <a:p>
             <a:pPr lvl="2"/>
             <a:r>
-              <a:rPr lang="ko-KR" altLang="en-US" smtClean="0"/>
+              <a:rPr lang="ko-KR" altLang="en-US"/>
               <a:t>셋째 수준</a:t>
             </a:r>
           </a:p>
           <a:p>
             <a:pPr lvl="3"/>
             <a:r>
-              <a:rPr lang="ko-KR" altLang="en-US" smtClean="0"/>
+              <a:rPr lang="ko-KR" altLang="en-US"/>
               <a:t>넷째 수준</a:t>
             </a:r>
           </a:p>
           <a:p>
             <a:pPr lvl="4"/>
             <a:r>
-              <a:rPr lang="ko-KR" altLang="en-US" smtClean="0"/>
+              <a:rPr lang="ko-KR" altLang="en-US"/>
               <a:t>다섯째 수준</a:t>
             </a:r>
-            <a:endParaRPr lang="ko-KR" altLang="en-US"/>
           </a:p>
         </p:txBody>
       </p:sp>
@@ -4145,34 +4123,34 @@
               </a:lnSpc>
             </a:pPr>
             <a:r>
-              <a:rPr lang="en-US" altLang="ko-KR" sz="3200" b="1" dirty="0" smtClean="0">
+              <a:rPr lang="en-US" altLang="ko-KR" sz="3200" b="1" dirty="0">
                 <a:latin typeface="HY견고딕" panose="02030600000101010101" pitchFamily="18" charset="-127"/>
                 <a:ea typeface="HY견고딕" panose="02030600000101010101" pitchFamily="18" charset="-127"/>
               </a:rPr>
               <a:t>Team Project</a:t>
             </a:r>
             <a:br>
-              <a:rPr lang="en-US" altLang="ko-KR" sz="3200" b="1" dirty="0" smtClean="0">
+              <a:rPr lang="en-US" altLang="ko-KR" sz="3200" b="1" dirty="0">
                 <a:latin typeface="HY견고딕" panose="02030600000101010101" pitchFamily="18" charset="-127"/>
                 <a:ea typeface="HY견고딕" panose="02030600000101010101" pitchFamily="18" charset="-127"/>
               </a:rPr>
             </a:br>
             <a:r>
-              <a:rPr lang="en-US" altLang="ko-KR" sz="3200" b="1" dirty="0" smtClean="0">
+              <a:rPr lang="en-US" altLang="ko-KR" sz="3200" b="1" dirty="0">
                 <a:latin typeface="HY견고딕" panose="02030600000101010101" pitchFamily="18" charset="-127"/>
                 <a:ea typeface="HY견고딕" panose="02030600000101010101" pitchFamily="18" charset="-127"/>
               </a:rPr>
               <a:t>H</a:t>
             </a:r>
             <a:r>
-              <a:rPr lang="ko-KR" altLang="en-US" sz="3200" b="1" dirty="0" smtClean="0">
+              <a:rPr lang="ko-KR" altLang="en-US" sz="3200" b="1" dirty="0">
                 <a:latin typeface="HY견고딕" panose="02030600000101010101" pitchFamily="18" charset="-127"/>
                 <a:ea typeface="HY견고딕" panose="02030600000101010101" pitchFamily="18" charset="-127"/>
               </a:rPr>
               <a:t>조 </a:t>
             </a:r>
             <a:r>
-              <a:rPr lang="en-US" altLang="ko-KR" sz="3200" b="1" dirty="0" smtClean="0">
+              <a:rPr lang="en-US" altLang="ko-KR" sz="3200" b="1" dirty="0">
                 <a:latin typeface="HY견고딕" panose="02030600000101010101" pitchFamily="18" charset="-127"/>
                 <a:ea typeface="HY견고딕" panose="02030600000101010101" pitchFamily="18" charset="-127"/>
               </a:rPr>
@@ -4263,23 +4241,19 @@
               </a:lnSpc>
             </a:pPr>
             <a:r>
-              <a:rPr lang="en-US" altLang="ko-KR" sz="1800" dirty="0" smtClean="0">
+              <a:rPr lang="en-US" altLang="ko-KR" sz="1800" dirty="0">
                 <a:latin typeface="HY견고딕" panose="02030600000101010101" pitchFamily="18" charset="-127"/>
                 <a:ea typeface="HY견고딕" panose="02030600000101010101" pitchFamily="18" charset="-127"/>
               </a:rPr>
               <a:t>Code Review Agent </a:t>
             </a:r>
             <a:r>
-              <a:rPr lang="ko-KR" altLang="en-US" sz="1800" dirty="0" smtClean="0">
+              <a:rPr lang="ko-KR" altLang="en-US" sz="1800" dirty="0">
                 <a:latin typeface="HY견고딕" panose="02030600000101010101" pitchFamily="18" charset="-127"/>
                 <a:ea typeface="HY견고딕" panose="02030600000101010101" pitchFamily="18" charset="-127"/>
               </a:rPr>
               <a:t>양성 과정</a:t>
             </a:r>
-            <a:endParaRPr lang="ko-KR" altLang="en-US" sz="1800" dirty="0">
-              <a:latin typeface="HY견고딕" panose="02030600000101010101" pitchFamily="18" charset="-127"/>
-              <a:ea typeface="HY견고딕" panose="02030600000101010101" pitchFamily="18" charset="-127"/>
-            </a:endParaRPr>
           </a:p>
         </p:txBody>
       </p:sp>
@@ -4293,13 +4267,6 @@
   <p:clrMapOvr>
     <a:masterClrMapping/>
   </p:clrMapOvr>
-  <p:timing>
-    <p:tnLst>
-      <p:par>
-        <p:cTn id="1" dur="indefinite" restart="never" nodeType="tmRoot"/>
-      </p:par>
-    </p:tnLst>
-  </p:timing>
 </p:sld>
 </file>
 
@@ -4378,14 +4345,14 @@
           <a:lstStyle/>
           <a:p>
             <a:r>
-              <a:rPr lang="ko-KR" altLang="en-US" sz="2400" dirty="0" smtClean="0">
+              <a:rPr lang="ko-KR" altLang="en-US" sz="2400" dirty="0">
                 <a:latin typeface="HY견고딕" panose="02030600000101010101" pitchFamily="18" charset="-127"/>
                 <a:ea typeface="HY견고딕" panose="02030600000101010101" pitchFamily="18" charset="-127"/>
               </a:rPr>
               <a:t>세부 구현 </a:t>
             </a:r>
             <a:r>
-              <a:rPr lang="en-US" altLang="ko-KR" sz="2400" dirty="0" smtClean="0">
+              <a:rPr lang="en-US" altLang="ko-KR" sz="2400" dirty="0">
                 <a:latin typeface="HY견고딕" panose="02030600000101010101" pitchFamily="18" charset="-127"/>
                 <a:ea typeface="HY견고딕" panose="02030600000101010101" pitchFamily="18" charset="-127"/>
               </a:rPr>
@@ -4464,7 +4431,7 @@
               </a:lnSpc>
             </a:pPr>
             <a:r>
-              <a:rPr lang="ko-KR" altLang="en-US" sz="1600" b="1" dirty="0" smtClean="0">
+              <a:rPr lang="ko-KR" altLang="en-US" sz="1600" b="1" dirty="0">
                 <a:solidFill>
                   <a:prstClr val="black"/>
                 </a:solidFill>
@@ -4473,7 +4440,7 @@
               </a:rPr>
               <a:t>■ 예외 처리</a:t>
             </a:r>
-            <a:endParaRPr lang="en-US" altLang="ko-KR" sz="1600" b="1" dirty="0" smtClean="0">
+            <a:endParaRPr lang="en-US" altLang="ko-KR" sz="1600" b="1" dirty="0">
               <a:solidFill>
                 <a:prstClr val="black"/>
               </a:solidFill>
@@ -4509,19 +4476,9 @@
                 <a:latin typeface="HY견고딕" panose="02030600000101010101" pitchFamily="18" charset="-127"/>
                 <a:ea typeface="HY견고딕" panose="02030600000101010101" pitchFamily="18" charset="-127"/>
               </a:rPr>
-              <a:t>■ </a:t>
-            </a:r>
-            <a:r>
-              <a:rPr lang="ko-KR" altLang="en-US" sz="1600" b="1" dirty="0" smtClean="0">
-                <a:solidFill>
-                  <a:prstClr val="black"/>
-                </a:solidFill>
-                <a:latin typeface="HY견고딕" panose="02030600000101010101" pitchFamily="18" charset="-127"/>
-                <a:ea typeface="HY견고딕" panose="02030600000101010101" pitchFamily="18" charset="-127"/>
-              </a:rPr>
-              <a:t>추상화 </a:t>
-            </a:r>
-            <a:endParaRPr lang="en-US" altLang="ko-KR" sz="1600" b="1" dirty="0" smtClean="0">
+              <a:t>■ 추상화 </a:t>
+            </a:r>
+            <a:endParaRPr lang="en-US" altLang="ko-KR" sz="1600" b="1" dirty="0">
               <a:solidFill>
                 <a:prstClr val="black"/>
               </a:solidFill>
@@ -4557,19 +4514,9 @@
                 <a:latin typeface="HY견고딕" panose="02030600000101010101" pitchFamily="18" charset="-127"/>
                 <a:ea typeface="HY견고딕" panose="02030600000101010101" pitchFamily="18" charset="-127"/>
               </a:rPr>
-              <a:t>■ 유효성 </a:t>
-            </a:r>
-            <a:r>
-              <a:rPr lang="ko-KR" altLang="en-US" sz="1600" b="1" dirty="0" smtClean="0">
-                <a:solidFill>
-                  <a:prstClr val="black"/>
-                </a:solidFill>
-                <a:latin typeface="HY견고딕" panose="02030600000101010101" pitchFamily="18" charset="-127"/>
-                <a:ea typeface="HY견고딕" panose="02030600000101010101" pitchFamily="18" charset="-127"/>
-              </a:rPr>
-              <a:t>검사 </a:t>
-            </a:r>
-            <a:endParaRPr lang="en-US" altLang="ko-KR" sz="1600" b="1" dirty="0" smtClean="0">
+              <a:t>■ 유효성 검사 </a:t>
+            </a:r>
+            <a:endParaRPr lang="en-US" altLang="ko-KR" sz="1600" b="1" dirty="0">
               <a:solidFill>
                 <a:prstClr val="black"/>
               </a:solidFill>
@@ -4584,7 +4531,7 @@
               </a:lnSpc>
             </a:pPr>
             <a:r>
-              <a:rPr lang="en-US" altLang="ko-KR" sz="1600" dirty="0" smtClean="0">
+              <a:rPr lang="en-US" altLang="ko-KR" sz="1600" dirty="0">
                 <a:solidFill>
                   <a:prstClr val="black"/>
                 </a:solidFill>
@@ -4592,12 +4539,6 @@
               </a:rPr>
               <a:t>  -</a:t>
             </a:r>
-            <a:endParaRPr lang="en-US" altLang="ko-KR" sz="1600" dirty="0" smtClean="0">
-              <a:solidFill>
-                <a:prstClr val="black"/>
-              </a:solidFill>
-              <a:latin typeface="맑은 고딕" panose="020B0503020000020004" pitchFamily="50" charset="-127"/>
-            </a:endParaRPr>
           </a:p>
           <a:p>
             <a:pPr defTabSz="779233">
@@ -4606,7 +4547,7 @@
               </a:lnSpc>
             </a:pPr>
             <a:r>
-              <a:rPr lang="ko-KR" altLang="en-US" sz="1600" dirty="0" smtClean="0">
+              <a:rPr lang="ko-KR" altLang="en-US" sz="1600" dirty="0">
                 <a:solidFill>
                   <a:prstClr val="black"/>
                 </a:solidFill>
@@ -4615,7 +4556,7 @@
               <a:t>  </a:t>
             </a:r>
             <a:r>
-              <a:rPr lang="en-US" altLang="ko-KR" sz="1600" dirty="0" smtClean="0">
+              <a:rPr lang="en-US" altLang="ko-KR" sz="1600" dirty="0">
                 <a:solidFill>
                   <a:prstClr val="black"/>
                 </a:solidFill>
@@ -4623,12 +4564,6 @@
               </a:rPr>
               <a:t>-</a:t>
             </a:r>
-            <a:endParaRPr lang="en-US" altLang="ko-KR" sz="1600" dirty="0">
-              <a:solidFill>
-                <a:prstClr val="black"/>
-              </a:solidFill>
-              <a:latin typeface="맑은 고딕" panose="020B0503020000020004" pitchFamily="50" charset="-127"/>
-            </a:endParaRPr>
           </a:p>
         </p:txBody>
       </p:sp>
@@ -4642,13 +4577,6 @@
   <p:clrMapOvr>
     <a:masterClrMapping/>
   </p:clrMapOvr>
-  <p:timing>
-    <p:tnLst>
-      <p:par>
-        <p:cTn id="1" dur="indefinite" restart="never" nodeType="tmRoot"/>
-      </p:par>
-    </p:tnLst>
-  </p:timing>
 </p:sld>
 </file>
 
@@ -4727,14 +4655,14 @@
           <a:lstStyle/>
           <a:p>
             <a:r>
-              <a:rPr lang="ko-KR" altLang="en-US" sz="2400" dirty="0" smtClean="0">
+              <a:rPr lang="ko-KR" altLang="en-US" sz="2400" dirty="0">
                 <a:latin typeface="HY견고딕" panose="02030600000101010101" pitchFamily="18" charset="-127"/>
                 <a:ea typeface="HY견고딕" panose="02030600000101010101" pitchFamily="18" charset="-127"/>
               </a:rPr>
               <a:t>세부 구현 </a:t>
             </a:r>
             <a:r>
-              <a:rPr lang="en-US" altLang="ko-KR" sz="2400" dirty="0" smtClean="0">
+              <a:rPr lang="en-US" altLang="ko-KR" sz="2400" dirty="0">
                 <a:latin typeface="HY견고딕" panose="02030600000101010101" pitchFamily="18" charset="-127"/>
                 <a:ea typeface="HY견고딕" panose="02030600000101010101" pitchFamily="18" charset="-127"/>
               </a:rPr>
@@ -4809,7 +4737,7 @@
           <a:p>
             <a:pPr defTabSz="779233"/>
             <a:r>
-              <a:rPr lang="ko-KR" altLang="en-US" sz="1600" b="1" dirty="0" smtClean="0">
+              <a:rPr lang="ko-KR" altLang="en-US" sz="1600" b="1" dirty="0">
                 <a:solidFill>
                   <a:prstClr val="black"/>
                 </a:solidFill>
@@ -4934,7 +4862,7 @@
               </a:lnSpc>
             </a:pPr>
             <a:r>
-              <a:rPr lang="en-US" altLang="ko-KR" sz="1600" dirty="0" smtClean="0">
+              <a:rPr lang="en-US" altLang="ko-KR" sz="1600" dirty="0">
                 <a:solidFill>
                   <a:prstClr val="black"/>
                 </a:solidFill>
@@ -5024,13 +4952,6 @@
   <p:clrMapOvr>
     <a:masterClrMapping/>
   </p:clrMapOvr>
-  <p:timing>
-    <p:tnLst>
-      <p:par>
-        <p:cTn id="1" dur="indefinite" restart="never" nodeType="tmRoot"/>
-      </p:par>
-    </p:tnLst>
-  </p:timing>
 </p:sld>
 </file>
 
@@ -5109,21 +5030,21 @@
           <a:lstStyle/>
           <a:p>
             <a:r>
-              <a:rPr lang="ko-KR" altLang="en-US" sz="2400" dirty="0" smtClean="0">
+              <a:rPr lang="ko-KR" altLang="en-US" sz="2400" dirty="0">
                 <a:latin typeface="HY견고딕" panose="02030600000101010101" pitchFamily="18" charset="-127"/>
                 <a:ea typeface="HY견고딕" panose="02030600000101010101" pitchFamily="18" charset="-127"/>
               </a:rPr>
               <a:t>세부 구현 </a:t>
             </a:r>
             <a:r>
-              <a:rPr lang="en-US" altLang="ko-KR" sz="2400" dirty="0" smtClean="0">
+              <a:rPr lang="en-US" altLang="ko-KR" sz="2400" dirty="0">
                 <a:latin typeface="HY견고딕" panose="02030600000101010101" pitchFamily="18" charset="-127"/>
                 <a:ea typeface="HY견고딕" panose="02030600000101010101" pitchFamily="18" charset="-127"/>
               </a:rPr>
               <a:t>| </a:t>
             </a:r>
             <a:r>
-              <a:rPr lang="ko-KR" altLang="en-US" sz="2400" dirty="0" smtClean="0">
+              <a:rPr lang="ko-KR" altLang="en-US" sz="2400" dirty="0">
                 <a:latin typeface="HY견고딕" panose="02030600000101010101" pitchFamily="18" charset="-127"/>
                 <a:ea typeface="HY견고딕" panose="02030600000101010101" pitchFamily="18" charset="-127"/>
               </a:rPr>
@@ -5202,7 +5123,7 @@
               </a:lnSpc>
             </a:pPr>
             <a:r>
-              <a:rPr lang="ko-KR" altLang="en-US" sz="1600" b="1" dirty="0" smtClean="0">
+              <a:rPr lang="ko-KR" altLang="en-US" sz="1600" b="1" dirty="0">
                 <a:solidFill>
                   <a:prstClr val="black"/>
                 </a:solidFill>
@@ -5212,7 +5133,7 @@
               <a:t>■ </a:t>
             </a:r>
             <a:r>
-              <a:rPr lang="en-US" altLang="ko-KR" sz="1600" b="1" dirty="0" smtClean="0">
+              <a:rPr lang="en-US" altLang="ko-KR" sz="1600" b="1" dirty="0">
                 <a:solidFill>
                   <a:prstClr val="black"/>
                 </a:solidFill>
@@ -5222,26 +5143,16 @@
               <a:t>PR </a:t>
             </a:r>
             <a:r>
-              <a:rPr lang="ko-KR" altLang="en-US" sz="1600" b="1" dirty="0" smtClean="0">
+              <a:rPr lang="ko-KR" altLang="en-US" sz="1600" b="1" dirty="0">
                 <a:solidFill>
                   <a:prstClr val="black"/>
                 </a:solidFill>
                 <a:latin typeface="HY견고딕" panose="02030600000101010101" pitchFamily="18" charset="-127"/>
                 <a:ea typeface="HY견고딕" panose="02030600000101010101" pitchFamily="18" charset="-127"/>
               </a:rPr>
-              <a:t>진행 현황</a:t>
-            </a:r>
-            <a:r>
-              <a:rPr lang="ko-KR" altLang="en-US" sz="1600" b="1" dirty="0" smtClean="0">
-                <a:solidFill>
-                  <a:prstClr val="black"/>
-                </a:solidFill>
-                <a:latin typeface="HY견고딕" panose="02030600000101010101" pitchFamily="18" charset="-127"/>
-                <a:ea typeface="HY견고딕" panose="02030600000101010101" pitchFamily="18" charset="-127"/>
-              </a:rPr>
-              <a:t> </a:t>
-            </a:r>
-            <a:endParaRPr lang="en-US" altLang="ko-KR" sz="1600" b="1" dirty="0" smtClean="0">
+              <a:t>진행 현황 </a:t>
+            </a:r>
+            <a:endParaRPr lang="en-US" altLang="ko-KR" sz="1600" b="1" dirty="0">
               <a:solidFill>
                 <a:prstClr val="black"/>
               </a:solidFill>
@@ -5330,12 +5241,6 @@
               </a:rPr>
               <a:t>] </a:t>
             </a:r>
-            <a:endParaRPr lang="en-US" altLang="ko-KR" sz="1600" dirty="0" smtClean="0">
-              <a:solidFill>
-                <a:prstClr val="black"/>
-              </a:solidFill>
-              <a:latin typeface="맑은 고딕" panose="020B0503020000020004" pitchFamily="50" charset="-127"/>
-            </a:endParaRPr>
           </a:p>
           <a:p>
             <a:pPr defTabSz="779233">
@@ -5358,7 +5263,7 @@
               </a:lnSpc>
             </a:pPr>
             <a:r>
-              <a:rPr lang="ko-KR" altLang="en-US" sz="1600" b="1" dirty="0" smtClean="0">
+              <a:rPr lang="ko-KR" altLang="en-US" sz="1600" b="1" dirty="0">
                 <a:solidFill>
                   <a:prstClr val="black"/>
                 </a:solidFill>
@@ -5368,7 +5273,7 @@
               <a:t>■ </a:t>
             </a:r>
             <a:r>
-              <a:rPr lang="en-US" altLang="ko-KR" sz="1600" b="1" dirty="0" err="1" smtClean="0">
+              <a:rPr lang="en-US" altLang="ko-KR" sz="1600" b="1" dirty="0" err="1">
                 <a:solidFill>
                   <a:prstClr val="black"/>
                 </a:solidFill>
@@ -5397,13 +5302,6 @@
   <p:clrMapOvr>
     <a:masterClrMapping/>
   </p:clrMapOvr>
-  <p:timing>
-    <p:tnLst>
-      <p:par>
-        <p:cTn id="1" dur="indefinite" restart="never" nodeType="tmRoot"/>
-      </p:par>
-    </p:tnLst>
-  </p:timing>
 </p:sld>
 </file>
 
@@ -5482,21 +5380,21 @@
           <a:lstStyle/>
           <a:p>
             <a:r>
-              <a:rPr lang="ko-KR" altLang="en-US" sz="2400" dirty="0" smtClean="0">
+              <a:rPr lang="ko-KR" altLang="en-US" sz="2400" dirty="0">
                 <a:latin typeface="HY견고딕" panose="02030600000101010101" pitchFamily="18" charset="-127"/>
                 <a:ea typeface="HY견고딕" panose="02030600000101010101" pitchFamily="18" charset="-127"/>
               </a:rPr>
               <a:t>가가</a:t>
             </a:r>
             <a:r>
-              <a:rPr lang="en-US" altLang="ko-KR" sz="2400" dirty="0" err="1" smtClean="0">
+              <a:rPr lang="en-US" altLang="ko-KR" sz="2400" dirty="0" err="1">
                 <a:latin typeface="HY견고딕" panose="02030600000101010101" pitchFamily="18" charset="-127"/>
                 <a:ea typeface="HY견고딕" panose="02030600000101010101" pitchFamily="18" charset="-127"/>
               </a:rPr>
               <a:t>dwded</a:t>
             </a:r>
             <a:r>
-              <a:rPr lang="ko-KR" altLang="en-US" sz="2400" dirty="0" smtClean="0">
+              <a:rPr lang="ko-KR" altLang="en-US" sz="2400" dirty="0">
                 <a:latin typeface="HY견고딕" panose="02030600000101010101" pitchFamily="18" charset="-127"/>
                 <a:ea typeface="HY견고딕" panose="02030600000101010101" pitchFamily="18" charset="-127"/>
               </a:rPr>
@@ -5510,7 +5408,7 @@
               <a:t>| </a:t>
             </a:r>
             <a:r>
-              <a:rPr lang="ko-KR" altLang="en-US" sz="1800" dirty="0" err="1" smtClean="0">
+              <a:rPr lang="ko-KR" altLang="en-US" sz="1800" dirty="0" err="1">
                 <a:latin typeface="HY견고딕" panose="02030600000101010101" pitchFamily="18" charset="-127"/>
                 <a:ea typeface="HY견고딕" panose="02030600000101010101" pitchFamily="18" charset="-127"/>
               </a:rPr>
@@ -5573,14 +5471,14 @@
               <a:t>■ </a:t>
             </a:r>
             <a:r>
-              <a:rPr lang="ko-KR" altLang="en-US" sz="1200" dirty="0" smtClean="0">
+              <a:rPr lang="ko-KR" altLang="en-US" sz="1200" dirty="0">
                 <a:solidFill>
                   <a:schemeClr val="dk1"/>
                 </a:solidFill>
               </a:rPr>
               <a:t>유의사항</a:t>
             </a:r>
-            <a:endParaRPr lang="en-US" altLang="ko-KR" sz="1200" dirty="0" smtClean="0">
+            <a:endParaRPr lang="en-US" altLang="ko-KR" sz="1200" dirty="0">
               <a:solidFill>
                 <a:schemeClr val="dk1"/>
               </a:solidFill>
@@ -5604,38 +5502,22 @@
               <a:buNone/>
             </a:pPr>
             <a:r>
-              <a:rPr lang="en-US" altLang="ko-KR" sz="1200" dirty="0" smtClean="0">
+              <a:rPr lang="en-US" altLang="ko-KR" sz="1200" dirty="0">
                 <a:solidFill>
                   <a:schemeClr val="dk1"/>
                 </a:solidFill>
               </a:rPr>
-              <a:t>- TDD </a:t>
-            </a:r>
-            <a:r>
-              <a:rPr lang="en-US" altLang="ko-KR" sz="1200" dirty="0">
+              <a:t>- TDD practice </a:t>
+            </a:r>
+            <a:r>
+              <a:rPr lang="ko-KR" altLang="en-US" sz="1200" dirty="0">
                 <a:solidFill>
                   <a:schemeClr val="dk1"/>
                 </a:solidFill>
               </a:rPr>
-              <a:t>practice </a:t>
-            </a:r>
-            <a:r>
-              <a:rPr lang="ko-KR" altLang="en-US" sz="1200" dirty="0">
-                <a:solidFill>
-                  <a:schemeClr val="dk1"/>
-                </a:solidFill>
-              </a:rPr>
-              <a:t>적용 </a:t>
-            </a:r>
-            <a:r>
-              <a:rPr lang="ko-KR" altLang="en-US" sz="1200" dirty="0" smtClean="0">
-                <a:solidFill>
-                  <a:schemeClr val="dk1"/>
-                </a:solidFill>
-              </a:rPr>
-              <a:t>필수</a:t>
-            </a:r>
-            <a:endParaRPr lang="en-US" altLang="ko-KR" sz="1200" dirty="0" smtClean="0">
+              <a:t>적용 필수</a:t>
+            </a:r>
+            <a:endParaRPr lang="en-US" altLang="ko-KR" sz="1200" dirty="0">
               <a:solidFill>
                 <a:schemeClr val="dk1"/>
               </a:solidFill>
@@ -5648,22 +5530,13 @@
               </a:lnSpc>
             </a:pPr>
             <a:r>
-              <a:rPr lang="en-US" altLang="ko-KR" sz="1200" dirty="0" smtClean="0">
+              <a:rPr lang="en-US" altLang="ko-KR" sz="1200" dirty="0">
                 <a:solidFill>
                   <a:prstClr val="black"/>
                 </a:solidFill>
                 <a:latin typeface="맑은 고딕" panose="020B0503020000020004" pitchFamily="50" charset="-127"/>
               </a:rPr>
-              <a:t>- </a:t>
-            </a:r>
-            <a:r>
-              <a:rPr lang="en-US" altLang="ko-KR" sz="1200" dirty="0">
-                <a:solidFill>
-                  <a:prstClr val="black"/>
-                </a:solidFill>
-                <a:latin typeface="맑은 고딕" panose="020B0503020000020004" pitchFamily="50" charset="-127"/>
-              </a:rPr>
-              <a:t>Test code</a:t>
+              <a:t>- Test code</a:t>
             </a:r>
             <a:r>
               <a:rPr lang="ko-KR" altLang="en-US" sz="1200" dirty="0">
@@ -6176,16 +6049,7 @@
                 </a:solidFill>
                 <a:latin typeface="맑은 고딕" panose="020B0503020000020004" pitchFamily="50" charset="-127"/>
               </a:rPr>
-              <a:t>리뷰 봇을 적용한 </a:t>
-            </a:r>
-            <a:r>
-              <a:rPr lang="ko-KR" altLang="en-US" sz="1100" dirty="0" smtClean="0">
-                <a:solidFill>
-                  <a:prstClr val="black"/>
-                </a:solidFill>
-                <a:latin typeface="맑은 고딕" panose="020B0503020000020004" pitchFamily="50" charset="-127"/>
-              </a:rPr>
-              <a:t>경우</a:t>
+              <a:t>리뷰 봇을 적용한 경우</a:t>
             </a:r>
             <a:endParaRPr kumimoji="0" lang="en-US" altLang="ko-KR" sz="1100" b="0" i="0" u="none" strike="noStrike" kern="1200" cap="none" spc="0" normalizeH="0" baseline="0" noProof="0" dirty="0">
               <a:ln>
@@ -6674,13 +6538,6 @@
   <p:clrMapOvr>
     <a:masterClrMapping/>
   </p:clrMapOvr>
-  <p:timing>
-    <p:tnLst>
-      <p:par>
-        <p:cTn id="1" dur="indefinite" restart="never" nodeType="tmRoot"/>
-      </p:par>
-    </p:tnLst>
-  </p:timing>
 </p:sld>
 </file>
 
@@ -6724,30 +6581,26 @@
           <a:lstStyle/>
           <a:p>
             <a:r>
-              <a:rPr lang="ko-KR" altLang="en-US" sz="2400" dirty="0" smtClean="0">
+              <a:rPr lang="ko-KR" altLang="en-US" sz="2400" dirty="0">
                 <a:latin typeface="HY견고딕" panose="02030600000101010101" pitchFamily="18" charset="-127"/>
                 <a:ea typeface="HY견고딕" panose="02030600000101010101" pitchFamily="18" charset="-127"/>
               </a:rPr>
               <a:t>진행 방법 </a:t>
             </a:r>
             <a:r>
-              <a:rPr lang="en-US" altLang="ko-KR" sz="2400" dirty="0" smtClean="0">
+              <a:rPr lang="en-US" altLang="ko-KR" sz="2400" dirty="0">
                 <a:latin typeface="HY견고딕" panose="02030600000101010101" pitchFamily="18" charset="-127"/>
                 <a:ea typeface="HY견고딕" panose="02030600000101010101" pitchFamily="18" charset="-127"/>
               </a:rPr>
               <a:t>| </a:t>
             </a:r>
             <a:r>
-              <a:rPr lang="ko-KR" altLang="en-US" sz="1800" dirty="0" smtClean="0">
+              <a:rPr lang="ko-KR" altLang="en-US" sz="1800" dirty="0">
                 <a:latin typeface="HY견고딕" panose="02030600000101010101" pitchFamily="18" charset="-127"/>
                 <a:ea typeface="HY견고딕" panose="02030600000101010101" pitchFamily="18" charset="-127"/>
               </a:rPr>
               <a:t>요구사항 분석 </a:t>
             </a:r>
-            <a:endParaRPr lang="ko-KR" altLang="en-US" sz="1800" dirty="0">
-              <a:latin typeface="HY견고딕" panose="02030600000101010101" pitchFamily="18" charset="-127"/>
-              <a:ea typeface="HY견고딕" panose="02030600000101010101" pitchFamily="18" charset="-127"/>
-            </a:endParaRPr>
           </a:p>
         </p:txBody>
       </p:sp>
@@ -8417,9 +8270,7 @@
           <p:cNvGraphicFramePr>
             <a:graphicFrameLocks noGrp="1"/>
           </p:cNvGraphicFramePr>
-          <p:nvPr>
-            <p:extLst/>
-          </p:nvPr>
+          <p:nvPr/>
         </p:nvGraphicFramePr>
         <p:xfrm>
           <a:off x="224875" y="1456002"/>
@@ -8870,13 +8721,6 @@
   <p:clrMapOvr>
     <a:masterClrMapping/>
   </p:clrMapOvr>
-  <p:timing>
-    <p:tnLst>
-      <p:par>
-        <p:cTn id="1" dur="indefinite" restart="never" nodeType="tmRoot"/>
-      </p:par>
-    </p:tnLst>
-  </p:timing>
 </p:sld>
 </file>
 
@@ -8920,14 +8764,14 @@
           <a:lstStyle/>
           <a:p>
             <a:r>
-              <a:rPr lang="ko-KR" altLang="en-US" sz="2400" dirty="0" smtClean="0">
+              <a:rPr lang="ko-KR" altLang="en-US" sz="2400" dirty="0">
                 <a:latin typeface="HY견고딕" panose="02030600000101010101" pitchFamily="18" charset="-127"/>
                 <a:ea typeface="HY견고딕" panose="02030600000101010101" pitchFamily="18" charset="-127"/>
               </a:rPr>
               <a:t>진행 방법 </a:t>
             </a:r>
             <a:r>
-              <a:rPr lang="en-US" altLang="ko-KR" sz="2400" dirty="0" smtClean="0">
+              <a:rPr lang="en-US" altLang="ko-KR" sz="2400" dirty="0">
                 <a:latin typeface="HY견고딕" panose="02030600000101010101" pitchFamily="18" charset="-127"/>
                 <a:ea typeface="HY견고딕" panose="02030600000101010101" pitchFamily="18" charset="-127"/>
               </a:rPr>
@@ -12618,13 +12462,6 @@
   <p:clrMapOvr>
     <a:masterClrMapping/>
   </p:clrMapOvr>
-  <p:timing>
-    <p:tnLst>
-      <p:par>
-        <p:cTn id="1" dur="indefinite" restart="never" nodeType="tmRoot"/>
-      </p:par>
-    </p:tnLst>
-  </p:timing>
 </p:sld>
 </file>
 
@@ -12668,14 +12505,14 @@
           <a:lstStyle/>
           <a:p>
             <a:r>
-              <a:rPr lang="ko-KR" altLang="en-US" sz="2400" dirty="0" smtClean="0">
+              <a:rPr lang="ko-KR" altLang="en-US" sz="2400" dirty="0">
                 <a:latin typeface="HY견고딕" panose="02030600000101010101" pitchFamily="18" charset="-127"/>
                 <a:ea typeface="HY견고딕" panose="02030600000101010101" pitchFamily="18" charset="-127"/>
               </a:rPr>
               <a:t>진행 방법 </a:t>
             </a:r>
             <a:r>
-              <a:rPr lang="en-US" altLang="ko-KR" sz="2400" dirty="0" smtClean="0">
+              <a:rPr lang="en-US" altLang="ko-KR" sz="2400" dirty="0">
                 <a:latin typeface="HY견고딕" panose="02030600000101010101" pitchFamily="18" charset="-127"/>
                 <a:ea typeface="HY견고딕" panose="02030600000101010101" pitchFamily="18" charset="-127"/>
               </a:rPr>
@@ -14509,13 +14346,6 @@
   <p:clrMapOvr>
     <a:masterClrMapping/>
   </p:clrMapOvr>
-  <p:timing>
-    <p:tnLst>
-      <p:par>
-        <p:cTn id="1" dur="indefinite" restart="never" nodeType="tmRoot"/>
-      </p:par>
-    </p:tnLst>
-  </p:timing>
 </p:sld>
 </file>
 
@@ -14622,7 +14452,7 @@
               <a:buAutoNum type="arabicPeriod"/>
             </a:pPr>
             <a:r>
-              <a:rPr lang="ko-KR" altLang="en-US" sz="1400" dirty="0" smtClean="0">
+              <a:rPr lang="ko-KR" altLang="en-US" sz="1400" dirty="0">
                 <a:solidFill>
                   <a:prstClr val="black"/>
                 </a:solidFill>
@@ -14630,7 +14460,7 @@
               </a:rPr>
               <a:t>리뷰 시 서로 기분 상하지 않게 리뷰하기</a:t>
             </a:r>
-            <a:endParaRPr lang="en-US" altLang="ko-KR" sz="1400" dirty="0" smtClean="0">
+            <a:endParaRPr lang="en-US" altLang="ko-KR" sz="1400" dirty="0">
               <a:solidFill>
                 <a:prstClr val="black"/>
               </a:solidFill>
@@ -14646,7 +14476,7 @@
               <a:buAutoNum type="arabicPeriod"/>
             </a:pPr>
             <a:r>
-              <a:rPr lang="ko-KR" altLang="en-US" sz="1400" dirty="0" smtClean="0">
+              <a:rPr lang="ko-KR" altLang="en-US" sz="1400" dirty="0">
                 <a:solidFill>
                   <a:prstClr val="black"/>
                 </a:solidFill>
@@ -14655,7 +14485,7 @@
               <a:t>리뷰는 최대한 빨리 대응하기 </a:t>
             </a:r>
             <a:r>
-              <a:rPr lang="en-US" altLang="ko-KR" sz="1400" dirty="0" smtClean="0">
+              <a:rPr lang="en-US" altLang="ko-KR" sz="1400" dirty="0">
                 <a:solidFill>
                   <a:prstClr val="black"/>
                 </a:solidFill>
@@ -14664,7 +14494,7 @@
               <a:t>(</a:t>
             </a:r>
             <a:r>
-              <a:rPr lang="ko-KR" altLang="en-US" sz="1400" dirty="0" smtClean="0">
+              <a:rPr lang="ko-KR" altLang="en-US" sz="1400" dirty="0">
                 <a:solidFill>
                   <a:prstClr val="black"/>
                 </a:solidFill>
@@ -14673,7 +14503,7 @@
               <a:t>하루를 넘기지 않게 한다</a:t>
             </a:r>
             <a:r>
-              <a:rPr lang="en-US" altLang="ko-KR" sz="1400" dirty="0" smtClean="0">
+              <a:rPr lang="en-US" altLang="ko-KR" sz="1400" dirty="0">
                 <a:solidFill>
                   <a:prstClr val="black"/>
                 </a:solidFill>
@@ -14691,7 +14521,7 @@
               <a:buAutoNum type="arabicPeriod"/>
             </a:pPr>
             <a:r>
-              <a:rPr lang="ko-KR" altLang="en-US" sz="1400" dirty="0" smtClean="0">
+              <a:rPr lang="ko-KR" altLang="en-US" sz="1400" dirty="0">
                 <a:solidFill>
                   <a:prstClr val="black"/>
                 </a:solidFill>
@@ -14699,7 +14529,7 @@
               </a:rPr>
               <a:t>코딩 스타일 존중하기</a:t>
             </a:r>
-            <a:endParaRPr lang="en-US" altLang="ko-KR" sz="1400" dirty="0" smtClean="0">
+            <a:endParaRPr lang="en-US" altLang="ko-KR" sz="1400" dirty="0">
               <a:solidFill>
                 <a:prstClr val="black"/>
               </a:solidFill>
@@ -14715,7 +14545,7 @@
               <a:buAutoNum type="arabicPeriod"/>
             </a:pPr>
             <a:r>
-              <a:rPr lang="ko-KR" altLang="en-US" sz="1400" dirty="0" smtClean="0">
+              <a:rPr lang="ko-KR" altLang="en-US" sz="1400" dirty="0">
                 <a:solidFill>
                   <a:prstClr val="black"/>
                 </a:solidFill>
@@ -14723,7 +14553,7 @@
               </a:rPr>
               <a:t>의견 충돌 시 팀장이 결정하기</a:t>
             </a:r>
-            <a:endParaRPr lang="en-US" altLang="ko-KR" sz="1400" dirty="0" smtClean="0">
+            <a:endParaRPr lang="en-US" altLang="ko-KR" sz="1400" dirty="0">
               <a:solidFill>
                 <a:prstClr val="black"/>
               </a:solidFill>
@@ -14739,7 +14569,7 @@
               <a:buAutoNum type="arabicPeriod"/>
             </a:pPr>
             <a:r>
-              <a:rPr lang="ko-KR" altLang="en-US" sz="1400" dirty="0" smtClean="0">
+              <a:rPr lang="ko-KR" altLang="en-US" sz="1400" dirty="0">
                 <a:solidFill>
                   <a:prstClr val="black"/>
                 </a:solidFill>
@@ -14747,7 +14577,7 @@
               </a:rPr>
               <a:t>매일 아침에 메신저로 서로 인사하기</a:t>
             </a:r>
-            <a:endParaRPr lang="en-US" altLang="ko-KR" sz="1400" dirty="0" smtClean="0">
+            <a:endParaRPr lang="en-US" altLang="ko-KR" sz="1400" dirty="0">
               <a:solidFill>
                 <a:prstClr val="black"/>
               </a:solidFill>
@@ -14763,7 +14593,7 @@
               <a:buAutoNum type="arabicPeriod"/>
             </a:pPr>
             <a:r>
-              <a:rPr lang="ko-KR" altLang="en-US" sz="1400" dirty="0" smtClean="0">
+              <a:rPr lang="ko-KR" altLang="en-US" sz="1400" dirty="0">
                 <a:solidFill>
                   <a:prstClr val="black"/>
                 </a:solidFill>
@@ -14771,7 +14601,7 @@
               </a:rPr>
               <a:t>퇴근시간 지키기</a:t>
             </a:r>
-            <a:endParaRPr lang="en-US" altLang="ko-KR" sz="1400" dirty="0" smtClean="0">
+            <a:endParaRPr lang="en-US" altLang="ko-KR" sz="1400" dirty="0">
               <a:solidFill>
                 <a:prstClr val="black"/>
               </a:solidFill>
@@ -14787,7 +14617,7 @@
               <a:buAutoNum type="arabicPeriod"/>
             </a:pPr>
             <a:r>
-              <a:rPr lang="ko-KR" altLang="en-US" sz="1400" dirty="0" smtClean="0">
+              <a:rPr lang="ko-KR" altLang="en-US" sz="1400" dirty="0">
                 <a:solidFill>
                   <a:prstClr val="black"/>
                 </a:solidFill>
@@ -14796,7 +14626,7 @@
               <a:t>안되는 건 </a:t>
             </a:r>
             <a:r>
-              <a:rPr lang="en-US" altLang="ko-KR" sz="1400" dirty="0" smtClean="0">
+              <a:rPr lang="en-US" altLang="ko-KR" sz="1400" dirty="0">
                 <a:solidFill>
                   <a:prstClr val="black"/>
                 </a:solidFill>
@@ -14805,7 +14635,7 @@
               <a:t>Refresh</a:t>
             </a:r>
             <a:r>
-              <a:rPr lang="ko-KR" altLang="en-US" sz="1400" dirty="0" smtClean="0">
+              <a:rPr lang="ko-KR" altLang="en-US" sz="1400" dirty="0">
                 <a:solidFill>
                   <a:prstClr val="black"/>
                 </a:solidFill>
@@ -14845,30 +14675,26 @@
           <a:lstStyle/>
           <a:p>
             <a:r>
-              <a:rPr lang="ko-KR" altLang="en-US" sz="2400" dirty="0" smtClean="0">
+              <a:rPr lang="ko-KR" altLang="en-US" sz="2400" dirty="0">
                 <a:latin typeface="HY견고딕" panose="02030600000101010101" pitchFamily="18" charset="-127"/>
                 <a:ea typeface="HY견고딕" panose="02030600000101010101" pitchFamily="18" charset="-127"/>
               </a:rPr>
               <a:t>진행 방법 </a:t>
             </a:r>
             <a:r>
-              <a:rPr lang="en-US" altLang="ko-KR" sz="2400" dirty="0" smtClean="0">
+              <a:rPr lang="en-US" altLang="ko-KR" sz="2400" dirty="0">
                 <a:latin typeface="HY견고딕" panose="02030600000101010101" pitchFamily="18" charset="-127"/>
                 <a:ea typeface="HY견고딕" panose="02030600000101010101" pitchFamily="18" charset="-127"/>
               </a:rPr>
               <a:t>| </a:t>
             </a:r>
             <a:r>
-              <a:rPr lang="en-US" altLang="ko-KR" sz="1800" dirty="0" smtClean="0">
+              <a:rPr lang="en-US" altLang="ko-KR" sz="1800" dirty="0">
                 <a:latin typeface="HY견고딕" panose="02030600000101010101" pitchFamily="18" charset="-127"/>
                 <a:ea typeface="HY견고딕" panose="02030600000101010101" pitchFamily="18" charset="-127"/>
               </a:rPr>
               <a:t>Ground Rule</a:t>
             </a:r>
-            <a:endParaRPr lang="en-US" altLang="ko-KR" sz="1800" dirty="0">
-              <a:latin typeface="HY견고딕" panose="02030600000101010101" pitchFamily="18" charset="-127"/>
-              <a:ea typeface="HY견고딕" panose="02030600000101010101" pitchFamily="18" charset="-127"/>
-            </a:endParaRPr>
           </a:p>
           <a:p>
             <a:endParaRPr lang="ko-KR" altLang="en-US" sz="1800" dirty="0">
@@ -14888,13 +14714,6 @@
   <p:clrMapOvr>
     <a:masterClrMapping/>
   </p:clrMapOvr>
-  <p:timing>
-    <p:tnLst>
-      <p:par>
-        <p:cTn id="1" dur="indefinite" restart="never" nodeType="tmRoot"/>
-      </p:par>
-    </p:tnLst>
-  </p:timing>
 </p:sld>
 </file>
 
@@ -14999,7 +14818,7 @@
               </a:lnSpc>
             </a:pPr>
             <a:r>
-              <a:rPr lang="en-US" altLang="ko-KR" sz="1400" dirty="0" smtClean="0">
+              <a:rPr lang="en-US" altLang="ko-KR" sz="1400" dirty="0">
                 <a:solidFill>
                   <a:prstClr val="black"/>
                 </a:solidFill>
@@ -15014,108 +14833,7 @@
                 </a:solidFill>
                 <a:latin typeface="맑은 고딕" panose="020B0503020000020004" pitchFamily="50" charset="-127"/>
               </a:rPr>
-              <a:t>파일명은 대문자로 </a:t>
-            </a:r>
-            <a:r>
-              <a:rPr lang="ko-KR" altLang="en-US" sz="1400" dirty="0" smtClean="0">
-                <a:solidFill>
-                  <a:prstClr val="black"/>
-                </a:solidFill>
-                <a:latin typeface="맑은 고딕" panose="020B0503020000020004" pitchFamily="50" charset="-127"/>
-              </a:rPr>
-              <a:t>시작</a:t>
-            </a:r>
-            <a:endParaRPr lang="en-US" altLang="ko-KR" sz="1400" dirty="0" smtClean="0">
-              <a:solidFill>
-                <a:prstClr val="black"/>
-              </a:solidFill>
-              <a:latin typeface="맑은 고딕" panose="020B0503020000020004" pitchFamily="50" charset="-127"/>
-            </a:endParaRPr>
-          </a:p>
-          <a:p>
-            <a:pPr defTabSz="779233">
-              <a:lnSpc>
-                <a:spcPct val="150000"/>
-              </a:lnSpc>
-            </a:pPr>
-            <a:r>
-              <a:rPr lang="en-US" altLang="ko-KR" sz="1400" dirty="0" smtClean="0">
-                <a:solidFill>
-                  <a:prstClr val="black"/>
-                </a:solidFill>
-                <a:latin typeface="맑은 고딕" panose="020B0503020000020004" pitchFamily="50" charset="-127"/>
-              </a:rPr>
-              <a:t>  - </a:t>
-            </a:r>
-            <a:r>
-              <a:rPr lang="ko-KR" altLang="en-US" sz="1400" dirty="0" smtClean="0">
-                <a:solidFill>
-                  <a:prstClr val="black"/>
-                </a:solidFill>
-                <a:latin typeface="맑은 고딕" panose="020B0503020000020004" pitchFamily="50" charset="-127"/>
-              </a:rPr>
-              <a:t>변수 이름의 </a:t>
-            </a:r>
-            <a:r>
-              <a:rPr lang="ko-KR" altLang="en-US" sz="1400" dirty="0">
-                <a:solidFill>
-                  <a:prstClr val="black"/>
-                </a:solidFill>
-                <a:latin typeface="맑은 고딕" panose="020B0503020000020004" pitchFamily="50" charset="-127"/>
-              </a:rPr>
-              <a:t>앞은 </a:t>
-            </a:r>
-            <a:r>
-              <a:rPr lang="ko-KR" altLang="en-US" sz="1400" dirty="0" smtClean="0">
-                <a:solidFill>
-                  <a:prstClr val="black"/>
-                </a:solidFill>
-                <a:latin typeface="맑은 고딕" panose="020B0503020000020004" pitchFamily="50" charset="-127"/>
-              </a:rPr>
-              <a:t>소문자로 시작한다</a:t>
-            </a:r>
-            <a:r>
-              <a:rPr lang="en-US" altLang="ko-KR" sz="1400" dirty="0" smtClean="0">
-                <a:solidFill>
-                  <a:prstClr val="black"/>
-                </a:solidFill>
-                <a:latin typeface="맑은 고딕" panose="020B0503020000020004" pitchFamily="50" charset="-127"/>
-              </a:rPr>
-              <a:t>.</a:t>
-            </a:r>
-          </a:p>
-          <a:p>
-            <a:pPr defTabSz="779233">
-              <a:lnSpc>
-                <a:spcPct val="150000"/>
-              </a:lnSpc>
-            </a:pPr>
-            <a:r>
-              <a:rPr lang="en-US" altLang="ko-KR" sz="1400" dirty="0" smtClean="0">
-                <a:solidFill>
-                  <a:prstClr val="black"/>
-                </a:solidFill>
-                <a:latin typeface="맑은 고딕" panose="020B0503020000020004" pitchFamily="50" charset="-127"/>
-              </a:rPr>
-              <a:t>  - </a:t>
-            </a:r>
-            <a:r>
-              <a:rPr lang="ko-KR" altLang="en-US" sz="1400" dirty="0">
-                <a:solidFill>
-                  <a:prstClr val="black"/>
-                </a:solidFill>
-                <a:latin typeface="맑은 고딕" panose="020B0503020000020004" pitchFamily="50" charset="-127"/>
-              </a:rPr>
-              <a:t>클래스 이름의 앞은 대문자로 시작한다</a:t>
-            </a:r>
-            <a:r>
-              <a:rPr lang="en-US" altLang="ko-KR" sz="1400" dirty="0" smtClean="0">
-                <a:solidFill>
-                  <a:prstClr val="black"/>
-                </a:solidFill>
-                <a:latin typeface="맑은 고딕" panose="020B0503020000020004" pitchFamily="50" charset="-127"/>
-              </a:rPr>
-              <a:t>.</a:t>
+              <a:t>파일명은 대문자로 시작</a:t>
             </a:r>
             <a:endParaRPr lang="en-US" altLang="ko-KR" sz="1400" dirty="0">
               <a:solidFill>
@@ -15131,7 +14849,7 @@
               </a:lnSpc>
             </a:pPr>
             <a:r>
-              <a:rPr lang="en-US" altLang="ko-KR" sz="1400" dirty="0" smtClean="0">
+              <a:rPr lang="en-US" altLang="ko-KR" sz="1400" dirty="0">
                 <a:solidFill>
                   <a:prstClr val="black"/>
                 </a:solidFill>
@@ -15140,67 +14858,22 @@
               <a:t>  - </a:t>
             </a:r>
             <a:r>
+              <a:rPr lang="ko-KR" altLang="en-US" sz="1400" dirty="0">
+                <a:solidFill>
+                  <a:prstClr val="black"/>
+                </a:solidFill>
+                <a:latin typeface="맑은 고딕" panose="020B0503020000020004" pitchFamily="50" charset="-127"/>
+              </a:rPr>
+              <a:t>변수 이름의 앞은 소문자로 시작한다</a:t>
+            </a:r>
+            <a:r>
               <a:rPr lang="en-US" altLang="ko-KR" sz="1400" dirty="0">
                 <a:solidFill>
                   <a:prstClr val="black"/>
                 </a:solidFill>
                 <a:latin typeface="맑은 고딕" panose="020B0503020000020004" pitchFamily="50" charset="-127"/>
               </a:rPr>
-              <a:t>Indentation Rule </a:t>
-            </a:r>
-            <a:r>
-              <a:rPr lang="ko-KR" altLang="en-US" sz="1400" dirty="0">
-                <a:solidFill>
-                  <a:prstClr val="black"/>
-                </a:solidFill>
-                <a:latin typeface="맑은 고딕" panose="020B0503020000020004" pitchFamily="50" charset="-127"/>
-              </a:rPr>
-              <a:t>적용 하여 기능 </a:t>
-            </a:r>
-            <a:r>
-              <a:rPr lang="ko-KR" altLang="en-US" sz="1400" dirty="0" smtClean="0">
-                <a:solidFill>
-                  <a:prstClr val="black"/>
-                </a:solidFill>
-                <a:latin typeface="맑은 고딕" panose="020B0503020000020004" pitchFamily="50" charset="-127"/>
-              </a:rPr>
-              <a:t>구현 시 </a:t>
-            </a:r>
-            <a:r>
-              <a:rPr lang="en-US" altLang="ko-KR" sz="1400" dirty="0">
-                <a:solidFill>
-                  <a:prstClr val="black"/>
-                </a:solidFill>
-                <a:latin typeface="맑은 고딕" panose="020B0503020000020004" pitchFamily="50" charset="-127"/>
-              </a:rPr>
-              <a:t>Class</a:t>
-            </a:r>
-            <a:r>
-              <a:rPr lang="ko-KR" altLang="en-US" sz="1400" dirty="0">
-                <a:solidFill>
-                  <a:prstClr val="black"/>
-                </a:solidFill>
-                <a:latin typeface="맑은 고딕" panose="020B0503020000020004" pitchFamily="50" charset="-127"/>
-              </a:rPr>
-              <a:t>와 </a:t>
-            </a:r>
-            <a:r>
-              <a:rPr lang="en-US" altLang="ko-KR" sz="1400" dirty="0" err="1">
-                <a:solidFill>
-                  <a:prstClr val="black"/>
-                </a:solidFill>
-                <a:latin typeface="맑은 고딕" panose="020B0503020000020004" pitchFamily="50" charset="-127"/>
-              </a:rPr>
-              <a:t>Struct</a:t>
-            </a:r>
-            <a:r>
-              <a:rPr lang="ko-KR" altLang="en-US" sz="1400" dirty="0">
-                <a:solidFill>
-                  <a:prstClr val="black"/>
-                </a:solidFill>
-                <a:latin typeface="맑은 고딕" panose="020B0503020000020004" pitchFamily="50" charset="-127"/>
-              </a:rPr>
-              <a:t>의 사용 시 동일 크기로 들여 쓰기</a:t>
+              <a:t>.</a:t>
             </a:r>
           </a:p>
           <a:p>
@@ -15210,32 +14883,31 @@
               </a:lnSpc>
             </a:pPr>
             <a:r>
-              <a:rPr lang="en-US" altLang="ko-KR" sz="1400" dirty="0" smtClean="0"/>
+              <a:rPr lang="en-US" altLang="ko-KR" sz="1400" dirty="0">
+                <a:solidFill>
+                  <a:prstClr val="black"/>
+                </a:solidFill>
+                <a:latin typeface="맑은 고딕" panose="020B0503020000020004" pitchFamily="50" charset="-127"/>
+              </a:rPr>
               <a:t>  - </a:t>
             </a:r>
             <a:r>
-              <a:rPr lang="ko-KR" altLang="en-US" sz="1400" dirty="0"/>
-              <a:t>주석은 최소한으로만 한다는 원칙을 가진다</a:t>
-            </a:r>
-            <a:r>
-              <a:rPr lang="en-US" altLang="ko-KR" sz="1400" dirty="0" smtClean="0"/>
-              <a:t>. (bad</a:t>
-            </a:r>
-            <a:r>
-              <a:rPr lang="ko-KR" altLang="en-US" sz="1400" dirty="0"/>
-              <a:t> </a:t>
-            </a:r>
-            <a:r>
-              <a:rPr lang="en-US" altLang="ko-KR" sz="1400" dirty="0" smtClean="0"/>
-              <a:t>smell </a:t>
-            </a:r>
-            <a:r>
-              <a:rPr lang="ko-KR" altLang="en-US" sz="1400" dirty="0" smtClean="0"/>
-              <a:t>방지</a:t>
-            </a:r>
-            <a:r>
-              <a:rPr lang="en-US" altLang="ko-KR" sz="1400" dirty="0" smtClean="0"/>
-              <a:t>)</a:t>
+              <a:rPr lang="ko-KR" altLang="en-US" sz="1400" dirty="0">
+                <a:solidFill>
+                  <a:prstClr val="black"/>
+                </a:solidFill>
+                <a:latin typeface="맑은 고딕" panose="020B0503020000020004" pitchFamily="50" charset="-127"/>
+              </a:rPr>
+              <a:t>클래스 이름의 앞은 대문자로 시작한다</a:t>
+            </a:r>
+            <a:r>
+              <a:rPr lang="en-US" altLang="ko-KR" sz="1400" dirty="0">
+                <a:solidFill>
+                  <a:prstClr val="black"/>
+                </a:solidFill>
+                <a:latin typeface="맑은 고딕" panose="020B0503020000020004" pitchFamily="50" charset="-127"/>
+              </a:rPr>
+              <a:t>.</a:t>
             </a:r>
           </a:p>
           <a:p>
@@ -15245,6 +14917,102 @@
               </a:lnSpc>
             </a:pPr>
             <a:r>
+              <a:rPr lang="en-US" altLang="ko-KR" sz="1400" dirty="0">
+                <a:solidFill>
+                  <a:prstClr val="black"/>
+                </a:solidFill>
+                <a:latin typeface="맑은 고딕" panose="020B0503020000020004" pitchFamily="50" charset="-127"/>
+              </a:rPr>
+              <a:t>  - Indentation Rule </a:t>
+            </a:r>
+            <a:r>
+              <a:rPr lang="ko-KR" altLang="en-US" sz="1400" dirty="0">
+                <a:solidFill>
+                  <a:prstClr val="black"/>
+                </a:solidFill>
+                <a:latin typeface="맑은 고딕" panose="020B0503020000020004" pitchFamily="50" charset="-127"/>
+              </a:rPr>
+              <a:t>적용 하여 기능 구현 시 </a:t>
+            </a:r>
+            <a:r>
+              <a:rPr lang="en-US" altLang="ko-KR" sz="1400" dirty="0">
+                <a:solidFill>
+                  <a:prstClr val="black"/>
+                </a:solidFill>
+                <a:latin typeface="맑은 고딕" panose="020B0503020000020004" pitchFamily="50" charset="-127"/>
+              </a:rPr>
+              <a:t>Class</a:t>
+            </a:r>
+            <a:r>
+              <a:rPr lang="ko-KR" altLang="en-US" sz="1400" dirty="0">
+                <a:solidFill>
+                  <a:prstClr val="black"/>
+                </a:solidFill>
+                <a:latin typeface="맑은 고딕" panose="020B0503020000020004" pitchFamily="50" charset="-127"/>
+              </a:rPr>
+              <a:t>와 </a:t>
+            </a:r>
+            <a:r>
+              <a:rPr lang="en-US" altLang="ko-KR" sz="1400" dirty="0" err="1">
+                <a:solidFill>
+                  <a:prstClr val="black"/>
+                </a:solidFill>
+                <a:latin typeface="맑은 고딕" panose="020B0503020000020004" pitchFamily="50" charset="-127"/>
+              </a:rPr>
+              <a:t>Struct</a:t>
+            </a:r>
+            <a:r>
+              <a:rPr lang="ko-KR" altLang="en-US" sz="1400" dirty="0">
+                <a:solidFill>
+                  <a:prstClr val="black"/>
+                </a:solidFill>
+                <a:latin typeface="맑은 고딕" panose="020B0503020000020004" pitchFamily="50" charset="-127"/>
+              </a:rPr>
+              <a:t>의 사용 시 동일 크기로 들여 쓰기</a:t>
+            </a:r>
+          </a:p>
+          <a:p>
+            <a:pPr defTabSz="779233">
+              <a:lnSpc>
+                <a:spcPct val="150000"/>
+              </a:lnSpc>
+            </a:pPr>
+            <a:r>
+              <a:rPr lang="en-US" altLang="ko-KR" sz="1400" dirty="0"/>
+              <a:t>  - </a:t>
+            </a:r>
+            <a:r>
+              <a:rPr lang="ko-KR" altLang="en-US" sz="1400" dirty="0"/>
+              <a:t>주석은 최소한으로만 한다는 원칙을 가진다</a:t>
+            </a:r>
+            <a:r>
+              <a:rPr lang="en-US" altLang="ko-KR" sz="1400" dirty="0"/>
+              <a:t>. (bad</a:t>
+            </a:r>
+            <a:r>
+              <a:rPr lang="ko-KR" altLang="en-US" sz="1400" dirty="0"/>
+              <a:t> </a:t>
+            </a:r>
+            <a:r>
+              <a:rPr lang="en-US" altLang="ko-KR" sz="1400" dirty="0"/>
+              <a:t>smell </a:t>
+            </a:r>
+            <a:r>
+              <a:rPr lang="ko-KR" altLang="en-US" sz="1400" dirty="0"/>
+              <a:t>방지</a:t>
+            </a:r>
+            <a:r>
+              <a:rPr lang="en-US" altLang="ko-KR" sz="1400" dirty="0"/>
+              <a:t>)</a:t>
+            </a:r>
+          </a:p>
+          <a:p>
+            <a:pPr defTabSz="779233">
+              <a:lnSpc>
+                <a:spcPct val="150000"/>
+              </a:lnSpc>
+            </a:pPr>
+            <a:r>
               <a:rPr lang="ko-KR" altLang="ko-KR" sz="1400" dirty="0">
                 <a:solidFill>
                   <a:schemeClr val="dk1"/>
@@ -15257,7 +15025,7 @@
               <a:t> </a:t>
             </a:r>
             <a:r>
-              <a:rPr lang="en-US" altLang="ko-KR" sz="1400" dirty="0" smtClean="0">
+              <a:rPr lang="en-US" altLang="ko-KR" sz="1400" dirty="0">
                 <a:solidFill>
                   <a:schemeClr val="dk1"/>
                 </a:solidFill>
@@ -15269,7 +15037,7 @@
               <a:t> </a:t>
             </a:r>
             <a:r>
-              <a:rPr lang="ko-KR" altLang="ko-KR" sz="1400" dirty="0" smtClean="0">
+              <a:rPr lang="ko-KR" altLang="ko-KR" sz="1400" dirty="0">
                 <a:solidFill>
                   <a:schemeClr val="dk1"/>
                 </a:solidFill>
@@ -15278,10 +15046,10 @@
                 <a:cs typeface="Malgun Gothic"/>
                 <a:sym typeface="Malgun Gothic"/>
               </a:rPr>
-              <a:t>- </a:t>
-            </a:r>
-            <a:r>
-              <a:rPr lang="ko-KR" altLang="ko-KR" sz="1400" dirty="0">
+              <a:t>- 멤버 변수의 이름에는 뒤에 </a:t>
+            </a:r>
+            <a:r>
+              <a:rPr lang="ko-KR" altLang="ko-KR" sz="1400" dirty="0" err="1">
                 <a:solidFill>
                   <a:schemeClr val="dk1"/>
                 </a:solidFill>
@@ -15290,10 +15058,10 @@
                 <a:cs typeface="Malgun Gothic"/>
                 <a:sym typeface="Malgun Gothic"/>
               </a:rPr>
-              <a:t>멤버 변수의 이름에는 뒤에 </a:t>
-            </a:r>
-            <a:r>
-              <a:rPr lang="ko-KR" altLang="ko-KR" sz="1400" dirty="0" err="1">
+              <a:t>under</a:t>
+            </a:r>
+            <a:r>
+              <a:rPr lang="ko-KR" altLang="ko-KR" sz="1400" dirty="0">
                 <a:solidFill>
                   <a:schemeClr val="dk1"/>
                 </a:solidFill>
@@ -15302,10 +15070,10 @@
                 <a:cs typeface="Malgun Gothic"/>
                 <a:sym typeface="Malgun Gothic"/>
               </a:rPr>
-              <a:t>under</a:t>
-            </a:r>
-            <a:r>
-              <a:rPr lang="ko-KR" altLang="ko-KR" sz="1400" dirty="0">
+              <a:t> </a:t>
+            </a:r>
+            <a:r>
+              <a:rPr lang="ko-KR" altLang="ko-KR" sz="1400" dirty="0" err="1">
                 <a:solidFill>
                   <a:schemeClr val="dk1"/>
                 </a:solidFill>
@@ -15314,10 +15082,10 @@
                 <a:cs typeface="Malgun Gothic"/>
                 <a:sym typeface="Malgun Gothic"/>
               </a:rPr>
-              <a:t> </a:t>
-            </a:r>
-            <a:r>
-              <a:rPr lang="ko-KR" altLang="ko-KR" sz="1400" dirty="0" err="1">
+              <a:t>bar를</a:t>
+            </a:r>
+            <a:r>
+              <a:rPr lang="ko-KR" altLang="ko-KR" sz="1400" dirty="0">
                 <a:solidFill>
                   <a:schemeClr val="dk1"/>
                 </a:solidFill>
@@ -15326,10 +15094,10 @@
                 <a:cs typeface="Malgun Gothic"/>
                 <a:sym typeface="Malgun Gothic"/>
               </a:rPr>
-              <a:t>bar를</a:t>
-            </a:r>
-            <a:r>
-              <a:rPr lang="ko-KR" altLang="ko-KR" sz="1400" dirty="0">
+              <a:t> 붙여준다. (</a:t>
+            </a:r>
+            <a:r>
+              <a:rPr lang="ko-KR" altLang="ko-KR" sz="1400" dirty="0" err="1">
                 <a:solidFill>
                   <a:schemeClr val="dk1"/>
                 </a:solidFill>
@@ -15338,10 +15106,10 @@
                 <a:cs typeface="Malgun Gothic"/>
                 <a:sym typeface="Malgun Gothic"/>
               </a:rPr>
-              <a:t> 붙여준다. (</a:t>
-            </a:r>
-            <a:r>
-              <a:rPr lang="ko-KR" altLang="ko-KR" sz="1400" dirty="0" err="1">
+              <a:t>ex</a:t>
+            </a:r>
+            <a:r>
+              <a:rPr lang="ko-KR" altLang="ko-KR" sz="1400" dirty="0">
                 <a:solidFill>
                   <a:schemeClr val="dk1"/>
                 </a:solidFill>
@@ -15350,10 +15118,10 @@
                 <a:cs typeface="Malgun Gothic"/>
                 <a:sym typeface="Malgun Gothic"/>
               </a:rPr>
-              <a:t>ex</a:t>
-            </a:r>
-            <a:r>
-              <a:rPr lang="ko-KR" altLang="ko-KR" sz="1400" dirty="0">
+              <a:t>. </a:t>
+            </a:r>
+            <a:r>
+              <a:rPr lang="ko-KR" altLang="ko-KR" sz="1400" dirty="0" err="1">
                 <a:solidFill>
                   <a:schemeClr val="dk1"/>
                 </a:solidFill>
@@ -15362,10 +15130,10 @@
                 <a:cs typeface="Malgun Gothic"/>
                 <a:sym typeface="Malgun Gothic"/>
               </a:rPr>
-              <a:t>. </a:t>
-            </a:r>
-            <a:r>
-              <a:rPr lang="ko-KR" altLang="ko-KR" sz="1400" dirty="0" err="1">
+              <a:t>memberVariable</a:t>
+            </a:r>
+            <a:r>
+              <a:rPr lang="ko-KR" altLang="ko-KR" sz="1400" dirty="0">
                 <a:solidFill>
                   <a:schemeClr val="dk1"/>
                 </a:solidFill>
@@ -15374,21 +15142,9 @@
                 <a:cs typeface="Malgun Gothic"/>
                 <a:sym typeface="Malgun Gothic"/>
               </a:rPr>
-              <a:t>memberVariable</a:t>
-            </a:r>
-            <a:r>
-              <a:rPr lang="ko-KR" altLang="ko-KR" sz="1400" dirty="0" smtClean="0">
-                <a:solidFill>
-                  <a:schemeClr val="dk1"/>
-                </a:solidFill>
-                <a:latin typeface="Malgun Gothic"/>
-                <a:ea typeface="Malgun Gothic"/>
-                <a:cs typeface="Malgun Gothic"/>
-                <a:sym typeface="Malgun Gothic"/>
-              </a:rPr>
               <a:t>_)</a:t>
             </a:r>
-            <a:endParaRPr lang="en-US" altLang="ko-KR" sz="1400" dirty="0" smtClean="0">
+            <a:endParaRPr lang="en-US" altLang="ko-KR" sz="1400" dirty="0">
               <a:solidFill>
                 <a:schemeClr val="dk1"/>
               </a:solidFill>
@@ -15417,7 +15173,7 @@
               <a:t> </a:t>
             </a:r>
             <a:r>
-              <a:rPr lang="en-US" altLang="ko-KR" sz="1400" dirty="0" smtClean="0">
+              <a:rPr lang="en-US" altLang="ko-KR" sz="1400" dirty="0">
                 <a:solidFill>
                   <a:schemeClr val="dk1"/>
                 </a:solidFill>
@@ -15429,7 +15185,7 @@
               <a:t> </a:t>
             </a:r>
             <a:r>
-              <a:rPr lang="ko-KR" altLang="ko-KR" sz="1400" dirty="0" smtClean="0">
+              <a:rPr lang="ko-KR" altLang="ko-KR" sz="1400" dirty="0">
                 <a:solidFill>
                   <a:schemeClr val="dk1"/>
                 </a:solidFill>
@@ -15560,7 +15316,7 @@
               </a:rPr>
               <a:t>_)</a:t>
             </a:r>
-            <a:endParaRPr lang="en-US" altLang="ko-KR" sz="1400" dirty="0" smtClean="0">
+            <a:endParaRPr lang="en-US" altLang="ko-KR" sz="1400" dirty="0">
               <a:solidFill>
                 <a:prstClr val="black"/>
               </a:solidFill>
@@ -15592,14 +15348,14 @@
           <a:lstStyle/>
           <a:p>
             <a:r>
-              <a:rPr lang="ko-KR" altLang="en-US" sz="2400" dirty="0" smtClean="0">
+              <a:rPr lang="ko-KR" altLang="en-US" sz="2400" dirty="0">
                 <a:latin typeface="HY견고딕" panose="02030600000101010101" pitchFamily="18" charset="-127"/>
                 <a:ea typeface="HY견고딕" panose="02030600000101010101" pitchFamily="18" charset="-127"/>
               </a:rPr>
               <a:t>진행 방법 </a:t>
             </a:r>
             <a:r>
-              <a:rPr lang="en-US" altLang="ko-KR" sz="2400" dirty="0" smtClean="0">
+              <a:rPr lang="en-US" altLang="ko-KR" sz="2400" dirty="0">
                 <a:latin typeface="HY견고딕" panose="02030600000101010101" pitchFamily="18" charset="-127"/>
                 <a:ea typeface="HY견고딕" panose="02030600000101010101" pitchFamily="18" charset="-127"/>
               </a:rPr>
@@ -15631,13 +15387,6 @@
   <p:clrMapOvr>
     <a:masterClrMapping/>
   </p:clrMapOvr>
-  <p:timing>
-    <p:tnLst>
-      <p:par>
-        <p:cTn id="1" dur="indefinite" restart="never" nodeType="tmRoot"/>
-      </p:par>
-    </p:tnLst>
-  </p:timing>
 </p:sld>
 </file>
 
@@ -15721,14 +15470,14 @@
               </a:lnSpc>
             </a:pPr>
             <a:r>
-              <a:rPr lang="ko-KR" altLang="en-US" sz="1400" dirty="0" smtClean="0">
+              <a:rPr lang="ko-KR" altLang="en-US" sz="1400" dirty="0">
                 <a:latin typeface="HY견고딕" panose="02030600000101010101" pitchFamily="18" charset="-127"/>
                 <a:ea typeface="HY견고딕" panose="02030600000101010101" pitchFamily="18" charset="-127"/>
               </a:rPr>
               <a:t>■ </a:t>
             </a:r>
             <a:r>
-              <a:rPr lang="en-US" altLang="ko-KR" sz="1400" dirty="0" smtClean="0">
+              <a:rPr lang="en-US" altLang="ko-KR" sz="1400" dirty="0">
                 <a:latin typeface="HY견고딕" panose="02030600000101010101" pitchFamily="18" charset="-127"/>
                 <a:ea typeface="HY견고딕" panose="02030600000101010101" pitchFamily="18" charset="-127"/>
               </a:rPr>
@@ -15742,13 +15491,22 @@
               </a:lnSpc>
             </a:pPr>
             <a:r>
-              <a:rPr lang="en-US" altLang="ko-KR" sz="1400" dirty="0" smtClean="0">
+              <a:rPr lang="en-US" altLang="ko-KR" sz="1400" dirty="0">
                 <a:solidFill>
                   <a:prstClr val="black"/>
                 </a:solidFill>
                 <a:latin typeface="맑은 고딕" panose="020B0503020000020004" pitchFamily="50" charset="-127"/>
               </a:rPr>
-              <a:t> - Pull </a:t>
+              <a:t> - Pull Request </a:t>
+            </a:r>
+            <a:r>
+              <a:rPr lang="ko-KR" altLang="en-US" sz="1400" dirty="0">
+                <a:solidFill>
+                  <a:prstClr val="black"/>
+                </a:solidFill>
+                <a:latin typeface="맑은 고딕" panose="020B0503020000020004" pitchFamily="50" charset="-127"/>
+              </a:rPr>
+              <a:t>요청 시 최소 </a:t>
             </a:r>
             <a:r>
               <a:rPr lang="en-US" altLang="ko-KR" sz="1400" dirty="0">
@@ -15757,16 +15515,25 @@
                 </a:solidFill>
                 <a:latin typeface="맑은 고딕" panose="020B0503020000020004" pitchFamily="50" charset="-127"/>
               </a:rPr>
-              <a:t>Request </a:t>
-            </a:r>
-            <a:r>
-              <a:rPr lang="ko-KR" altLang="en-US" sz="1400" dirty="0" smtClean="0">
+              <a:t>2</a:t>
+            </a:r>
+            <a:r>
+              <a:rPr lang="ko-KR" altLang="en-US" sz="1400" dirty="0">
                 <a:solidFill>
                   <a:prstClr val="black"/>
                 </a:solidFill>
                 <a:latin typeface="맑은 고딕" panose="020B0503020000020004" pitchFamily="50" charset="-127"/>
               </a:rPr>
-              <a:t>요청 </a:t>
+              <a:t>개의 팀원 </a:t>
+            </a:r>
+            <a:r>
+              <a:rPr lang="en-US" altLang="ko-KR" sz="1400" dirty="0">
+                <a:solidFill>
+                  <a:prstClr val="black"/>
+                </a:solidFill>
+                <a:latin typeface="맑은 고딕" panose="020B0503020000020004" pitchFamily="50" charset="-127"/>
+              </a:rPr>
+              <a:t>Approve </a:t>
             </a:r>
             <a:r>
               <a:rPr lang="ko-KR" altLang="en-US" sz="1400" dirty="0">
@@ -15775,54 +15542,9 @@
                 </a:solidFill>
                 <a:latin typeface="맑은 고딕" panose="020B0503020000020004" pitchFamily="50" charset="-127"/>
               </a:rPr>
-              <a:t>시 </a:t>
-            </a:r>
-            <a:r>
-              <a:rPr lang="ko-KR" altLang="en-US" sz="1400" dirty="0" smtClean="0">
-                <a:solidFill>
-                  <a:prstClr val="black"/>
-                </a:solidFill>
-                <a:latin typeface="맑은 고딕" panose="020B0503020000020004" pitchFamily="50" charset="-127"/>
-              </a:rPr>
-              <a:t>최소 </a:t>
-            </a:r>
-            <a:r>
-              <a:rPr lang="en-US" altLang="ko-KR" sz="1400" dirty="0">
-                <a:solidFill>
-                  <a:prstClr val="black"/>
-                </a:solidFill>
-                <a:latin typeface="맑은 고딕" panose="020B0503020000020004" pitchFamily="50" charset="-127"/>
-              </a:rPr>
-              <a:t>2</a:t>
-            </a:r>
-            <a:r>
-              <a:rPr lang="ko-KR" altLang="en-US" sz="1400" dirty="0" smtClean="0">
-                <a:solidFill>
-                  <a:prstClr val="black"/>
-                </a:solidFill>
-                <a:latin typeface="맑은 고딕" panose="020B0503020000020004" pitchFamily="50" charset="-127"/>
-              </a:rPr>
-              <a:t>개의 팀원 </a:t>
-            </a:r>
-            <a:r>
-              <a:rPr lang="en-US" altLang="ko-KR" sz="1400" dirty="0" smtClean="0">
-                <a:solidFill>
-                  <a:prstClr val="black"/>
-                </a:solidFill>
-                <a:latin typeface="맑은 고딕" panose="020B0503020000020004" pitchFamily="50" charset="-127"/>
-              </a:rPr>
-              <a:t>Approve </a:t>
-            </a:r>
-            <a:r>
-              <a:rPr lang="ko-KR" altLang="en-US" sz="1400" dirty="0" smtClean="0">
-                <a:solidFill>
-                  <a:prstClr val="black"/>
-                </a:solidFill>
-                <a:latin typeface="맑은 고딕" panose="020B0503020000020004" pitchFamily="50" charset="-127"/>
-              </a:rPr>
               <a:t>받도록 한다 </a:t>
             </a:r>
-            <a:endParaRPr lang="en-US" altLang="ko-KR" sz="1400" dirty="0" smtClean="0">
+            <a:endParaRPr lang="en-US" altLang="ko-KR" sz="1400" dirty="0">
               <a:solidFill>
                 <a:prstClr val="black"/>
               </a:solidFill>
@@ -15836,12 +15558,39 @@
               </a:lnSpc>
             </a:pPr>
             <a:r>
-              <a:rPr lang="en-US" altLang="ko-KR" sz="1400" dirty="0" smtClean="0">
+              <a:rPr lang="en-US" altLang="ko-KR" sz="1400" dirty="0">
                 <a:solidFill>
                   <a:prstClr val="black"/>
                 </a:solidFill>
                 <a:latin typeface="맑은 고딕" panose="020B0503020000020004" pitchFamily="50" charset="-127"/>
               </a:rPr>
+              <a:t> - PR prefix</a:t>
+            </a:r>
+            <a:r>
+              <a:rPr lang="ko-KR" altLang="en-US" sz="1400" dirty="0">
+                <a:solidFill>
+                  <a:prstClr val="black"/>
+                </a:solidFill>
+                <a:latin typeface="맑은 고딕" panose="020B0503020000020004" pitchFamily="50" charset="-127"/>
+              </a:rPr>
+              <a:t>에</a:t>
+            </a:r>
+            <a:r>
+              <a:rPr lang="en-US" altLang="ko-KR" sz="1400" dirty="0">
+                <a:solidFill>
+                  <a:prstClr val="black"/>
+                </a:solidFill>
+                <a:latin typeface="맑은 고딕" panose="020B0503020000020004" pitchFamily="50" charset="-127"/>
+              </a:rPr>
+              <a:t> [Feature]</a:t>
+            </a:r>
+            <a:r>
+              <a:rPr lang="ko-KR" altLang="en-US" sz="1400" dirty="0">
+                <a:solidFill>
+                  <a:prstClr val="black"/>
+                </a:solidFill>
+                <a:latin typeface="맑은 고딕" panose="020B0503020000020004" pitchFamily="50" charset="-127"/>
+              </a:rPr>
               <a:t> </a:t>
             </a:r>
             <a:r>
@@ -15851,28 +15600,28 @@
                 </a:solidFill>
                 <a:latin typeface="맑은 고딕" panose="020B0503020000020004" pitchFamily="50" charset="-127"/>
               </a:rPr>
-              <a:t>- PR </a:t>
-            </a:r>
-            <a:r>
-              <a:rPr lang="en-US" altLang="ko-KR" sz="1400" dirty="0" smtClean="0">
+              <a:t>/</a:t>
+            </a:r>
+            <a:r>
+              <a:rPr lang="ko-KR" altLang="en-US" sz="1400" dirty="0">
                 <a:solidFill>
                   <a:prstClr val="black"/>
                 </a:solidFill>
                 <a:latin typeface="맑은 고딕" panose="020B0503020000020004" pitchFamily="50" charset="-127"/>
               </a:rPr>
-              <a:t>prefix</a:t>
-            </a:r>
-            <a:r>
-              <a:rPr lang="ko-KR" altLang="en-US" sz="1400" dirty="0" smtClean="0">
+              <a:t> </a:t>
+            </a:r>
+            <a:r>
+              <a:rPr lang="en-US" altLang="ko-KR" sz="1400" dirty="0">
                 <a:solidFill>
                   <a:prstClr val="black"/>
                 </a:solidFill>
                 <a:latin typeface="맑은 고딕" panose="020B0503020000020004" pitchFamily="50" charset="-127"/>
               </a:rPr>
-              <a:t>에</a:t>
-            </a:r>
-            <a:r>
-              <a:rPr lang="en-US" altLang="ko-KR" sz="1400" dirty="0" smtClean="0">
+              <a:t>[Refactoring]</a:t>
+            </a:r>
+            <a:r>
+              <a:rPr lang="ko-KR" altLang="en-US" sz="1400" dirty="0">
                 <a:solidFill>
                   <a:prstClr val="black"/>
                 </a:solidFill>
@@ -15887,7 +15636,7 @@
                 </a:solidFill>
                 <a:latin typeface="맑은 고딕" panose="020B0503020000020004" pitchFamily="50" charset="-127"/>
               </a:rPr>
-              <a:t>[Feature]</a:t>
+              <a:t>/</a:t>
             </a:r>
             <a:r>
               <a:rPr lang="ko-KR" altLang="en-US" sz="1400" dirty="0">
@@ -15905,7 +15654,25 @@
                 </a:solidFill>
                 <a:latin typeface="맑은 고딕" panose="020B0503020000020004" pitchFamily="50" charset="-127"/>
               </a:rPr>
-              <a:t>/</a:t>
+              <a:t>[</a:t>
+            </a:r>
+            <a:r>
+              <a:rPr lang="en-US" altLang="ko-KR" sz="1400" dirty="0" err="1">
+                <a:solidFill>
+                  <a:prstClr val="black"/>
+                </a:solidFill>
+                <a:latin typeface="맑은 고딕" panose="020B0503020000020004" pitchFamily="50" charset="-127"/>
+              </a:rPr>
+              <a:t>BugFix</a:t>
+            </a:r>
+            <a:r>
+              <a:rPr lang="en-US" altLang="ko-KR" sz="1400" dirty="0">
+                <a:solidFill>
+                  <a:prstClr val="black"/>
+                </a:solidFill>
+                <a:latin typeface="맑은 고딕" panose="020B0503020000020004" pitchFamily="50" charset="-127"/>
+              </a:rPr>
+              <a:t>] </a:t>
             </a:r>
             <a:r>
               <a:rPr lang="ko-KR" altLang="en-US" sz="1400" dirty="0">
@@ -15914,7 +15681,7 @@
                 </a:solidFill>
                 <a:latin typeface="맑은 고딕" panose="020B0503020000020004" pitchFamily="50" charset="-127"/>
               </a:rPr>
-              <a:t> </a:t>
+              <a:t>와 같은 </a:t>
             </a:r>
             <a:r>
               <a:rPr lang="en-US" altLang="ko-KR" sz="1400" dirty="0">
@@ -15923,7 +15690,7 @@
                 </a:solidFill>
                 <a:latin typeface="맑은 고딕" panose="020B0503020000020004" pitchFamily="50" charset="-127"/>
               </a:rPr>
-              <a:t>[Refactoring]</a:t>
+              <a:t>label</a:t>
             </a:r>
             <a:r>
               <a:rPr lang="ko-KR" altLang="en-US" sz="1400" dirty="0">
@@ -15932,81 +15699,9 @@
                 </a:solidFill>
                 <a:latin typeface="맑은 고딕" panose="020B0503020000020004" pitchFamily="50" charset="-127"/>
               </a:rPr>
-              <a:t> </a:t>
-            </a:r>
-            <a:r>
-              <a:rPr lang="en-US" altLang="ko-KR" sz="1400" dirty="0">
-                <a:solidFill>
-                  <a:prstClr val="black"/>
-                </a:solidFill>
-                <a:latin typeface="맑은 고딕" panose="020B0503020000020004" pitchFamily="50" charset="-127"/>
-              </a:rPr>
-              <a:t>/</a:t>
-            </a:r>
-            <a:r>
-              <a:rPr lang="ko-KR" altLang="en-US" sz="1400" dirty="0">
-                <a:solidFill>
-                  <a:prstClr val="black"/>
-                </a:solidFill>
-                <a:latin typeface="맑은 고딕" panose="020B0503020000020004" pitchFamily="50" charset="-127"/>
-              </a:rPr>
-              <a:t> </a:t>
-            </a:r>
-            <a:r>
-              <a:rPr lang="en-US" altLang="ko-KR" sz="1400" dirty="0">
-                <a:solidFill>
-                  <a:prstClr val="black"/>
-                </a:solidFill>
-                <a:latin typeface="맑은 고딕" panose="020B0503020000020004" pitchFamily="50" charset="-127"/>
-              </a:rPr>
-              <a:t>[</a:t>
-            </a:r>
-            <a:r>
-              <a:rPr lang="en-US" altLang="ko-KR" sz="1400" dirty="0" err="1">
-                <a:solidFill>
-                  <a:prstClr val="black"/>
-                </a:solidFill>
-                <a:latin typeface="맑은 고딕" panose="020B0503020000020004" pitchFamily="50" charset="-127"/>
-              </a:rPr>
-              <a:t>BugFix</a:t>
-            </a:r>
-            <a:r>
-              <a:rPr lang="en-US" altLang="ko-KR" sz="1400" dirty="0" smtClean="0">
-                <a:solidFill>
-                  <a:prstClr val="black"/>
-                </a:solidFill>
-                <a:latin typeface="맑은 고딕" panose="020B0503020000020004" pitchFamily="50" charset="-127"/>
-              </a:rPr>
-              <a:t>] </a:t>
-            </a:r>
-            <a:r>
-              <a:rPr lang="ko-KR" altLang="en-US" sz="1400" dirty="0" smtClean="0">
-                <a:solidFill>
-                  <a:prstClr val="black"/>
-                </a:solidFill>
-                <a:latin typeface="맑은 고딕" panose="020B0503020000020004" pitchFamily="50" charset="-127"/>
-              </a:rPr>
-              <a:t>와 같은 </a:t>
-            </a:r>
-            <a:r>
-              <a:rPr lang="en-US" altLang="ko-KR" sz="1400" dirty="0" smtClean="0">
-                <a:solidFill>
-                  <a:prstClr val="black"/>
-                </a:solidFill>
-                <a:latin typeface="맑은 고딕" panose="020B0503020000020004" pitchFamily="50" charset="-127"/>
-              </a:rPr>
-              <a:t>label</a:t>
-            </a:r>
-            <a:r>
-              <a:rPr lang="ko-KR" altLang="en-US" sz="1400" dirty="0" smtClean="0">
-                <a:solidFill>
-                  <a:prstClr val="black"/>
-                </a:solidFill>
-                <a:latin typeface="맑은 고딕" panose="020B0503020000020004" pitchFamily="50" charset="-127"/>
-              </a:rPr>
               <a:t>을 사용한다 </a:t>
             </a:r>
-            <a:endParaRPr lang="en-US" altLang="ko-KR" sz="1400" dirty="0" smtClean="0">
+            <a:endParaRPr lang="en-US" altLang="ko-KR" sz="1400" dirty="0">
               <a:solidFill>
                 <a:prstClr val="black"/>
               </a:solidFill>
@@ -16020,12 +15715,8 @@
               </a:lnSpc>
             </a:pPr>
             <a:r>
-              <a:rPr lang="en-US" altLang="ko-KR" sz="1400" dirty="0" smtClean="0"/>
-              <a:t> - </a:t>
-            </a:r>
-            <a:r>
               <a:rPr lang="en-US" altLang="ko-KR" sz="1400" dirty="0"/>
-              <a:t>PR</a:t>
+              <a:t> - PR</a:t>
             </a:r>
             <a:r>
               <a:rPr lang="ko-KR" altLang="en-US" sz="1400" dirty="0"/>
@@ -16036,12 +15727,8 @@
               <a:t>, </a:t>
             </a:r>
             <a:r>
-              <a:rPr lang="ko-KR" altLang="en-US" sz="1400" dirty="0" smtClean="0"/>
-              <a:t>접속해 있는 </a:t>
-            </a:r>
-            <a:r>
               <a:rPr lang="ko-KR" altLang="en-US" sz="1400" dirty="0"/>
-              <a:t>화상채팅</a:t>
+              <a:t>접속해 있는 화상채팅</a:t>
             </a:r>
             <a:r>
               <a:rPr lang="en-US" altLang="ko-KR" sz="1400" dirty="0"/>
@@ -16066,36 +15753,30 @@
               </a:lnSpc>
             </a:pPr>
             <a:r>
-              <a:rPr lang="en-US" altLang="ko-KR" sz="1400" dirty="0" smtClean="0">
+              <a:rPr lang="en-US" altLang="ko-KR" sz="1400" dirty="0">
                 <a:latin typeface="+mn-ea"/>
               </a:rPr>
               <a:t> - </a:t>
             </a:r>
             <a:r>
-              <a:rPr lang="ko-KR" altLang="en-US" sz="1400" dirty="0" smtClean="0">
+              <a:rPr lang="ko-KR" altLang="en-US" sz="1400" dirty="0">
                 <a:latin typeface="+mn-ea"/>
               </a:rPr>
-              <a:t>코드 리뷰 </a:t>
-            </a:r>
-            <a:r>
-              <a:rPr lang="ko-KR" altLang="en-US" sz="1400" dirty="0" smtClean="0">
+              <a:t>코드 리뷰 요청 시 가급적 바로 진행하고</a:t>
+            </a:r>
+            <a:r>
+              <a:rPr lang="en-US" altLang="ko-KR" sz="1400" dirty="0">
                 <a:latin typeface="+mn-ea"/>
               </a:rPr>
-              <a:t>요청 시 가급적 바로 진행하고</a:t>
-            </a:r>
-            <a:r>
-              <a:rPr lang="en-US" altLang="ko-KR" sz="1400" dirty="0" smtClean="0">
+              <a:t> </a:t>
+            </a:r>
+            <a:r>
+              <a:rPr lang="ko-KR" altLang="en-US" sz="1400" dirty="0">
                 <a:latin typeface="+mn-ea"/>
               </a:rPr>
-              <a:t> </a:t>
-            </a:r>
-            <a:r>
-              <a:rPr lang="ko-KR" altLang="en-US" sz="1400" dirty="0" smtClean="0">
-                <a:latin typeface="+mn-ea"/>
-              </a:rPr>
               <a:t>늦어도 요청일 다음 업무일 오전까지 완료한다</a:t>
             </a:r>
-            <a:endParaRPr lang="en-US" altLang="ko-KR" sz="1400" dirty="0" smtClean="0">
+            <a:endParaRPr lang="en-US" altLang="ko-KR" sz="1400" dirty="0">
               <a:latin typeface="+mn-ea"/>
             </a:endParaRPr>
           </a:p>
@@ -16105,7 +15786,7 @@
                 <a:spcPct val="150000"/>
               </a:lnSpc>
             </a:pPr>
-            <a:endParaRPr lang="en-US" altLang="ko-KR" sz="1400" dirty="0" smtClean="0">
+            <a:endParaRPr lang="en-US" altLang="ko-KR" sz="1400" dirty="0">
               <a:latin typeface="+mn-ea"/>
             </a:endParaRPr>
           </a:p>
@@ -16134,7 +15815,7 @@
           <a:lstStyle/>
           <a:p>
             <a:r>
-              <a:rPr lang="ko-KR" altLang="en-US" sz="2400" dirty="0" smtClean="0">
+              <a:rPr lang="ko-KR" altLang="en-US" sz="2400" dirty="0">
                 <a:latin typeface="HY견고딕" panose="02030600000101010101" pitchFamily="18" charset="-127"/>
                 <a:ea typeface="HY견고딕" panose="02030600000101010101" pitchFamily="18" charset="-127"/>
               </a:rPr>
@@ -16148,7 +15829,7 @@
               <a:t>| </a:t>
             </a:r>
             <a:r>
-              <a:rPr lang="en-US" altLang="ko-KR" sz="1800" dirty="0" smtClean="0">
+              <a:rPr lang="en-US" altLang="ko-KR" sz="1800" dirty="0">
                 <a:latin typeface="HY견고딕" panose="02030600000101010101" pitchFamily="18" charset="-127"/>
                 <a:ea typeface="HY견고딕" panose="02030600000101010101" pitchFamily="18" charset="-127"/>
               </a:rPr>
@@ -16189,14 +15870,14 @@
               </a:lnSpc>
             </a:pPr>
             <a:r>
-              <a:rPr lang="ko-KR" altLang="en-US" sz="1400" dirty="0" smtClean="0">
+              <a:rPr lang="ko-KR" altLang="en-US" sz="1400" dirty="0">
                 <a:latin typeface="HY견고딕" panose="02030600000101010101" pitchFamily="18" charset="-127"/>
                 <a:ea typeface="HY견고딕" panose="02030600000101010101" pitchFamily="18" charset="-127"/>
               </a:rPr>
               <a:t>■ </a:t>
             </a:r>
             <a:r>
-              <a:rPr lang="en-US" altLang="ko-KR" sz="1400" dirty="0" smtClean="0">
+              <a:rPr lang="en-US" altLang="ko-KR" sz="1400" dirty="0">
                 <a:latin typeface="HY견고딕" panose="02030600000101010101" pitchFamily="18" charset="-127"/>
                 <a:ea typeface="HY견고딕" panose="02030600000101010101" pitchFamily="18" charset="-127"/>
               </a:rPr>
@@ -16216,16 +15897,16 @@
                 </a:solidFill>
                 <a:latin typeface="맑은 고딕" panose="020B0503020000020004" pitchFamily="50" charset="-127"/>
               </a:rPr>
-              <a:t> </a:t>
-            </a:r>
-            <a:r>
-              <a:rPr lang="en-US" altLang="ko-KR" sz="1400" dirty="0" smtClean="0">
+              <a:t> - dev_(</a:t>
+            </a:r>
+            <a:r>
+              <a:rPr lang="ko-KR" altLang="en-US" sz="1400" dirty="0">
                 <a:solidFill>
                   <a:prstClr val="black"/>
                 </a:solidFill>
                 <a:latin typeface="맑은 고딕" panose="020B0503020000020004" pitchFamily="50" charset="-127"/>
               </a:rPr>
-              <a:t>- dev</a:t>
+              <a:t>각자</a:t>
             </a:r>
             <a:r>
               <a:rPr lang="en-US" altLang="ko-KR" sz="1400" dirty="0">
@@ -16234,7 +15915,7 @@
                 </a:solidFill>
                 <a:latin typeface="맑은 고딕" panose="020B0503020000020004" pitchFamily="50" charset="-127"/>
               </a:rPr>
-              <a:t>_(</a:t>
+              <a:t>ID) branch</a:t>
             </a:r>
             <a:r>
               <a:rPr lang="ko-KR" altLang="en-US" sz="1400" dirty="0">
@@ -16243,27 +15924,9 @@
                 </a:solidFill>
                 <a:latin typeface="맑은 고딕" panose="020B0503020000020004" pitchFamily="50" charset="-127"/>
               </a:rPr>
-              <a:t>각자</a:t>
-            </a:r>
-            <a:r>
-              <a:rPr lang="en-US" altLang="ko-KR" sz="1400" dirty="0">
-                <a:solidFill>
-                  <a:prstClr val="black"/>
-                </a:solidFill>
-                <a:latin typeface="맑은 고딕" panose="020B0503020000020004" pitchFamily="50" charset="-127"/>
-              </a:rPr>
-              <a:t>ID) branch</a:t>
-            </a:r>
-            <a:r>
-              <a:rPr lang="ko-KR" altLang="en-US" sz="1400" dirty="0">
-                <a:solidFill>
-                  <a:prstClr val="black"/>
-                </a:solidFill>
-                <a:latin typeface="맑은 고딕" panose="020B0503020000020004" pitchFamily="50" charset="-127"/>
-              </a:rPr>
               <a:t>에서 각자 개발한다 </a:t>
             </a:r>
-            <a:endParaRPr lang="en-US" altLang="ko-KR" sz="1400" dirty="0" smtClean="0">
+            <a:endParaRPr lang="en-US" altLang="ko-KR" sz="1400" dirty="0">
               <a:solidFill>
                 <a:prstClr val="black"/>
               </a:solidFill>
@@ -16283,16 +15946,16 @@
                 </a:solidFill>
                 <a:latin typeface="맑은 고딕" panose="020B0503020000020004" pitchFamily="50" charset="-127"/>
               </a:rPr>
-              <a:t> </a:t>
-            </a:r>
-            <a:r>
-              <a:rPr lang="en-US" altLang="ko-KR" sz="1400" dirty="0" smtClean="0">
+              <a:t> - Master branch</a:t>
+            </a:r>
+            <a:r>
+              <a:rPr lang="ko-KR" altLang="en-US" sz="1400" dirty="0">
                 <a:solidFill>
                   <a:prstClr val="black"/>
                 </a:solidFill>
                 <a:latin typeface="맑은 고딕" panose="020B0503020000020004" pitchFamily="50" charset="-127"/>
               </a:rPr>
-              <a:t>- Master </a:t>
+              <a:t>에 </a:t>
             </a:r>
             <a:r>
               <a:rPr lang="en-US" altLang="ko-KR" sz="1400" dirty="0">
@@ -16301,7 +15964,7 @@
                 </a:solidFill>
                 <a:latin typeface="맑은 고딕" panose="020B0503020000020004" pitchFamily="50" charset="-127"/>
               </a:rPr>
-              <a:t>branch</a:t>
+              <a:t>Merge </a:t>
             </a:r>
             <a:r>
               <a:rPr lang="ko-KR" altLang="en-US" sz="1400" dirty="0">
@@ -16310,27 +15973,9 @@
                 </a:solidFill>
                 <a:latin typeface="맑은 고딕" panose="020B0503020000020004" pitchFamily="50" charset="-127"/>
               </a:rPr>
-              <a:t>에 </a:t>
-            </a:r>
-            <a:r>
-              <a:rPr lang="en-US" altLang="ko-KR" sz="1400" dirty="0">
-                <a:solidFill>
-                  <a:prstClr val="black"/>
-                </a:solidFill>
-                <a:latin typeface="맑은 고딕" panose="020B0503020000020004" pitchFamily="50" charset="-127"/>
-              </a:rPr>
-              <a:t>Merge </a:t>
-            </a:r>
-            <a:r>
-              <a:rPr lang="ko-KR" altLang="en-US" sz="1400" dirty="0" smtClean="0">
-                <a:solidFill>
-                  <a:prstClr val="black"/>
-                </a:solidFill>
-                <a:latin typeface="맑은 고딕" panose="020B0503020000020004" pitchFamily="50" charset="-127"/>
-              </a:rPr>
               <a:t>한다</a:t>
             </a:r>
-            <a:endParaRPr lang="en-US" altLang="ko-KR" sz="1400" dirty="0" smtClean="0">
+            <a:endParaRPr lang="en-US" altLang="ko-KR" sz="1400" dirty="0">
               <a:solidFill>
                 <a:prstClr val="black"/>
               </a:solidFill>
@@ -16350,19 +15995,10 @@
                 </a:solidFill>
                 <a:latin typeface="맑은 고딕" panose="020B0503020000020004" pitchFamily="50" charset="-127"/>
               </a:rPr>
-              <a:t> </a:t>
-            </a:r>
-            <a:r>
-              <a:rPr lang="en-US" altLang="ko-KR" sz="1400" dirty="0" smtClean="0">
-                <a:solidFill>
-                  <a:prstClr val="black"/>
-                </a:solidFill>
-                <a:latin typeface="맑은 고딕" panose="020B0503020000020004" pitchFamily="50" charset="-127"/>
-              </a:rPr>
-              <a:t>- </a:t>
-            </a:r>
-            <a:r>
-              <a:rPr lang="ko-KR" altLang="en-US" sz="1400" dirty="0" smtClean="0">
+              <a:t> - </a:t>
+            </a:r>
+            <a:r>
+              <a:rPr lang="ko-KR" altLang="en-US" sz="1400" dirty="0">
                 <a:solidFill>
                   <a:prstClr val="black"/>
                 </a:solidFill>
@@ -16449,13 +16085,6 @@
   <p:clrMapOvr>
     <a:masterClrMapping/>
   </p:clrMapOvr>
-  <p:timing>
-    <p:tnLst>
-      <p:par>
-        <p:cTn id="1" dur="indefinite" restart="never" nodeType="tmRoot"/>
-      </p:par>
-    </p:tnLst>
-  </p:timing>
 </p:sld>
 </file>
 
@@ -16499,14 +16128,14 @@
           <a:lstStyle/>
           <a:p>
             <a:r>
-              <a:rPr lang="ko-KR" altLang="en-US" sz="2400" dirty="0" smtClean="0">
+              <a:rPr lang="ko-KR" altLang="en-US" sz="2400" dirty="0">
                 <a:latin typeface="HY견고딕" panose="02030600000101010101" pitchFamily="18" charset="-127"/>
                 <a:ea typeface="HY견고딕" panose="02030600000101010101" pitchFamily="18" charset="-127"/>
               </a:rPr>
               <a:t>세부 구현 </a:t>
             </a:r>
             <a:r>
-              <a:rPr lang="en-US" altLang="ko-KR" sz="2400" dirty="0" smtClean="0">
+              <a:rPr lang="en-US" altLang="ko-KR" sz="2400" dirty="0">
                 <a:latin typeface="HY견고딕" panose="02030600000101010101" pitchFamily="18" charset="-127"/>
                 <a:ea typeface="HY견고딕" panose="02030600000101010101" pitchFamily="18" charset="-127"/>
               </a:rPr>
@@ -16517,19 +16146,8 @@
                 <a:latin typeface="HY견고딕" panose="02030600000101010101" pitchFamily="18" charset="-127"/>
                 <a:ea typeface="HY견고딕" panose="02030600000101010101" pitchFamily="18" charset="-127"/>
               </a:rPr>
-              <a:t>요구사항 </a:t>
-            </a:r>
-            <a:r>
-              <a:rPr lang="ko-KR" altLang="en-US" sz="1800" dirty="0" smtClean="0">
-                <a:latin typeface="HY견고딕" panose="02030600000101010101" pitchFamily="18" charset="-127"/>
-                <a:ea typeface="HY견고딕" panose="02030600000101010101" pitchFamily="18" charset="-127"/>
-              </a:rPr>
-              <a:t>분석</a:t>
-            </a:r>
-            <a:endParaRPr lang="ko-KR" altLang="en-US" sz="1800" dirty="0">
-              <a:latin typeface="HY견고딕" panose="02030600000101010101" pitchFamily="18" charset="-127"/>
-              <a:ea typeface="HY견고딕" panose="02030600000101010101" pitchFamily="18" charset="-127"/>
-            </a:endParaRPr>
+              <a:t>요구사항 분석</a:t>
+            </a:r>
           </a:p>
         </p:txBody>
       </p:sp>
@@ -16600,16 +16218,9 @@
                 <a:latin typeface="HY견고딕" panose="02030600000101010101" pitchFamily="18" charset="-127"/>
                 <a:ea typeface="HY견고딕" panose="02030600000101010101" pitchFamily="18" charset="-127"/>
               </a:rPr>
-              <a:t>■ </a:t>
-            </a:r>
-            <a:r>
-              <a:rPr lang="ko-KR" altLang="en-US" sz="1400" dirty="0" smtClean="0">
-                <a:latin typeface="HY견고딕" panose="02030600000101010101" pitchFamily="18" charset="-127"/>
-                <a:ea typeface="HY견고딕" panose="02030600000101010101" pitchFamily="18" charset="-127"/>
-              </a:rPr>
-              <a:t>기능 요구 사항</a:t>
-            </a:r>
-            <a:endParaRPr lang="en-US" altLang="ko-KR" sz="1400" dirty="0" smtClean="0">
+              <a:t>■ 기능 요구 사항</a:t>
+            </a:r>
+            <a:endParaRPr lang="en-US" altLang="ko-KR" sz="1400" dirty="0">
               <a:latin typeface="HY견고딕" panose="02030600000101010101" pitchFamily="18" charset="-127"/>
               <a:ea typeface="HY견고딕" panose="02030600000101010101" pitchFamily="18" charset="-127"/>
             </a:endParaRPr>
@@ -16696,7 +16307,7 @@
               <a:buFont typeface="Wingdings" panose="05000000000000000000" pitchFamily="2" charset="2"/>
               <a:buChar char="§"/>
             </a:pPr>
-            <a:endParaRPr lang="en-US" altLang="ko-KR" b="1" dirty="0" smtClean="0">
+            <a:endParaRPr lang="en-US" altLang="ko-KR" b="1" dirty="0">
               <a:solidFill>
                 <a:srgbClr val="002060"/>
               </a:solidFill>
@@ -16715,7 +16326,7 @@
           </a:p>
           <a:p>
             <a:r>
-              <a:rPr lang="ko-KR" altLang="en-US" sz="1600" dirty="0" smtClean="0">
+              <a:rPr lang="ko-KR" altLang="en-US" sz="1600" dirty="0">
                 <a:latin typeface="HY견고딕" panose="02030600000101010101" pitchFamily="18" charset="-127"/>
                 <a:ea typeface="HY견고딕" panose="02030600000101010101" pitchFamily="18" charset="-127"/>
               </a:rPr>
@@ -16745,7 +16356,7 @@
         </p:nvGraphicFramePr>
         <p:xfrm>
           <a:off x="498258" y="1327005"/>
-          <a:ext cx="8536727" cy="1946415"/>
+          <a:ext cx="8536727" cy="1840308"/>
         </p:xfrm>
         <a:graphic>
           <a:graphicData uri="http://schemas.openxmlformats.org/drawingml/2006/table">
@@ -17600,10 +17211,9 @@
                     <a:p>
                       <a:pPr latinLnBrk="1"/>
                       <a:r>
-                        <a:rPr lang="ko-KR" altLang="en-US" sz="1200" dirty="0" smtClean="0"/>
+                        <a:rPr lang="ko-KR" altLang="en-US" sz="1200" dirty="0"/>
                         <a:t>옵션 처리</a:t>
                       </a:r>
-                      <a:endParaRPr lang="ko-KR" altLang="en-US" sz="1200" dirty="0"/>
                     </a:p>
                   </a:txBody>
                   <a:tcPr marL="68580" marR="68580" marT="34290" marB="34290">
@@ -17659,35 +17269,35 @@
                         </a:lnSpc>
                       </a:pPr>
                       <a:r>
-                        <a:rPr lang="ko-KR" altLang="en-US" sz="1200" dirty="0" smtClean="0"/>
+                        <a:rPr lang="ko-KR" altLang="en-US" sz="1200" dirty="0"/>
                         <a:t>옵션</a:t>
                       </a:r>
                       <a:r>
-                        <a:rPr lang="en-US" altLang="ko-KR" sz="1200" dirty="0" smtClean="0"/>
+                        <a:rPr lang="en-US" altLang="ko-KR" sz="1200" dirty="0"/>
                         <a:t>1, </a:t>
                       </a:r>
                       <a:r>
-                        <a:rPr lang="ko-KR" altLang="en-US" sz="1200" dirty="0" smtClean="0"/>
+                        <a:rPr lang="ko-KR" altLang="en-US" sz="1200" dirty="0"/>
                         <a:t>옵션</a:t>
                       </a:r>
                       <a:r>
-                        <a:rPr lang="en-US" altLang="ko-KR" sz="1200" dirty="0" smtClean="0"/>
+                        <a:rPr lang="en-US" altLang="ko-KR" sz="1200" dirty="0"/>
                         <a:t>2</a:t>
                       </a:r>
                       <a:r>
-                        <a:rPr lang="ko-KR" altLang="en-US" sz="1200" baseline="0" dirty="0" smtClean="0"/>
+                        <a:rPr lang="ko-KR" altLang="en-US" sz="1200" baseline="0" dirty="0"/>
                         <a:t>에 </a:t>
                       </a:r>
                       <a:r>
-                        <a:rPr lang="ko-KR" altLang="en-US" sz="1200" dirty="0" smtClean="0"/>
+                        <a:rPr lang="ko-KR" altLang="en-US" sz="1200" dirty="0"/>
                         <a:t>따라 사원 정보</a:t>
                       </a:r>
                       <a:r>
-                        <a:rPr lang="ko-KR" altLang="en-US" sz="1200" baseline="0" dirty="0" smtClean="0"/>
+                        <a:rPr lang="ko-KR" altLang="en-US" sz="1200" baseline="0" dirty="0"/>
                         <a:t> 추가를 제외한 다른 기능의 동작을 달라진다</a:t>
                       </a:r>
                       <a:r>
-                        <a:rPr lang="en-US" altLang="ko-KR" sz="1200" baseline="0" dirty="0" smtClean="0"/>
+                        <a:rPr lang="en-US" altLang="ko-KR" sz="1200" baseline="0" dirty="0"/>
                         <a:t>.</a:t>
                       </a:r>
                       <a:endParaRPr lang="ko-KR" altLang="en-US" sz="1200" dirty="0"/>
@@ -18326,13 +17936,6 @@
   <p:clrMapOvr>
     <a:masterClrMapping/>
   </p:clrMapOvr>
-  <p:timing>
-    <p:tnLst>
-      <p:par>
-        <p:cTn id="1" dur="indefinite" restart="never" nodeType="tmRoot"/>
-      </p:par>
-    </p:tnLst>
-  </p:timing>
 </p:sld>
 </file>
 
@@ -18385,28 +17988,14 @@
                 <a:latin typeface="HY견고딕" panose="02030600000101010101" pitchFamily="18" charset="-127"/>
                 <a:ea typeface="HY견고딕" panose="02030600000101010101" pitchFamily="18" charset="-127"/>
               </a:rPr>
-              <a:t>■ </a:t>
-            </a:r>
-            <a:r>
-              <a:rPr lang="ko-KR" altLang="en-US" sz="1400" dirty="0" smtClean="0">
+              <a:t>■ 설계 </a:t>
+            </a:r>
+            <a:r>
+              <a:rPr lang="en-US" altLang="ko-KR" sz="1400" dirty="0">
                 <a:latin typeface="HY견고딕" panose="02030600000101010101" pitchFamily="18" charset="-127"/>
                 <a:ea typeface="HY견고딕" panose="02030600000101010101" pitchFamily="18" charset="-127"/>
               </a:rPr>
-              <a:t>설계 </a:t>
-            </a:r>
-            <a:r>
-              <a:rPr lang="en-US" altLang="ko-KR" sz="1400" dirty="0" smtClean="0">
-                <a:latin typeface="HY견고딕" panose="02030600000101010101" pitchFamily="18" charset="-127"/>
-                <a:ea typeface="HY견고딕" panose="02030600000101010101" pitchFamily="18" charset="-127"/>
-              </a:rPr>
-              <a:t>D</a:t>
-            </a:r>
-            <a:r>
-              <a:rPr lang="en-US" altLang="ko-KR" sz="1400" dirty="0" smtClean="0">
-                <a:latin typeface="HY견고딕" panose="02030600000101010101" pitchFamily="18" charset="-127"/>
-                <a:ea typeface="HY견고딕" panose="02030600000101010101" pitchFamily="18" charset="-127"/>
-              </a:rPr>
-              <a:t>iagram</a:t>
+              <a:t>Diagram</a:t>
             </a:r>
           </a:p>
         </p:txBody>
@@ -18441,23 +18030,19 @@
               <a:t>세부 구현 </a:t>
             </a:r>
             <a:r>
-              <a:rPr lang="en-US" altLang="ko-KR" sz="2400" dirty="0" smtClean="0">
+              <a:rPr lang="en-US" altLang="ko-KR" sz="2400" dirty="0">
                 <a:latin typeface="HY견고딕" panose="02030600000101010101" pitchFamily="18" charset="-127"/>
                 <a:ea typeface="HY견고딕" panose="02030600000101010101" pitchFamily="18" charset="-127"/>
               </a:rPr>
               <a:t>| </a:t>
             </a:r>
             <a:r>
-              <a:rPr lang="ko-KR" altLang="en-US" sz="1800" dirty="0" smtClean="0">
+              <a:rPr lang="ko-KR" altLang="en-US" sz="1800" dirty="0">
                 <a:latin typeface="HY견고딕" panose="02030600000101010101" pitchFamily="18" charset="-127"/>
                 <a:ea typeface="HY견고딕" panose="02030600000101010101" pitchFamily="18" charset="-127"/>
               </a:rPr>
               <a:t>요구사항 분석 </a:t>
             </a:r>
-            <a:endParaRPr lang="ko-KR" altLang="en-US" sz="1800" dirty="0">
-              <a:latin typeface="HY견고딕" panose="02030600000101010101" pitchFamily="18" charset="-127"/>
-              <a:ea typeface="HY견고딕" panose="02030600000101010101" pitchFamily="18" charset="-127"/>
-            </a:endParaRPr>
           </a:p>
         </p:txBody>
       </p:sp>
@@ -18525,35 +18110,6 @@
           </a:ln>
         </p:spPr>
       </p:pic>
-      <p:pic>
-        <p:nvPicPr>
-          <p:cNvPr id="3" name="그림 2"/>
-          <p:cNvPicPr>
-            <a:picLocks noChangeAspect="1"/>
-          </p:cNvPicPr>
-          <p:nvPr/>
-        </p:nvPicPr>
-        <p:blipFill>
-          <a:blip r:embed="rId4"/>
-          <a:stretch>
-            <a:fillRect/>
-          </a:stretch>
-        </p:blipFill>
-        <p:spPr>
-          <a:xfrm>
-            <a:off x="5940152" y="1046045"/>
-            <a:ext cx="3011540" cy="4045985"/>
-          </a:xfrm>
-          <a:prstGeom prst="rect">
-            <a:avLst/>
-          </a:prstGeom>
-          <a:ln w="3175">
-            <a:solidFill>
-              <a:schemeClr val="tx1"/>
-            </a:solidFill>
-          </a:ln>
-        </p:spPr>
-      </p:pic>
       <p:sp>
         <p:nvSpPr>
           <p:cNvPr id="18" name="TextBox 17"/>
@@ -18582,7 +18138,7 @@
               </a:lnSpc>
             </a:pPr>
             <a:r>
-              <a:rPr lang="en-US" altLang="ko-KR" sz="1400" dirty="0" smtClean="0">
+              <a:rPr lang="en-US" altLang="ko-KR" sz="1400" dirty="0">
                 <a:solidFill>
                   <a:prstClr val="black"/>
                 </a:solidFill>
@@ -18590,12 +18146,6 @@
               </a:rPr>
               <a:t>- Activity Diagram</a:t>
             </a:r>
-            <a:endParaRPr lang="en-US" altLang="ko-KR" sz="1400" dirty="0" smtClean="0">
-              <a:solidFill>
-                <a:prstClr val="black"/>
-              </a:solidFill>
-              <a:latin typeface="맑은 고딕" panose="020B0503020000020004" pitchFamily="50" charset="-127"/>
-            </a:endParaRPr>
           </a:p>
         </p:txBody>
       </p:sp>
@@ -18627,7 +18177,7 @@
               </a:lnSpc>
             </a:pPr>
             <a:r>
-              <a:rPr lang="ko-KR" altLang="en-US" sz="1400" dirty="0" smtClean="0">
+              <a:rPr lang="ko-KR" altLang="en-US" sz="1400" dirty="0">
                 <a:solidFill>
                   <a:prstClr val="black"/>
                 </a:solidFill>
@@ -18636,7 +18186,7 @@
               <a:t> </a:t>
             </a:r>
             <a:r>
-              <a:rPr lang="en-US" altLang="ko-KR" sz="1400" dirty="0" smtClean="0">
+              <a:rPr lang="en-US" altLang="ko-KR" sz="1400" dirty="0">
                 <a:solidFill>
                   <a:prstClr val="black"/>
                 </a:solidFill>
@@ -18645,7 +18195,7 @@
               <a:t>- </a:t>
             </a:r>
             <a:r>
-              <a:rPr lang="ko-KR" altLang="en-US" sz="1400" dirty="0" smtClean="0">
+              <a:rPr lang="ko-KR" altLang="en-US" sz="1400" dirty="0">
                 <a:solidFill>
                   <a:prstClr val="black"/>
                 </a:solidFill>
@@ -18654,7 +18204,7 @@
               <a:t>협업하여 만드는 </a:t>
             </a:r>
             <a:r>
-              <a:rPr lang="en-US" altLang="ko-KR" sz="1400" dirty="0" smtClean="0">
+              <a:rPr lang="en-US" altLang="ko-KR" sz="1400" dirty="0">
                 <a:solidFill>
                   <a:prstClr val="black"/>
                 </a:solidFill>
@@ -18676,37 +18226,54 @@
                 </a:solidFill>
                 <a:latin typeface="맑은 고딕" panose="020B0503020000020004" pitchFamily="50" charset="-127"/>
               </a:rPr>
-              <a:t> </a:t>
-            </a:r>
-            <a:r>
-              <a:rPr lang="en-US" altLang="ko-KR" sz="1400" dirty="0" smtClean="0">
+              <a:t>   &gt; GitHub</a:t>
+            </a:r>
+            <a:r>
+              <a:rPr lang="ko-KR" altLang="en-US" sz="1400" dirty="0">
                 <a:solidFill>
                   <a:prstClr val="black"/>
                 </a:solidFill>
                 <a:latin typeface="맑은 고딕" panose="020B0503020000020004" pitchFamily="50" charset="-127"/>
               </a:rPr>
-              <a:t>  &gt; GitHub</a:t>
-            </a:r>
-            <a:r>
-              <a:rPr lang="ko-KR" altLang="en-US" sz="1400" dirty="0" smtClean="0">
+              <a:t>와 연동되어 공동작업이 가능한 도구를 </a:t>
+            </a:r>
+            <a:br>
+              <a:rPr lang="en-US" altLang="ko-KR" sz="1400" dirty="0">
                 <a:solidFill>
                   <a:prstClr val="black"/>
                 </a:solidFill>
                 <a:latin typeface="맑은 고딕" panose="020B0503020000020004" pitchFamily="50" charset="-127"/>
               </a:rPr>
-              <a:t>와 연동되어 공동작업이 가능한 도구를 </a:t>
-            </a:r>
-            <a:r>
-              <a:rPr lang="en-US" altLang="ko-KR" sz="1400" dirty="0" smtClean="0">
+            </a:br>
+            <a:r>
+              <a:rPr lang="en-US" altLang="ko-KR" sz="1400" dirty="0">
                 <a:solidFill>
                   <a:prstClr val="black"/>
                 </a:solidFill>
                 <a:latin typeface="맑은 고딕" panose="020B0503020000020004" pitchFamily="50" charset="-127"/>
               </a:rPr>
-              <a:t/>
+              <a:t>     </a:t>
+            </a:r>
+            <a:r>
+              <a:rPr lang="ko-KR" altLang="en-US" sz="1400" dirty="0">
+                <a:solidFill>
+                  <a:prstClr val="black"/>
+                </a:solidFill>
+                <a:latin typeface="맑은 고딕" panose="020B0503020000020004" pitchFamily="50" charset="-127"/>
+              </a:rPr>
+              <a:t>활용해 팀원들이 모두 함께 설계를 진행 </a:t>
+            </a:r>
+            <a:r>
+              <a:rPr lang="en-US" altLang="ko-KR" sz="1400" dirty="0">
+                <a:solidFill>
+                  <a:prstClr val="black"/>
+                </a:solidFill>
+                <a:latin typeface="맑은 고딕" panose="020B0503020000020004" pitchFamily="50" charset="-127"/>
+              </a:rPr>
+              <a:t>    </a:t>
             </a:r>
             <a:br>
-              <a:rPr lang="en-US" altLang="ko-KR" sz="1400" dirty="0" smtClean="0">
+              <a:rPr lang="en-US" altLang="ko-KR" sz="1400" dirty="0">
                 <a:solidFill>
                   <a:prstClr val="black"/>
                 </a:solidFill>
@@ -18714,80 +18281,25 @@
               </a:rPr>
             </a:br>
             <a:r>
-              <a:rPr lang="en-US" altLang="ko-KR" sz="1400" dirty="0" smtClean="0">
+              <a:rPr lang="en-US" altLang="ko-KR" sz="1400" dirty="0">
                 <a:solidFill>
                   <a:prstClr val="black"/>
                 </a:solidFill>
                 <a:latin typeface="맑은 고딕" panose="020B0503020000020004" pitchFamily="50" charset="-127"/>
               </a:rPr>
-              <a:t>     </a:t>
-            </a:r>
-            <a:r>
-              <a:rPr lang="ko-KR" altLang="en-US" sz="1400" dirty="0" smtClean="0">
+              <a:t>      </a:t>
+            </a:r>
+            <a:r>
+              <a:rPr lang="en-US" altLang="ko-KR" sz="1400" dirty="0">
                 <a:solidFill>
                   <a:prstClr val="black"/>
                 </a:solidFill>
                 <a:latin typeface="맑은 고딕" panose="020B0503020000020004" pitchFamily="50" charset="-127"/>
-              </a:rPr>
-              <a:t>활용해 팀원들이 모두 함께 설계를 진행 </a:t>
-            </a:r>
-            <a:r>
-              <a:rPr lang="en-US" altLang="ko-KR" sz="1400" dirty="0" smtClean="0">
-                <a:solidFill>
-                  <a:prstClr val="black"/>
-                </a:solidFill>
-                <a:latin typeface="맑은 고딕" panose="020B0503020000020004" pitchFamily="50" charset="-127"/>
-              </a:rPr>
-              <a:t>    </a:t>
-            </a:r>
-            <a:br>
-              <a:rPr lang="en-US" altLang="ko-KR" sz="1400" dirty="0" smtClean="0">
-                <a:solidFill>
-                  <a:prstClr val="black"/>
-                </a:solidFill>
-                <a:latin typeface="맑은 고딕" panose="020B0503020000020004" pitchFamily="50" charset="-127"/>
-              </a:rPr>
-            </a:br>
-            <a:r>
-              <a:rPr lang="en-US" altLang="ko-KR" sz="1400" dirty="0" smtClean="0">
-                <a:solidFill>
-                  <a:prstClr val="black"/>
-                </a:solidFill>
-                <a:latin typeface="맑은 고딕" panose="020B0503020000020004" pitchFamily="50" charset="-127"/>
-              </a:rPr>
-              <a:t>      </a:t>
-            </a:r>
-            <a:r>
-              <a:rPr lang="en-US" altLang="ko-KR" sz="1400" dirty="0" smtClean="0">
-                <a:solidFill>
-                  <a:prstClr val="black"/>
-                </a:solidFill>
-                <a:latin typeface="맑은 고딕" panose="020B0503020000020004" pitchFamily="50" charset="-127"/>
-                <a:hlinkClick r:id="rId5"/>
-              </a:rPr>
-              <a:t>https</a:t>
-            </a:r>
-            <a:r>
-              <a:rPr lang="en-US" altLang="ko-KR" sz="1400" dirty="0">
-                <a:solidFill>
-                  <a:prstClr val="black"/>
-                </a:solidFill>
-                <a:latin typeface="맑은 고딕" panose="020B0503020000020004" pitchFamily="50" charset="-127"/>
-                <a:hlinkClick r:id="rId5"/>
-              </a:rPr>
-              <a:t>://app.diagrams.net</a:t>
-            </a:r>
-            <a:r>
-              <a:rPr lang="en-US" altLang="ko-KR" sz="1400" dirty="0" smtClean="0">
-                <a:solidFill>
-                  <a:prstClr val="black"/>
-                </a:solidFill>
-                <a:latin typeface="맑은 고딕" panose="020B0503020000020004" pitchFamily="50" charset="-127"/>
-                <a:hlinkClick r:id="rId5"/>
-              </a:rPr>
-              <a:t>/</a:t>
-            </a:r>
-            <a:endParaRPr lang="en-US" altLang="ko-KR" sz="1400" dirty="0" smtClean="0">
+                <a:hlinkClick r:id="rId4"/>
+              </a:rPr>
+              <a:t>https://app.diagrams.net/</a:t>
+            </a:r>
+            <a:endParaRPr lang="en-US" altLang="ko-KR" sz="1400" dirty="0">
               <a:solidFill>
                 <a:prstClr val="black"/>
               </a:solidFill>
@@ -18805,7 +18317,7 @@
           <p:nvPr/>
         </p:nvPicPr>
         <p:blipFill rotWithShape="1">
-          <a:blip r:embed="rId6"/>
+          <a:blip r:embed="rId5"/>
           <a:srcRect l="6911" t="16257" r="27312" b="12859"/>
           <a:stretch/>
         </p:blipFill>
@@ -18863,6 +18375,41 @@
           </a:p>
         </p:txBody>
       </p:sp>
+      <p:pic>
+        <p:nvPicPr>
+          <p:cNvPr id="8" name="그림 7">
+            <a:extLst>
+              <a:ext uri="{FF2B5EF4-FFF2-40B4-BE49-F238E27FC236}">
+                <a16:creationId xmlns:a16="http://schemas.microsoft.com/office/drawing/2014/main" id="{C986E152-6DE8-48A5-A0D6-AF17B7074845}"/>
+              </a:ext>
+            </a:extLst>
+          </p:cNvPr>
+          <p:cNvPicPr>
+            <a:picLocks noChangeAspect="1"/>
+          </p:cNvPicPr>
+          <p:nvPr/>
+        </p:nvPicPr>
+        <p:blipFill>
+          <a:blip r:embed="rId6"/>
+          <a:stretch>
+            <a:fillRect/>
+          </a:stretch>
+        </p:blipFill>
+        <p:spPr>
+          <a:xfrm>
+            <a:off x="6079090" y="1027879"/>
+            <a:ext cx="2930312" cy="4064151"/>
+          </a:xfrm>
+          <a:prstGeom prst="rect">
+            <a:avLst/>
+          </a:prstGeom>
+          <a:ln w="3175">
+            <a:solidFill>
+              <a:schemeClr val="tx1"/>
+            </a:solidFill>
+          </a:ln>
+        </p:spPr>
+      </p:pic>
     </p:spTree>
     <p:extLst>
       <p:ext uri="{BB962C8B-B14F-4D97-AF65-F5344CB8AC3E}">
@@ -18873,13 +18420,6 @@
   <p:clrMapOvr>
     <a:masterClrMapping/>
   </p:clrMapOvr>
-  <p:timing>
-    <p:tnLst>
-      <p:par>
-        <p:cTn id="1" dur="indefinite" restart="never" nodeType="tmRoot"/>
-      </p:par>
-    </p:tnLst>
-  </p:timing>
 </p:sld>
 </file>
 
@@ -18932,14 +18472,7 @@
                 <a:latin typeface="HY견고딕" panose="02030600000101010101" pitchFamily="18" charset="-127"/>
                 <a:ea typeface="HY견고딕" panose="02030600000101010101" pitchFamily="18" charset="-127"/>
               </a:rPr>
-              <a:t>■ </a:t>
-            </a:r>
-            <a:r>
-              <a:rPr lang="ko-KR" altLang="en-US" sz="1400" dirty="0">
-                <a:latin typeface="HY견고딕" panose="02030600000101010101" pitchFamily="18" charset="-127"/>
-                <a:ea typeface="HY견고딕" panose="02030600000101010101" pitchFamily="18" charset="-127"/>
-              </a:rPr>
-              <a:t>설계 </a:t>
+              <a:t>■ 설계 </a:t>
             </a:r>
             <a:r>
               <a:rPr lang="en-US" altLang="ko-KR" sz="1400" dirty="0">
@@ -18955,7 +18488,7 @@
                 <a:spcPct val="250000"/>
               </a:lnSpc>
             </a:pPr>
-            <a:endParaRPr lang="en-US" altLang="ko-KR" sz="1400" dirty="0" smtClean="0">
+            <a:endParaRPr lang="en-US" altLang="ko-KR" sz="1400" dirty="0">
               <a:latin typeface="HY견고딕" panose="02030600000101010101" pitchFamily="18" charset="-127"/>
               <a:ea typeface="HY견고딕" panose="02030600000101010101" pitchFamily="18" charset="-127"/>
             </a:endParaRPr>
@@ -18992,23 +18525,19 @@
               <a:t>세부 구현 </a:t>
             </a:r>
             <a:r>
-              <a:rPr lang="en-US" altLang="ko-KR" sz="2400" dirty="0" smtClean="0">
+              <a:rPr lang="en-US" altLang="ko-KR" sz="2400" dirty="0">
                 <a:latin typeface="HY견고딕" panose="02030600000101010101" pitchFamily="18" charset="-127"/>
                 <a:ea typeface="HY견고딕" panose="02030600000101010101" pitchFamily="18" charset="-127"/>
               </a:rPr>
               <a:t>| </a:t>
             </a:r>
             <a:r>
-              <a:rPr lang="ko-KR" altLang="en-US" sz="1800" dirty="0" smtClean="0">
+              <a:rPr lang="ko-KR" altLang="en-US" sz="1800" dirty="0">
                 <a:latin typeface="HY견고딕" panose="02030600000101010101" pitchFamily="18" charset="-127"/>
                 <a:ea typeface="HY견고딕" panose="02030600000101010101" pitchFamily="18" charset="-127"/>
               </a:rPr>
               <a:t>요구사항 분석 </a:t>
             </a:r>
-            <a:endParaRPr lang="ko-KR" altLang="en-US" sz="1800" dirty="0">
-              <a:latin typeface="HY견고딕" panose="02030600000101010101" pitchFamily="18" charset="-127"/>
-              <a:ea typeface="HY견고딕" panose="02030600000101010101" pitchFamily="18" charset="-127"/>
-            </a:endParaRPr>
           </a:p>
         </p:txBody>
       </p:sp>
@@ -19075,7 +18604,7 @@
               </a:lnSpc>
             </a:pPr>
             <a:r>
-              <a:rPr lang="en-US" altLang="ko-KR" sz="1400" dirty="0" smtClean="0">
+              <a:rPr lang="en-US" altLang="ko-KR" sz="1400" dirty="0">
                 <a:solidFill>
                   <a:prstClr val="black"/>
                 </a:solidFill>
@@ -19083,18 +18612,18 @@
               </a:rPr>
               <a:t>- Class Diagram</a:t>
             </a:r>
-            <a:endParaRPr lang="en-US" altLang="ko-KR" sz="1400" dirty="0" smtClean="0">
-              <a:solidFill>
-                <a:prstClr val="black"/>
-              </a:solidFill>
-              <a:latin typeface="맑은 고딕" panose="020B0503020000020004" pitchFamily="50" charset="-127"/>
-            </a:endParaRPr>
           </a:p>
         </p:txBody>
       </p:sp>
       <p:pic>
         <p:nvPicPr>
-          <p:cNvPr id="5" name="그림 4"/>
+          <p:cNvPr id="7" name="그림 6">
+            <a:extLst>
+              <a:ext uri="{FF2B5EF4-FFF2-40B4-BE49-F238E27FC236}">
+                <a16:creationId xmlns:a16="http://schemas.microsoft.com/office/drawing/2014/main" id="{D697B094-65D3-4DF5-9480-22BF5908877D}"/>
+              </a:ext>
+            </a:extLst>
+          </p:cNvPr>
           <p:cNvPicPr>
             <a:picLocks noChangeAspect="1"/>
           </p:cNvPicPr>
@@ -19108,8 +18637,8 @@
         </p:blipFill>
         <p:spPr>
           <a:xfrm>
-            <a:off x="2223375" y="627534"/>
-            <a:ext cx="6379739" cy="4536504"/>
+            <a:off x="2843808" y="555526"/>
+            <a:ext cx="6022321" cy="4466236"/>
           </a:xfrm>
           <a:prstGeom prst="rect">
             <a:avLst/>
@@ -19131,13 +18660,6 @@
   <p:clrMapOvr>
     <a:masterClrMapping/>
   </p:clrMapOvr>
-  <p:timing>
-    <p:tnLst>
-      <p:par>
-        <p:cTn id="1" dur="indefinite" restart="never" nodeType="tmRoot"/>
-      </p:par>
-    </p:tnLst>
-  </p:timing>
 </p:sld>
 </file>
 
@@ -19223,23 +18745,19 @@
               <a:t>세부 구현 </a:t>
             </a:r>
             <a:r>
-              <a:rPr lang="en-US" altLang="ko-KR" sz="2400" dirty="0" smtClean="0">
+              <a:rPr lang="en-US" altLang="ko-KR" sz="2400" dirty="0">
                 <a:latin typeface="HY견고딕" panose="02030600000101010101" pitchFamily="18" charset="-127"/>
                 <a:ea typeface="HY견고딕" panose="02030600000101010101" pitchFamily="18" charset="-127"/>
               </a:rPr>
               <a:t>| </a:t>
             </a:r>
             <a:r>
-              <a:rPr lang="ko-KR" altLang="en-US" sz="1800" dirty="0" smtClean="0">
+              <a:rPr lang="ko-KR" altLang="en-US" sz="1800" dirty="0">
                 <a:latin typeface="HY견고딕" panose="02030600000101010101" pitchFamily="18" charset="-127"/>
                 <a:ea typeface="HY견고딕" panose="02030600000101010101" pitchFamily="18" charset="-127"/>
               </a:rPr>
               <a:t>요구사항 분배</a:t>
             </a:r>
-            <a:endParaRPr lang="ko-KR" altLang="en-US" sz="1800" dirty="0">
-              <a:latin typeface="HY견고딕" panose="02030600000101010101" pitchFamily="18" charset="-127"/>
-              <a:ea typeface="HY견고딕" panose="02030600000101010101" pitchFamily="18" charset="-127"/>
-            </a:endParaRPr>
           </a:p>
         </p:txBody>
       </p:sp>
@@ -19277,19 +18795,9 @@
                 <a:latin typeface="HY견고딕" panose="02030600000101010101" pitchFamily="18" charset="-127"/>
                 <a:ea typeface="HY견고딕" panose="02030600000101010101" pitchFamily="18" charset="-127"/>
               </a:rPr>
-              <a:t>■ </a:t>
-            </a:r>
-            <a:r>
-              <a:rPr lang="ko-KR" altLang="en-US" sz="1600" b="1" dirty="0" smtClean="0">
-                <a:solidFill>
-                  <a:prstClr val="black"/>
-                </a:solidFill>
-                <a:latin typeface="HY견고딕" panose="02030600000101010101" pitchFamily="18" charset="-127"/>
-                <a:ea typeface="HY견고딕" panose="02030600000101010101" pitchFamily="18" charset="-127"/>
-              </a:rPr>
-              <a:t>요구사항 분배</a:t>
-            </a:r>
-            <a:endParaRPr lang="en-US" altLang="ko-KR" sz="1600" b="1" dirty="0" smtClean="0">
+              <a:t>■ 요구사항 분배</a:t>
+            </a:r>
+            <a:endParaRPr lang="en-US" altLang="ko-KR" sz="1600" b="1" dirty="0">
               <a:solidFill>
                 <a:prstClr val="black"/>
               </a:solidFill>
@@ -19304,51 +18812,42 @@
               </a:lnSpc>
             </a:pPr>
             <a:r>
-              <a:rPr lang="en-US" altLang="ko-KR" sz="1600" dirty="0" smtClean="0">
+              <a:rPr lang="en-US" altLang="ko-KR" sz="1600" dirty="0">
                 <a:solidFill>
                   <a:prstClr val="black"/>
                 </a:solidFill>
                 <a:latin typeface="맑은 고딕" panose="020B0503020000020004" pitchFamily="50" charset="-127"/>
               </a:rPr>
-              <a:t>  - </a:t>
-            </a:r>
-            <a:r>
-              <a:rPr lang="en-US" altLang="ko-KR" sz="1600" dirty="0" smtClean="0">
+              <a:t>  - Class Diagram</a:t>
+            </a:r>
+            <a:r>
+              <a:rPr lang="ko-KR" altLang="en-US" sz="1600" dirty="0">
                 <a:solidFill>
                   <a:prstClr val="black"/>
                 </a:solidFill>
                 <a:latin typeface="맑은 고딕" panose="020B0503020000020004" pitchFamily="50" charset="-127"/>
               </a:rPr>
-              <a:t>Class Diagram</a:t>
-            </a:r>
-            <a:r>
-              <a:rPr lang="ko-KR" altLang="en-US" sz="1600" dirty="0" smtClean="0">
+              <a:t>에 따라 큰 </a:t>
+            </a:r>
+            <a:r>
+              <a:rPr lang="en-US" altLang="ko-KR" sz="1600" dirty="0">
                 <a:solidFill>
                   <a:prstClr val="black"/>
                 </a:solidFill>
                 <a:latin typeface="맑은 고딕" panose="020B0503020000020004" pitchFamily="50" charset="-127"/>
               </a:rPr>
-              <a:t>에 따라 큰 </a:t>
-            </a:r>
-            <a:r>
-              <a:rPr lang="en-US" altLang="ko-KR" sz="1600" dirty="0" smtClean="0">
+              <a:t>Class </a:t>
+            </a:r>
+            <a:r>
+              <a:rPr lang="ko-KR" altLang="en-US" sz="1600" dirty="0">
                 <a:solidFill>
                   <a:prstClr val="black"/>
                 </a:solidFill>
                 <a:latin typeface="맑은 고딕" panose="020B0503020000020004" pitchFamily="50" charset="-127"/>
               </a:rPr>
-              <a:t>Class </a:t>
-            </a:r>
-            <a:r>
-              <a:rPr lang="ko-KR" altLang="en-US" sz="1600" dirty="0" smtClean="0">
-                <a:solidFill>
-                  <a:prstClr val="black"/>
-                </a:solidFill>
-                <a:latin typeface="맑은 고딕" panose="020B0503020000020004" pitchFamily="50" charset="-127"/>
-              </a:rPr>
               <a:t>별로 담당자 설정</a:t>
             </a:r>
-            <a:endParaRPr lang="en-US" altLang="ko-KR" sz="1600" dirty="0" smtClean="0">
+            <a:endParaRPr lang="en-US" altLang="ko-KR" sz="1600" dirty="0">
               <a:solidFill>
                 <a:prstClr val="black"/>
               </a:solidFill>
@@ -19362,7 +18861,7 @@
               </a:lnSpc>
             </a:pPr>
             <a:r>
-              <a:rPr lang="ko-KR" altLang="en-US" sz="1600" dirty="0" smtClean="0">
+              <a:rPr lang="ko-KR" altLang="en-US" sz="1600" dirty="0">
                 <a:solidFill>
                   <a:prstClr val="black"/>
                 </a:solidFill>
@@ -19371,7 +18870,7 @@
               <a:t>  </a:t>
             </a:r>
             <a:r>
-              <a:rPr lang="en-US" altLang="ko-KR" sz="1600" dirty="0" smtClean="0">
+              <a:rPr lang="en-US" altLang="ko-KR" sz="1600" dirty="0">
                 <a:solidFill>
                   <a:prstClr val="black"/>
                 </a:solidFill>
@@ -19380,7 +18879,7 @@
               <a:t>- </a:t>
             </a:r>
             <a:r>
-              <a:rPr lang="ko-KR" altLang="en-US" sz="1600" dirty="0" smtClean="0">
+              <a:rPr lang="ko-KR" altLang="en-US" sz="1600" dirty="0">
                 <a:solidFill>
                   <a:prstClr val="black"/>
                 </a:solidFill>
@@ -19406,14 +18905,14 @@
           <p:nvPr>
             <p:extLst>
               <p:ext uri="{D42A27DB-BD31-4B8C-83A1-F6EECF244321}">
-                <p14:modId xmlns:p14="http://schemas.microsoft.com/office/powerpoint/2010/main" val="1224693203"/>
+                <p14:modId xmlns:p14="http://schemas.microsoft.com/office/powerpoint/2010/main" val="914449641"/>
               </p:ext>
             </p:extLst>
           </p:nvPr>
         </p:nvGraphicFramePr>
         <p:xfrm>
           <a:off x="539552" y="2139702"/>
-          <a:ext cx="5040560" cy="1323141"/>
+          <a:ext cx="5040560" cy="1303774"/>
         </p:xfrm>
         <a:graphic>
           <a:graphicData uri="http://schemas.openxmlformats.org/drawingml/2006/table">
@@ -19429,14 +18928,14 @@
                     </a:ext>
                   </a:extLst>
                 </a:gridCol>
-                <a:gridCol w="1728192">
+                <a:gridCol w="1944216">
                   <a:extLst>
                     <a:ext uri="{9D8B030D-6E8A-4147-A177-3AD203B41FA5}">
                       <a16:colId xmlns:a16="http://schemas.microsoft.com/office/drawing/2014/main" val="1626637998"/>
                     </a:ext>
                   </a:extLst>
                 </a:gridCol>
-                <a:gridCol w="2304256">
+                <a:gridCol w="2088232">
                   <a:extLst>
                     <a:ext uri="{9D8B030D-6E8A-4147-A177-3AD203B41FA5}">
                       <a16:colId xmlns:a16="http://schemas.microsoft.com/office/drawing/2014/main" val="4250718882"/>
@@ -19528,7 +19027,7 @@
                         <a:defRPr/>
                       </a:pPr>
                       <a:r>
-                        <a:rPr lang="ko-KR" altLang="en-US" sz="1200" b="0" kern="100" dirty="0" smtClean="0">
+                        <a:rPr lang="ko-KR" altLang="en-US" sz="1200" b="0" kern="100" dirty="0">
                           <a:solidFill>
                             <a:srgbClr val="000000"/>
                           </a:solidFill>
@@ -19586,7 +19085,7 @@
                         <a:defRPr/>
                       </a:pPr>
                       <a:r>
-                        <a:rPr lang="en-US" altLang="ko-KR" sz="1200" b="0" kern="100" dirty="0" smtClean="0">
+                        <a:rPr lang="en-US" altLang="ko-KR" sz="1200" b="0" kern="100" dirty="0">
                           <a:solidFill>
                             <a:srgbClr val="000000"/>
                           </a:solidFill>
@@ -19633,7 +19132,7 @@
                         <a:defRPr/>
                       </a:pPr>
                       <a:r>
-                        <a:rPr lang="en-US" altLang="ko-KR" sz="1200" b="0" kern="100" dirty="0" err="1" smtClean="0">
+                        <a:rPr lang="en-US" altLang="ko-KR" sz="1200" b="0" kern="100" dirty="0" err="1">
                           <a:solidFill>
                             <a:srgbClr val="000000"/>
                           </a:solidFill>
@@ -19680,7 +19179,7 @@
                         <a:defRPr/>
                       </a:pPr>
                       <a:r>
-                        <a:rPr lang="ko-KR" altLang="en-US" sz="1200" b="0" kern="100" dirty="0" err="1" smtClean="0">
+                        <a:rPr lang="ko-KR" altLang="en-US" sz="1200" b="0" kern="100" dirty="0" err="1">
                           <a:solidFill>
                             <a:srgbClr val="000000"/>
                           </a:solidFill>
@@ -19769,7 +19268,7 @@
                         <a:defRPr/>
                       </a:pPr>
                       <a:r>
-                        <a:rPr lang="en-US" altLang="ko-KR" sz="1200" b="0" kern="100" dirty="0" smtClean="0">
+                        <a:rPr lang="en-US" altLang="ko-KR" sz="1200" b="0" kern="100" dirty="0">
                           <a:solidFill>
                             <a:srgbClr val="000000"/>
                           </a:solidFill>
@@ -19816,7 +19315,7 @@
                         <a:defRPr/>
                       </a:pPr>
                       <a:r>
-                        <a:rPr lang="ko-KR" altLang="en-US" sz="1200" b="0" kern="100" dirty="0" err="1" smtClean="0">
+                        <a:rPr lang="ko-KR" altLang="en-US" sz="1200" b="0" kern="100" dirty="0" err="1">
                           <a:solidFill>
                             <a:srgbClr val="000000"/>
                           </a:solidFill>
@@ -19905,7 +19404,7 @@
                         <a:defRPr/>
                       </a:pPr>
                       <a:r>
-                        <a:rPr lang="en-US" altLang="ko-KR" sz="1200" b="0" kern="100" dirty="0" smtClean="0">
+                        <a:rPr lang="en-US" altLang="ko-KR" sz="1200" b="0" kern="100" dirty="0">
                           <a:solidFill>
                             <a:srgbClr val="000000"/>
                           </a:solidFill>
@@ -19952,7 +19451,7 @@
                         <a:defRPr/>
                       </a:pPr>
                       <a:r>
-                        <a:rPr lang="ko-KR" altLang="en-US" sz="1200" b="0" kern="100" dirty="0" err="1" smtClean="0">
+                        <a:rPr lang="ko-KR" altLang="en-US" sz="1200" b="0" kern="100" dirty="0" err="1">
                           <a:solidFill>
                             <a:srgbClr val="000000"/>
                           </a:solidFill>
@@ -20041,7 +19540,7 @@
                         <a:defRPr/>
                       </a:pPr>
                       <a:r>
-                        <a:rPr lang="en-US" altLang="ko-KR" sz="1200" b="0" kern="100" dirty="0" smtClean="0">
+                        <a:rPr lang="en-US" altLang="ko-KR" sz="1200" b="0" kern="100" dirty="0">
                           <a:solidFill>
                             <a:srgbClr val="000000"/>
                           </a:solidFill>
@@ -20050,7 +19549,19 @@
                           <a:ea typeface="+mn-ea"/>
                           <a:cs typeface="Times New Roman" panose="02020603050405020304" pitchFamily="18" charset="0"/>
                         </a:rPr>
-                        <a:t>Employment</a:t>
+                        <a:t>Employment/</a:t>
+                      </a:r>
+                      <a:r>
+                        <a:rPr lang="en-US" altLang="ko-KR" sz="1200" b="0" kern="100" dirty="0" err="1">
+                          <a:solidFill>
+                            <a:srgbClr val="000000"/>
+                          </a:solidFill>
+                          <a:effectLst/>
+                          <a:latin typeface="+mn-lt"/>
+                          <a:ea typeface="+mn-ea"/>
+                          <a:cs typeface="Times New Roman" panose="02020603050405020304" pitchFamily="18" charset="0"/>
+                        </a:rPr>
+                        <a:t>VaildChecker</a:t>
                       </a:r>
                       <a:endParaRPr lang="ko-KR" sz="1200" b="0" kern="100" dirty="0">
                         <a:solidFill>
@@ -20088,7 +19599,7 @@
                         <a:defRPr/>
                       </a:pPr>
                       <a:r>
-                        <a:rPr lang="ko-KR" altLang="en-US" sz="1200" b="0" kern="100" dirty="0" smtClean="0">
+                        <a:rPr lang="ko-KR" altLang="en-US" sz="1200" b="0" kern="100" dirty="0">
                           <a:solidFill>
                             <a:srgbClr val="000000"/>
                           </a:solidFill>
@@ -20099,15 +19610,6 @@
                         </a:rPr>
                         <a:t>김현진</a:t>
                       </a:r>
-                      <a:endParaRPr lang="ko-KR" altLang="en-US" sz="1200" b="0" kern="100" dirty="0">
-                        <a:solidFill>
-                          <a:srgbClr val="000000"/>
-                        </a:solidFill>
-                        <a:effectLst/>
-                        <a:latin typeface="+mn-lt"/>
-                        <a:ea typeface="+mn-ea"/>
-                        <a:cs typeface="Times New Roman" panose="02020603050405020304" pitchFamily="18" charset="0"/>
-                      </a:endParaRPr>
                     </a:p>
                   </a:txBody>
                   <a:tcPr marL="33231" marR="33231" marT="17994" marB="17994" anchor="ctr" horzOverflow="overflow"/>
@@ -20132,13 +19634,6 @@
   <p:clrMapOvr>
     <a:masterClrMapping/>
   </p:clrMapOvr>
-  <p:timing>
-    <p:tnLst>
-      <p:par>
-        <p:cTn id="1" dur="indefinite" restart="never" nodeType="tmRoot"/>
-      </p:par>
-    </p:tnLst>
-  </p:timing>
 </p:sld>
 </file>
 
@@ -20217,21 +19712,21 @@
           <a:lstStyle/>
           <a:p>
             <a:r>
-              <a:rPr lang="ko-KR" altLang="en-US" sz="2400" dirty="0" smtClean="0">
+              <a:rPr lang="ko-KR" altLang="en-US" sz="2400" dirty="0">
                 <a:latin typeface="HY견고딕" panose="02030600000101010101" pitchFamily="18" charset="-127"/>
                 <a:ea typeface="HY견고딕" panose="02030600000101010101" pitchFamily="18" charset="-127"/>
               </a:rPr>
               <a:t>세부 구현 </a:t>
             </a:r>
             <a:r>
-              <a:rPr lang="en-US" altLang="ko-KR" sz="2400" dirty="0" smtClean="0">
+              <a:rPr lang="en-US" altLang="ko-KR" sz="2400" dirty="0">
                 <a:latin typeface="HY견고딕" panose="02030600000101010101" pitchFamily="18" charset="-127"/>
                 <a:ea typeface="HY견고딕" panose="02030600000101010101" pitchFamily="18" charset="-127"/>
               </a:rPr>
               <a:t>| TDD </a:t>
             </a:r>
             <a:r>
-              <a:rPr lang="ko-KR" altLang="en-US" sz="2400" dirty="0" smtClean="0">
+              <a:rPr lang="ko-KR" altLang="en-US" sz="2400" dirty="0">
                 <a:latin typeface="HY견고딕" panose="02030600000101010101" pitchFamily="18" charset="-127"/>
                 <a:ea typeface="HY견고딕" panose="02030600000101010101" pitchFamily="18" charset="-127"/>
               </a:rPr>
@@ -20310,46 +19805,36 @@
               </a:lnSpc>
             </a:pPr>
             <a:r>
-              <a:rPr lang="ko-KR" altLang="en-US" sz="1600" b="1" dirty="0" smtClean="0">
+              <a:rPr lang="ko-KR" altLang="en-US" sz="1600" b="1" dirty="0">
                 <a:solidFill>
                   <a:prstClr val="black"/>
                 </a:solidFill>
                 <a:latin typeface="HY견고딕" panose="02030600000101010101" pitchFamily="18" charset="-127"/>
                 <a:ea typeface="HY견고딕" panose="02030600000101010101" pitchFamily="18" charset="-127"/>
               </a:rPr>
-              <a:t>■</a:t>
-            </a:r>
-            <a:r>
-              <a:rPr lang="ko-KR" altLang="en-US" sz="1600" b="1" dirty="0">
+              <a:t>■ </a:t>
+            </a:r>
+            <a:r>
+              <a:rPr lang="en-US" altLang="ko-KR" sz="1600" b="1" dirty="0">
                 <a:solidFill>
                   <a:prstClr val="black"/>
                 </a:solidFill>
                 <a:latin typeface="HY견고딕" panose="02030600000101010101" pitchFamily="18" charset="-127"/>
                 <a:ea typeface="HY견고딕" panose="02030600000101010101" pitchFamily="18" charset="-127"/>
               </a:rPr>
-              <a:t> </a:t>
-            </a:r>
-            <a:r>
-              <a:rPr lang="en-US" altLang="ko-KR" sz="1600" b="1" dirty="0" smtClean="0">
+              <a:t>Test Code </a:t>
+            </a:r>
+            <a:r>
+              <a:rPr lang="ko-KR" altLang="en-US" sz="1600" b="1" dirty="0">
                 <a:solidFill>
                   <a:prstClr val="black"/>
                 </a:solidFill>
                 <a:latin typeface="HY견고딕" panose="02030600000101010101" pitchFamily="18" charset="-127"/>
                 <a:ea typeface="HY견고딕" panose="02030600000101010101" pitchFamily="18" charset="-127"/>
               </a:rPr>
-              <a:t>Test Code </a:t>
-            </a:r>
-            <a:r>
-              <a:rPr lang="ko-KR" altLang="en-US" sz="1600" b="1" dirty="0" smtClean="0">
-                <a:solidFill>
-                  <a:prstClr val="black"/>
-                </a:solidFill>
-                <a:latin typeface="HY견고딕" panose="02030600000101010101" pitchFamily="18" charset="-127"/>
-                <a:ea typeface="HY견고딕" panose="02030600000101010101" pitchFamily="18" charset="-127"/>
-              </a:rPr>
               <a:t>작성 </a:t>
             </a:r>
-            <a:endParaRPr lang="en-US" altLang="ko-KR" sz="1600" b="1" dirty="0" smtClean="0">
+            <a:endParaRPr lang="en-US" altLang="ko-KR" sz="1600" b="1" dirty="0">
               <a:solidFill>
                 <a:prstClr val="black"/>
               </a:solidFill>
@@ -20364,7 +19849,7 @@
               </a:lnSpc>
             </a:pPr>
             <a:r>
-              <a:rPr lang="en-US" altLang="ko-KR" sz="1600" dirty="0" smtClean="0">
+              <a:rPr lang="en-US" altLang="ko-KR" sz="1600" dirty="0">
                 <a:solidFill>
                   <a:prstClr val="black"/>
                 </a:solidFill>
@@ -20372,7 +19857,39 @@
               </a:rPr>
               <a:t>  -</a:t>
             </a:r>
-            <a:endParaRPr lang="en-US" altLang="ko-KR" sz="1600" dirty="0" smtClean="0">
+          </a:p>
+          <a:p>
+            <a:pPr defTabSz="779233">
+              <a:lnSpc>
+                <a:spcPct val="150000"/>
+              </a:lnSpc>
+            </a:pPr>
+            <a:r>
+              <a:rPr lang="ko-KR" altLang="en-US" sz="1600" dirty="0">
+                <a:solidFill>
+                  <a:prstClr val="black"/>
+                </a:solidFill>
+                <a:latin typeface="맑은 고딕" panose="020B0503020000020004" pitchFamily="50" charset="-127"/>
+              </a:rPr>
+              <a:t>  </a:t>
+            </a:r>
+            <a:r>
+              <a:rPr lang="en-US" altLang="ko-KR" sz="1600" dirty="0">
+                <a:solidFill>
+                  <a:prstClr val="black"/>
+                </a:solidFill>
+                <a:latin typeface="맑은 고딕" panose="020B0503020000020004" pitchFamily="50" charset="-127"/>
+              </a:rPr>
+              <a:t>-</a:t>
+            </a:r>
+          </a:p>
+          <a:p>
+            <a:pPr defTabSz="779233">
+              <a:lnSpc>
+                <a:spcPct val="150000"/>
+              </a:lnSpc>
+            </a:pPr>
+            <a:endParaRPr lang="en-US" altLang="ko-KR" sz="1600" dirty="0">
               <a:solidFill>
                 <a:prstClr val="black"/>
               </a:solidFill>
@@ -20386,44 +19903,6 @@
               </a:lnSpc>
             </a:pPr>
             <a:r>
-              <a:rPr lang="ko-KR" altLang="en-US" sz="1600" dirty="0" smtClean="0">
-                <a:solidFill>
-                  <a:prstClr val="black"/>
-                </a:solidFill>
-                <a:latin typeface="맑은 고딕" panose="020B0503020000020004" pitchFamily="50" charset="-127"/>
-              </a:rPr>
-              <a:t>  </a:t>
-            </a:r>
-            <a:r>
-              <a:rPr lang="en-US" altLang="ko-KR" sz="1600" dirty="0" smtClean="0">
-                <a:solidFill>
-                  <a:prstClr val="black"/>
-                </a:solidFill>
-                <a:latin typeface="맑은 고딕" panose="020B0503020000020004" pitchFamily="50" charset="-127"/>
-              </a:rPr>
-              <a:t>-</a:t>
-            </a:r>
-          </a:p>
-          <a:p>
-            <a:pPr defTabSz="779233">
-              <a:lnSpc>
-                <a:spcPct val="150000"/>
-              </a:lnSpc>
-            </a:pPr>
-            <a:endParaRPr lang="en-US" altLang="ko-KR" sz="1600" dirty="0" smtClean="0">
-              <a:solidFill>
-                <a:prstClr val="black"/>
-              </a:solidFill>
-              <a:latin typeface="맑은 고딕" panose="020B0503020000020004" pitchFamily="50" charset="-127"/>
-            </a:endParaRPr>
-          </a:p>
-          <a:p>
-            <a:pPr defTabSz="779233">
-              <a:lnSpc>
-                <a:spcPct val="150000"/>
-              </a:lnSpc>
-            </a:pPr>
-            <a:r>
               <a:rPr lang="ko-KR" altLang="en-US" sz="1600" b="1" dirty="0">
                 <a:solidFill>
                   <a:prstClr val="black"/>
@@ -20434,7 +19913,7 @@
               <a:t>■ </a:t>
             </a:r>
             <a:r>
-              <a:rPr lang="en-US" altLang="ko-KR" sz="1600" b="1" dirty="0" err="1" smtClean="0">
+              <a:rPr lang="en-US" altLang="ko-KR" sz="1600" b="1" dirty="0" err="1">
                 <a:solidFill>
                   <a:prstClr val="black"/>
                 </a:solidFill>
@@ -20444,7 +19923,7 @@
               <a:t>Fexture</a:t>
             </a:r>
             <a:r>
-              <a:rPr lang="en-US" altLang="ko-KR" sz="1600" b="1" dirty="0" smtClean="0">
+              <a:rPr lang="en-US" altLang="ko-KR" sz="1600" b="1" dirty="0">
                 <a:solidFill>
                   <a:prstClr val="black"/>
                 </a:solidFill>
@@ -20454,7 +19933,7 @@
               <a:t> </a:t>
             </a:r>
             <a:r>
-              <a:rPr lang="ko-KR" altLang="en-US" sz="1600" b="1" dirty="0" smtClean="0">
+              <a:rPr lang="ko-KR" altLang="en-US" sz="1600" b="1" dirty="0">
                 <a:solidFill>
                   <a:prstClr val="black"/>
                 </a:solidFill>
@@ -20483,13 +19962,6 @@
   <p:clrMapOvr>
     <a:masterClrMapping/>
   </p:clrMapOvr>
-  <p:timing>
-    <p:tnLst>
-      <p:par>
-        <p:cTn id="1" dur="indefinite" restart="never" nodeType="tmRoot"/>
-      </p:par>
-    </p:tnLst>
-  </p:timing>
 </p:sld>
 </file>
 

</xml_diff>

<commit_message>
[Doc] Upload Team project document
</commit_message>
<xml_diff>
--- a/Doc/CRA팀프로젝트_22년_9차_H팀_Hit.pptx
+++ b/Doc/CRA팀프로젝트_22년_9차_H팀_Hit.pptx
@@ -5,7 +5,7 @@
     <p:sldMasterId id="2147483648" r:id="rId1"/>
   </p:sldMasterIdLst>
   <p:notesMasterIdLst>
-    <p:notesMasterId r:id="rId18"/>
+    <p:notesMasterId r:id="rId19"/>
   </p:notesMasterIdLst>
   <p:sldIdLst>
     <p:sldId id="276" r:id="rId2"/>
@@ -20,10 +20,11 @@
     <p:sldId id="299" r:id="rId11"/>
     <p:sldId id="301" r:id="rId12"/>
     <p:sldId id="300" r:id="rId13"/>
-    <p:sldId id="298" r:id="rId14"/>
-    <p:sldId id="296" r:id="rId15"/>
-    <p:sldId id="294" r:id="rId16"/>
-    <p:sldId id="295" r:id="rId17"/>
+    <p:sldId id="305" r:id="rId14"/>
+    <p:sldId id="303" r:id="rId15"/>
+    <p:sldId id="296" r:id="rId16"/>
+    <p:sldId id="294" r:id="rId17"/>
+    <p:sldId id="295" r:id="rId18"/>
   </p:sldIdLst>
   <p:sldSz cx="9144000" cy="5143500" type="screen16x9"/>
   <p:notesSz cx="9144000" cy="6858000"/>
@@ -223,7 +224,7 @@
           <a:p>
             <a:fld id="{3BF68A44-C92D-4D71-AA96-C74C05C3F2D0}" type="datetimeFigureOut">
               <a:rPr lang="ko-KR" altLang="en-US" smtClean="0"/>
-              <a:t>2022-04-04</a:t>
+              <a:t>2022-04-06</a:t>
             </a:fld>
             <a:endParaRPr lang="ko-KR" altLang="en-US" dirty="0"/>
           </a:p>
@@ -891,7 +892,7 @@
           <a:p>
             <a:fld id="{F609C616-CAEF-4796-B87D-4D591D1FD56D}" type="slidenum">
               <a:rPr lang="ko-KR" altLang="en-US" smtClean="0"/>
-              <a:t>14</a:t>
+              <a:t>15</a:t>
             </a:fld>
             <a:endParaRPr lang="ko-KR" altLang="en-US" dirty="0"/>
           </a:p>
@@ -975,7 +976,7 @@
           <a:p>
             <a:fld id="{F609C616-CAEF-4796-B87D-4D591D1FD56D}" type="slidenum">
               <a:rPr lang="ko-KR" altLang="en-US" smtClean="0"/>
-              <a:t>15</a:t>
+              <a:t>16</a:t>
             </a:fld>
             <a:endParaRPr lang="ko-KR" altLang="en-US" dirty="0"/>
           </a:p>
@@ -1059,7 +1060,7 @@
           <a:p>
             <a:fld id="{F609C616-CAEF-4796-B87D-4D591D1FD56D}" type="slidenum">
               <a:rPr lang="ko-KR" altLang="en-US" smtClean="0"/>
-              <a:t>16</a:t>
+              <a:t>17</a:t>
             </a:fld>
             <a:endParaRPr lang="ko-KR" altLang="en-US" dirty="0"/>
           </a:p>
@@ -1257,7 +1258,7 @@
           <a:p>
             <a:fld id="{3FC6EB06-D21B-4DC4-9B56-DA9A919C6252}" type="datetimeFigureOut">
               <a:rPr lang="ko-KR" altLang="en-US" smtClean="0"/>
-              <a:t>2022-04-04</a:t>
+              <a:t>2022-04-06</a:t>
             </a:fld>
             <a:endParaRPr lang="ko-KR" altLang="en-US" dirty="0"/>
           </a:p>
@@ -1425,7 +1426,7 @@
           <a:p>
             <a:fld id="{3FC6EB06-D21B-4DC4-9B56-DA9A919C6252}" type="datetimeFigureOut">
               <a:rPr lang="ko-KR" altLang="en-US" smtClean="0"/>
-              <a:t>2022-04-04</a:t>
+              <a:t>2022-04-06</a:t>
             </a:fld>
             <a:endParaRPr lang="ko-KR" altLang="en-US" dirty="0"/>
           </a:p>
@@ -1603,7 +1604,7 @@
           <a:p>
             <a:fld id="{3FC6EB06-D21B-4DC4-9B56-DA9A919C6252}" type="datetimeFigureOut">
               <a:rPr lang="ko-KR" altLang="en-US" smtClean="0"/>
-              <a:t>2022-04-04</a:t>
+              <a:t>2022-04-06</a:t>
             </a:fld>
             <a:endParaRPr lang="ko-KR" altLang="en-US" dirty="0"/>
           </a:p>
@@ -1771,7 +1772,7 @@
           <a:p>
             <a:fld id="{3FC6EB06-D21B-4DC4-9B56-DA9A919C6252}" type="datetimeFigureOut">
               <a:rPr lang="ko-KR" altLang="en-US" smtClean="0"/>
-              <a:t>2022-04-04</a:t>
+              <a:t>2022-04-06</a:t>
             </a:fld>
             <a:endParaRPr lang="ko-KR" altLang="en-US" dirty="0"/>
           </a:p>
@@ -2016,7 +2017,7 @@
           <a:p>
             <a:fld id="{3FC6EB06-D21B-4DC4-9B56-DA9A919C6252}" type="datetimeFigureOut">
               <a:rPr lang="ko-KR" altLang="en-US" smtClean="0"/>
-              <a:t>2022-04-04</a:t>
+              <a:t>2022-04-06</a:t>
             </a:fld>
             <a:endParaRPr lang="ko-KR" altLang="en-US" dirty="0"/>
           </a:p>
@@ -2301,7 +2302,7 @@
           <a:p>
             <a:fld id="{3FC6EB06-D21B-4DC4-9B56-DA9A919C6252}" type="datetimeFigureOut">
               <a:rPr lang="ko-KR" altLang="en-US" smtClean="0"/>
-              <a:t>2022-04-04</a:t>
+              <a:t>2022-04-06</a:t>
             </a:fld>
             <a:endParaRPr lang="ko-KR" altLang="en-US" dirty="0"/>
           </a:p>
@@ -2720,7 +2721,7 @@
           <a:p>
             <a:fld id="{3FC6EB06-D21B-4DC4-9B56-DA9A919C6252}" type="datetimeFigureOut">
               <a:rPr lang="ko-KR" altLang="en-US" smtClean="0"/>
-              <a:t>2022-04-04</a:t>
+              <a:t>2022-04-06</a:t>
             </a:fld>
             <a:endParaRPr lang="ko-KR" altLang="en-US" dirty="0"/>
           </a:p>
@@ -2837,7 +2838,7 @@
           <a:p>
             <a:fld id="{3FC6EB06-D21B-4DC4-9B56-DA9A919C6252}" type="datetimeFigureOut">
               <a:rPr lang="ko-KR" altLang="en-US" smtClean="0"/>
-              <a:t>2022-04-04</a:t>
+              <a:t>2022-04-06</a:t>
             </a:fld>
             <a:endParaRPr lang="ko-KR" altLang="en-US" dirty="0"/>
           </a:p>
@@ -2932,7 +2933,7 @@
           <a:p>
             <a:fld id="{3FC6EB06-D21B-4DC4-9B56-DA9A919C6252}" type="datetimeFigureOut">
               <a:rPr lang="ko-KR" altLang="en-US" smtClean="0"/>
-              <a:t>2022-04-04</a:t>
+              <a:t>2022-04-06</a:t>
             </a:fld>
             <a:endParaRPr lang="ko-KR" altLang="en-US" dirty="0"/>
           </a:p>
@@ -3207,7 +3208,7 @@
           <a:p>
             <a:fld id="{3FC6EB06-D21B-4DC4-9B56-DA9A919C6252}" type="datetimeFigureOut">
               <a:rPr lang="ko-KR" altLang="en-US" smtClean="0"/>
-              <a:t>2022-04-04</a:t>
+              <a:t>2022-04-06</a:t>
             </a:fld>
             <a:endParaRPr lang="ko-KR" altLang="en-US" dirty="0"/>
           </a:p>
@@ -3459,7 +3460,7 @@
           <a:p>
             <a:fld id="{3FC6EB06-D21B-4DC4-9B56-DA9A919C6252}" type="datetimeFigureOut">
               <a:rPr lang="ko-KR" altLang="en-US" smtClean="0"/>
-              <a:t>2022-04-04</a:t>
+              <a:t>2022-04-06</a:t>
             </a:fld>
             <a:endParaRPr lang="ko-KR" altLang="en-US" dirty="0"/>
           </a:p>
@@ -3670,7 +3671,7 @@
           <a:p>
             <a:fld id="{3FC6EB06-D21B-4DC4-9B56-DA9A919C6252}" type="datetimeFigureOut">
               <a:rPr lang="ko-KR" altLang="en-US" smtClean="0"/>
-              <a:t>2022-04-04</a:t>
+              <a:t>2022-04-06</a:t>
             </a:fld>
             <a:endParaRPr lang="ko-KR" altLang="en-US" dirty="0"/>
           </a:p>
@@ -4413,7 +4414,7 @@
         <p:spPr>
           <a:xfrm>
             <a:off x="179512" y="770992"/>
-            <a:ext cx="5544616" cy="2677656"/>
+            <a:ext cx="7056784" cy="3559372"/>
           </a:xfrm>
           <a:prstGeom prst="rect">
             <a:avLst/>
@@ -4446,6 +4447,108 @@
               </a:solidFill>
               <a:latin typeface="HY견고딕" panose="02030600000101010101" pitchFamily="18" charset="-127"/>
               <a:ea typeface="HY견고딕" panose="02030600000101010101" pitchFamily="18" charset="-127"/>
+            </a:endParaRPr>
+          </a:p>
+          <a:p>
+            <a:pPr marL="285750" indent="-285750" defTabSz="779233">
+              <a:lnSpc>
+                <a:spcPct val="150000"/>
+              </a:lnSpc>
+              <a:buFontTx/>
+              <a:buChar char="-"/>
+            </a:pPr>
+            <a:r>
+              <a:rPr lang="ko-KR" altLang="en-US" sz="1400" dirty="0">
+                <a:solidFill>
+                  <a:prstClr val="black"/>
+                </a:solidFill>
+                <a:latin typeface="맑은 고딕" panose="020B0503020000020004" pitchFamily="50" charset="-127"/>
+              </a:rPr>
+              <a:t>파일 </a:t>
+            </a:r>
+            <a:r>
+              <a:rPr lang="en-US" altLang="ko-KR" sz="1400" dirty="0">
+                <a:solidFill>
+                  <a:prstClr val="black"/>
+                </a:solidFill>
+                <a:latin typeface="맑은 고딕" panose="020B0503020000020004" pitchFamily="50" charset="-127"/>
+              </a:rPr>
+              <a:t>input/output</a:t>
+            </a:r>
+            <a:r>
+              <a:rPr lang="ko-KR" altLang="en-US" sz="1400" dirty="0">
+                <a:solidFill>
+                  <a:prstClr val="black"/>
+                </a:solidFill>
+                <a:latin typeface="맑은 고딕" panose="020B0503020000020004" pitchFamily="50" charset="-127"/>
+              </a:rPr>
+              <a:t> 명 비정상시 프로그램 종료</a:t>
+            </a:r>
+            <a:endParaRPr lang="en-US" altLang="ko-KR" sz="1400" dirty="0">
+              <a:solidFill>
+                <a:prstClr val="black"/>
+              </a:solidFill>
+              <a:latin typeface="맑은 고딕" panose="020B0503020000020004" pitchFamily="50" charset="-127"/>
+            </a:endParaRPr>
+          </a:p>
+          <a:p>
+            <a:pPr marL="285750" indent="-285750" defTabSz="779233">
+              <a:lnSpc>
+                <a:spcPct val="150000"/>
+              </a:lnSpc>
+              <a:buFontTx/>
+              <a:buChar char="-"/>
+            </a:pPr>
+            <a:r>
+              <a:rPr lang="ko-KR" altLang="en-US" sz="1400" dirty="0">
+                <a:solidFill>
+                  <a:prstClr val="black"/>
+                </a:solidFill>
+                <a:latin typeface="맑은 고딕" panose="020B0503020000020004" pitchFamily="50" charset="-127"/>
+              </a:rPr>
+              <a:t>입력 </a:t>
+            </a:r>
+            <a:r>
+              <a:rPr lang="en-US" altLang="ko-KR" sz="1400" dirty="0">
+                <a:solidFill>
+                  <a:prstClr val="black"/>
+                </a:solidFill>
+                <a:latin typeface="맑은 고딕" panose="020B0503020000020004" pitchFamily="50" charset="-127"/>
+              </a:rPr>
+              <a:t>command </a:t>
+            </a:r>
+            <a:r>
+              <a:rPr lang="ko-KR" altLang="en-US" sz="1400" dirty="0">
+                <a:solidFill>
+                  <a:prstClr val="black"/>
+                </a:solidFill>
+                <a:latin typeface="맑은 고딕" panose="020B0503020000020004" pitchFamily="50" charset="-127"/>
+              </a:rPr>
+              <a:t>의 요구 사항 불일치시 해당 </a:t>
+            </a:r>
+            <a:r>
+              <a:rPr lang="en-US" altLang="ko-KR" sz="1400" dirty="0">
+                <a:solidFill>
+                  <a:prstClr val="black"/>
+                </a:solidFill>
+                <a:latin typeface="맑은 고딕" panose="020B0503020000020004" pitchFamily="50" charset="-127"/>
+              </a:rPr>
+              <a:t>command </a:t>
+            </a:r>
+            <a:r>
+              <a:rPr lang="ko-KR" altLang="en-US" sz="1400" dirty="0" err="1">
+                <a:solidFill>
+                  <a:prstClr val="black"/>
+                </a:solidFill>
+                <a:latin typeface="맑은 고딕" panose="020B0503020000020004" pitchFamily="50" charset="-127"/>
+              </a:rPr>
+              <a:t>미실행</a:t>
+            </a:r>
+            <a:endParaRPr lang="en-US" altLang="ko-KR" sz="1400" dirty="0">
+              <a:solidFill>
+                <a:prstClr val="black"/>
+              </a:solidFill>
+              <a:latin typeface="맑은 고딕" panose="020B0503020000020004" pitchFamily="50" charset="-127"/>
             </a:endParaRPr>
           </a:p>
           <a:p>
@@ -4492,6 +4595,99 @@
                 <a:spcPct val="150000"/>
               </a:lnSpc>
             </a:pPr>
+            <a:r>
+              <a:rPr lang="en-US" altLang="ko-KR" sz="1600" dirty="0">
+                <a:solidFill>
+                  <a:prstClr val="black"/>
+                </a:solidFill>
+                <a:latin typeface="맑은 고딕" panose="020B0503020000020004" pitchFamily="50" charset="-127"/>
+              </a:rPr>
+              <a:t> - </a:t>
+            </a:r>
+            <a:r>
+              <a:rPr lang="ko-KR" altLang="en-US" sz="1400" dirty="0">
+                <a:solidFill>
+                  <a:prstClr val="black"/>
+                </a:solidFill>
+                <a:latin typeface="맑은 고딕" panose="020B0503020000020004" pitchFamily="50" charset="-127"/>
+              </a:rPr>
+              <a:t>기능별로 </a:t>
+            </a:r>
+            <a:r>
+              <a:rPr lang="en-US" altLang="ko-KR" sz="1400" dirty="0">
+                <a:solidFill>
+                  <a:prstClr val="black"/>
+                </a:solidFill>
+                <a:latin typeface="맑은 고딕" panose="020B0503020000020004" pitchFamily="50" charset="-127"/>
+              </a:rPr>
+              <a:t>super class </a:t>
+            </a:r>
+            <a:r>
+              <a:rPr lang="ko-KR" altLang="en-US" sz="1400" dirty="0">
+                <a:solidFill>
+                  <a:prstClr val="black"/>
+                </a:solidFill>
+                <a:latin typeface="맑은 고딕" panose="020B0503020000020004" pitchFamily="50" charset="-127"/>
+              </a:rPr>
+              <a:t>을 생성하여 </a:t>
+            </a:r>
+            <a:r>
+              <a:rPr lang="en-US" altLang="ko-KR" sz="1400" dirty="0">
+                <a:solidFill>
+                  <a:prstClr val="black"/>
+                </a:solidFill>
+                <a:latin typeface="맑은 고딕" panose="020B0503020000020004" pitchFamily="50" charset="-127"/>
+              </a:rPr>
+              <a:t>interface </a:t>
+            </a:r>
+            <a:r>
+              <a:rPr lang="ko-KR" altLang="en-US" sz="1400" dirty="0">
+                <a:solidFill>
+                  <a:prstClr val="black"/>
+                </a:solidFill>
+                <a:latin typeface="맑은 고딕" panose="020B0503020000020004" pitchFamily="50" charset="-127"/>
+              </a:rPr>
+              <a:t>역할을 수행하도록 함</a:t>
+            </a:r>
+            <a:r>
+              <a:rPr lang="en-US" altLang="ko-KR" sz="1400" dirty="0">
+                <a:solidFill>
+                  <a:prstClr val="black"/>
+                </a:solidFill>
+                <a:latin typeface="맑은 고딕" panose="020B0503020000020004" pitchFamily="50" charset="-127"/>
+              </a:rPr>
+              <a:t>.</a:t>
+            </a:r>
+          </a:p>
+          <a:p>
+            <a:pPr defTabSz="779233">
+              <a:lnSpc>
+                <a:spcPct val="150000"/>
+              </a:lnSpc>
+            </a:pPr>
+            <a:endParaRPr lang="en-US" altLang="ko-KR" sz="1600" dirty="0">
+              <a:solidFill>
+                <a:prstClr val="black"/>
+              </a:solidFill>
+              <a:latin typeface="맑은 고딕" panose="020B0503020000020004" pitchFamily="50" charset="-127"/>
+            </a:endParaRPr>
+          </a:p>
+          <a:p>
+            <a:pPr defTabSz="779233">
+              <a:lnSpc>
+                <a:spcPct val="150000"/>
+              </a:lnSpc>
+            </a:pPr>
+            <a:r>
+              <a:rPr lang="ko-KR" altLang="en-US" sz="1600" b="1" dirty="0">
+                <a:solidFill>
+                  <a:prstClr val="black"/>
+                </a:solidFill>
+                <a:latin typeface="HY견고딕" panose="02030600000101010101" pitchFamily="18" charset="-127"/>
+                <a:ea typeface="HY견고딕" panose="02030600000101010101" pitchFamily="18" charset="-127"/>
+              </a:rPr>
+              <a:t>■ 유효성 검사 </a:t>
+            </a:r>
             <a:endParaRPr lang="en-US" altLang="ko-KR" sz="1600" b="1" dirty="0">
               <a:solidFill>
                 <a:prstClr val="black"/>
@@ -4507,21 +4703,64 @@
               </a:lnSpc>
             </a:pPr>
             <a:r>
-              <a:rPr lang="ko-KR" altLang="en-US" sz="1600" b="1" dirty="0">
-                <a:solidFill>
-                  <a:prstClr val="black"/>
-                </a:solidFill>
-                <a:latin typeface="HY견고딕" panose="02030600000101010101" pitchFamily="18" charset="-127"/>
-                <a:ea typeface="HY견고딕" panose="02030600000101010101" pitchFamily="18" charset="-127"/>
-              </a:rPr>
-              <a:t>■ 유효성 검사 </a:t>
-            </a:r>
-            <a:endParaRPr lang="en-US" altLang="ko-KR" sz="1600" b="1" dirty="0">
+              <a:rPr lang="en-US" altLang="ko-KR" sz="1400" dirty="0">
+                <a:solidFill>
+                  <a:prstClr val="black"/>
+                </a:solidFill>
+                <a:latin typeface="맑은 고딕" panose="020B0503020000020004" pitchFamily="50" charset="-127"/>
+              </a:rPr>
+              <a:t>  - </a:t>
+            </a:r>
+            <a:r>
+              <a:rPr lang="ko-KR" altLang="en-US" sz="1400" dirty="0">
+                <a:solidFill>
+                  <a:prstClr val="black"/>
+                </a:solidFill>
+                <a:latin typeface="맑은 고딕" panose="020B0503020000020004" pitchFamily="50" charset="-127"/>
+              </a:rPr>
+              <a:t>입력 </a:t>
+            </a:r>
+            <a:r>
+              <a:rPr lang="en-US" altLang="ko-KR" sz="1400" dirty="0">
+                <a:solidFill>
+                  <a:prstClr val="black"/>
+                </a:solidFill>
+                <a:latin typeface="맑은 고딕" panose="020B0503020000020004" pitchFamily="50" charset="-127"/>
+              </a:rPr>
+              <a:t>command </a:t>
+            </a:r>
+            <a:r>
+              <a:rPr lang="ko-KR" altLang="en-US" sz="1400" dirty="0">
+                <a:solidFill>
+                  <a:prstClr val="black"/>
+                </a:solidFill>
+                <a:latin typeface="맑은 고딕" panose="020B0503020000020004" pitchFamily="50" charset="-127"/>
+              </a:rPr>
+              <a:t>의</a:t>
+            </a:r>
+            <a:r>
+              <a:rPr lang="en-US" altLang="ko-KR" sz="1400" dirty="0">
+                <a:solidFill>
+                  <a:prstClr val="black"/>
+                </a:solidFill>
+                <a:latin typeface="맑은 고딕" panose="020B0503020000020004" pitchFamily="50" charset="-127"/>
+              </a:rPr>
+              <a:t> </a:t>
+            </a:r>
+            <a:r>
+              <a:rPr lang="ko-KR" altLang="en-US" sz="1400" dirty="0">
+                <a:solidFill>
+                  <a:prstClr val="black"/>
+                </a:solidFill>
+                <a:latin typeface="맑은 고딕" panose="020B0503020000020004" pitchFamily="50" charset="-127"/>
+              </a:rPr>
+              <a:t>요구상황에 맞는지 유효성 검사 </a:t>
+            </a:r>
+            <a:endParaRPr lang="en-US" altLang="ko-KR" sz="1400" dirty="0">
               <a:solidFill>
                 <a:prstClr val="black"/>
               </a:solidFill>
-              <a:latin typeface="HY견고딕" panose="02030600000101010101" pitchFamily="18" charset="-127"/>
-              <a:ea typeface="HY견고딕" panose="02030600000101010101" pitchFamily="18" charset="-127"/>
+              <a:latin typeface="맑은 고딕" panose="020B0503020000020004" pitchFamily="50" charset="-127"/>
             </a:endParaRPr>
           </a:p>
           <a:p>
@@ -4531,39 +4770,47 @@
               </a:lnSpc>
             </a:pPr>
             <a:r>
-              <a:rPr lang="en-US" altLang="ko-KR" sz="1600" dirty="0">
-                <a:solidFill>
-                  <a:prstClr val="black"/>
-                </a:solidFill>
-                <a:latin typeface="맑은 고딕" panose="020B0503020000020004" pitchFamily="50" charset="-127"/>
-              </a:rPr>
-              <a:t>  -</a:t>
-            </a:r>
-          </a:p>
-          <a:p>
-            <a:pPr defTabSz="779233">
-              <a:lnSpc>
-                <a:spcPct val="150000"/>
-              </a:lnSpc>
-            </a:pPr>
-            <a:r>
-              <a:rPr lang="ko-KR" altLang="en-US" sz="1600" dirty="0">
-                <a:solidFill>
-                  <a:prstClr val="black"/>
-                </a:solidFill>
-                <a:latin typeface="맑은 고딕" panose="020B0503020000020004" pitchFamily="50" charset="-127"/>
-              </a:rPr>
-              <a:t>  </a:t>
-            </a:r>
-            <a:r>
-              <a:rPr lang="en-US" altLang="ko-KR" sz="1600" dirty="0">
-                <a:solidFill>
-                  <a:prstClr val="black"/>
-                </a:solidFill>
-                <a:latin typeface="맑은 고딕" panose="020B0503020000020004" pitchFamily="50" charset="-127"/>
-              </a:rPr>
-              <a:t>-</a:t>
-            </a:r>
+              <a:rPr lang="en-US" altLang="ko-KR" sz="1400" dirty="0">
+                <a:solidFill>
+                  <a:prstClr val="black"/>
+                </a:solidFill>
+                <a:latin typeface="맑은 고딕" panose="020B0503020000020004" pitchFamily="50" charset="-127"/>
+              </a:rPr>
+              <a:t>  - DB </a:t>
+            </a:r>
+            <a:r>
+              <a:rPr lang="ko-KR" altLang="en-US" sz="1400" dirty="0">
+                <a:solidFill>
+                  <a:prstClr val="black"/>
+                </a:solidFill>
+                <a:latin typeface="맑은 고딕" panose="020B0503020000020004" pitchFamily="50" charset="-127"/>
+              </a:rPr>
+              <a:t>에 저장된 내용 </a:t>
+            </a:r>
+            <a:r>
+              <a:rPr lang="ko-KR" altLang="en-US" sz="1400" dirty="0" err="1">
+                <a:solidFill>
+                  <a:prstClr val="black"/>
+                </a:solidFill>
+                <a:latin typeface="맑은 고딕" panose="020B0503020000020004" pitchFamily="50" charset="-127"/>
+              </a:rPr>
+              <a:t>조회시</a:t>
+            </a:r>
+            <a:r>
+              <a:rPr lang="ko-KR" altLang="en-US" sz="1400" dirty="0">
+                <a:solidFill>
+                  <a:prstClr val="black"/>
+                </a:solidFill>
+                <a:latin typeface="맑은 고딕" panose="020B0503020000020004" pitchFamily="50" charset="-127"/>
+              </a:rPr>
+              <a:t> 출력 값 유효성 검사</a:t>
+            </a:r>
+            <a:endParaRPr lang="en-US" altLang="ko-KR" sz="1400" dirty="0">
+              <a:solidFill>
+                <a:prstClr val="black"/>
+              </a:solidFill>
+              <a:latin typeface="맑은 고딕" panose="020B0503020000020004" pitchFamily="50" charset="-127"/>
+            </a:endParaRPr>
           </a:p>
         </p:txBody>
       </p:sp>
@@ -4723,7 +4970,7 @@
         <p:spPr>
           <a:xfrm>
             <a:off x="179512" y="770992"/>
-            <a:ext cx="5544616" cy="2185214"/>
+            <a:ext cx="5544616" cy="3416320"/>
           </a:xfrm>
           <a:prstGeom prst="rect">
             <a:avLst/>
@@ -4802,7 +5049,11 @@
             </a:endParaRPr>
           </a:p>
           <a:p>
-            <a:pPr defTabSz="779233"/>
+            <a:pPr defTabSz="779233">
+              <a:lnSpc>
+                <a:spcPct val="150000"/>
+              </a:lnSpc>
+            </a:pPr>
             <a:r>
               <a:rPr lang="en-US" altLang="ko-KR" sz="1600" dirty="0">
                 <a:solidFill>
@@ -4814,7 +5065,20 @@
             </a:r>
           </a:p>
           <a:p>
-            <a:pPr defTabSz="779233"/>
+            <a:pPr defTabSz="779233">
+              <a:lnSpc>
+                <a:spcPct val="150000"/>
+              </a:lnSpc>
+            </a:pPr>
+            <a:r>
+              <a:rPr lang="ko-KR" altLang="en-US" sz="1600" dirty="0">
+                <a:solidFill>
+                  <a:prstClr val="black"/>
+                </a:solidFill>
+                <a:latin typeface="맑은 고딕" panose="020B0503020000020004" pitchFamily="50" charset="-127"/>
+              </a:rPr>
+              <a:t>  </a:t>
+            </a:r>
             <a:r>
               <a:rPr lang="en-US" altLang="ko-KR" sz="1600" dirty="0">
                 <a:solidFill>
@@ -4822,38 +5086,24 @@
                 </a:solidFill>
                 <a:latin typeface="맑은 고딕" panose="020B0503020000020004" pitchFamily="50" charset="-127"/>
               </a:rPr>
-              <a:t>  - </a:t>
-            </a:r>
+              <a:t>- Command manager</a:t>
+            </a:r>
+          </a:p>
+          <a:p>
+            <a:pPr defTabSz="779233">
+              <a:lnSpc>
+                <a:spcPct val="150000"/>
+              </a:lnSpc>
+            </a:pPr>
             <a:r>
               <a:rPr lang="en-US" altLang="ko-KR" sz="1600" dirty="0">
-                <a:latin typeface="맑은 고딕" panose="020B0503020000020004" pitchFamily="50" charset="-127"/>
-              </a:rPr>
-              <a:t>Command manager</a:t>
-            </a:r>
-          </a:p>
-          <a:p>
-            <a:pPr defTabSz="779233"/>
-            <a:r>
-              <a:rPr lang="en-US" altLang="ko-KR" sz="1600" dirty="0">
-                <a:solidFill>
-                  <a:prstClr val="black"/>
-                </a:solidFill>
-                <a:latin typeface="맑은 고딕" panose="020B0503020000020004" pitchFamily="50" charset="-127"/>
-              </a:rPr>
-              <a:t>  - </a:t>
-            </a:r>
-            <a:r>
-              <a:rPr lang="en-US" altLang="ko-KR" sz="1600" dirty="0">
-                <a:latin typeface="맑은 고딕" panose="020B0503020000020004" pitchFamily="50" charset="-127"/>
-              </a:rPr>
-              <a:t>Column checker</a:t>
-            </a:r>
-            <a:endParaRPr lang="ko-KR" altLang="en-US" sz="1600" dirty="0">
-              <a:solidFill>
-                <a:prstClr val="black"/>
-              </a:solidFill>
-              <a:latin typeface="맑은 고딕" panose="020B0503020000020004" pitchFamily="50" charset="-127"/>
-            </a:endParaRPr>
+                <a:solidFill>
+                  <a:prstClr val="black"/>
+                </a:solidFill>
+                <a:latin typeface="맑은 고딕" panose="020B0503020000020004" pitchFamily="50" charset="-127"/>
+              </a:rPr>
+              <a:t>  - Column checker</a:t>
+            </a:r>
           </a:p>
           <a:p>
             <a:pPr defTabSz="779233">
@@ -4887,7 +5137,11 @@
             </a:endParaRPr>
           </a:p>
           <a:p>
-            <a:pPr defTabSz="779233"/>
+            <a:pPr defTabSz="779233">
+              <a:lnSpc>
+                <a:spcPct val="150000"/>
+              </a:lnSpc>
+            </a:pPr>
             <a:r>
               <a:rPr lang="en-US" altLang="ko-KR" sz="1600" dirty="0">
                 <a:solidFill>
@@ -4914,25 +5168,51 @@
             </a:endParaRPr>
           </a:p>
           <a:p>
+            <a:pPr defTabSz="779233">
+              <a:lnSpc>
+                <a:spcPct val="150000"/>
+              </a:lnSpc>
+            </a:pPr>
+            <a:r>
+              <a:rPr lang="en-US" altLang="ko-KR" sz="1600" dirty="0">
+                <a:solidFill>
+                  <a:prstClr val="black"/>
+                </a:solidFill>
+                <a:latin typeface="맑은 고딕" panose="020B0503020000020004" pitchFamily="50" charset="-127"/>
+              </a:rPr>
+              <a:t>  - </a:t>
+            </a:r>
+            <a:r>
+              <a:rPr lang="ko-KR" altLang="en-US" sz="1600" dirty="0">
+                <a:solidFill>
+                  <a:prstClr val="black"/>
+                </a:solidFill>
+                <a:latin typeface="맑은 고딕" panose="020B0503020000020004" pitchFamily="50" charset="-127"/>
+              </a:rPr>
+              <a:t>주석 제거</a:t>
+            </a:r>
+            <a:endParaRPr lang="en-US" altLang="ko-KR" sz="1600" dirty="0">
+              <a:solidFill>
+                <a:prstClr val="black"/>
+              </a:solidFill>
+              <a:latin typeface="맑은 고딕" panose="020B0503020000020004" pitchFamily="50" charset="-127"/>
+            </a:endParaRPr>
+          </a:p>
+          <a:p>
+            <a:pPr defTabSz="779233">
+              <a:lnSpc>
+                <a:spcPct val="150000"/>
+              </a:lnSpc>
+            </a:pPr>
+            <a:endParaRPr lang="en-US" altLang="ko-KR" sz="1600" dirty="0">
+              <a:solidFill>
+                <a:prstClr val="black"/>
+              </a:solidFill>
+              <a:latin typeface="맑은 고딕" panose="020B0503020000020004" pitchFamily="50" charset="-127"/>
+            </a:endParaRPr>
+          </a:p>
+          <a:p>
             <a:pPr defTabSz="779233"/>
-            <a:r>
-              <a:rPr lang="en-US" altLang="ko-KR" sz="1600" dirty="0">
-                <a:solidFill>
-                  <a:prstClr val="black"/>
-                </a:solidFill>
-                <a:latin typeface="맑은 고딕" panose="020B0503020000020004" pitchFamily="50" charset="-127"/>
-              </a:rPr>
-              <a:t>  - </a:t>
-            </a:r>
-            <a:r>
-              <a:rPr lang="ko-KR" altLang="en-US" sz="1600" dirty="0">
-                <a:solidFill>
-                  <a:prstClr val="black"/>
-                </a:solidFill>
-                <a:latin typeface="맑은 고딕" panose="020B0503020000020004" pitchFamily="50" charset="-127"/>
-              </a:rPr>
-              <a:t>주석 제거</a:t>
-            </a:r>
             <a:endParaRPr lang="en-US" altLang="ko-KR" sz="1600" dirty="0">
               <a:solidFill>
                 <a:prstClr val="black"/>
@@ -5105,7 +5385,7 @@
         <p:spPr>
           <a:xfrm>
             <a:off x="179512" y="770992"/>
-            <a:ext cx="5544616" cy="2677656"/>
+            <a:ext cx="5544616" cy="4159537"/>
           </a:xfrm>
           <a:prstGeom prst="rect">
             <a:avLst/>
@@ -5175,6 +5455,50 @@
               </a:rPr>
               <a:t> - Total PR: </a:t>
             </a:r>
+            <a:r>
+              <a:rPr lang="ko-KR" altLang="en-US" sz="1600" dirty="0">
+                <a:solidFill>
+                  <a:prstClr val="black"/>
+                </a:solidFill>
+                <a:latin typeface="맑은 고딕" panose="020B0503020000020004" pitchFamily="50" charset="-127"/>
+              </a:rPr>
+              <a:t>총</a:t>
+            </a:r>
+            <a:r>
+              <a:rPr lang="en-US" altLang="ko-KR" sz="1600" dirty="0">
+                <a:solidFill>
+                  <a:prstClr val="black"/>
+                </a:solidFill>
+                <a:latin typeface="맑은 고딕" panose="020B0503020000020004" pitchFamily="50" charset="-127"/>
+              </a:rPr>
+              <a:t> </a:t>
+            </a:r>
+            <a:r>
+              <a:rPr lang="en-US" altLang="ko-KR" sz="1600" b="1" i="0" dirty="0">
+                <a:effectLst/>
+                <a:latin typeface="-apple-system"/>
+              </a:rPr>
+              <a:t>39</a:t>
+            </a:r>
+            <a:r>
+              <a:rPr lang="en-US" altLang="ko-KR" sz="1600" b="0" i="0" dirty="0">
+                <a:effectLst/>
+                <a:latin typeface="-apple-system"/>
+              </a:rPr>
+              <a:t> Pull requests </a:t>
+            </a:r>
+            <a:r>
+              <a:rPr lang="ko-KR" altLang="en-US" sz="1600" dirty="0">
+                <a:latin typeface="-apple-system"/>
+              </a:rPr>
+              <a:t>생성</a:t>
+            </a:r>
+            <a:endParaRPr lang="en-US" altLang="ko-KR" sz="1600" dirty="0">
+              <a:solidFill>
+                <a:prstClr val="black"/>
+              </a:solidFill>
+              <a:latin typeface="맑은 고딕" panose="020B0503020000020004" pitchFamily="50" charset="-127"/>
+            </a:endParaRPr>
           </a:p>
           <a:p>
             <a:pPr defTabSz="779233">
@@ -5183,13 +5507,13 @@
               </a:lnSpc>
             </a:pPr>
             <a:r>
-              <a:rPr lang="en-US" altLang="ko-KR" sz="1600" dirty="0">
-                <a:solidFill>
-                  <a:prstClr val="black"/>
-                </a:solidFill>
-                <a:latin typeface="맑은 고딕" panose="020B0503020000020004" pitchFamily="50" charset="-127"/>
-              </a:rPr>
-              <a:t>    &gt; [Feature] </a:t>
+              <a:rPr lang="en-US" altLang="ko-KR" sz="1400" dirty="0">
+                <a:solidFill>
+                  <a:prstClr val="black"/>
+                </a:solidFill>
+                <a:latin typeface="맑은 고딕" panose="020B0503020000020004" pitchFamily="50" charset="-127"/>
+              </a:rPr>
+              <a:t>    &gt; [Feature]  20</a:t>
             </a:r>
           </a:p>
           <a:p>
@@ -5199,13 +5523,13 @@
               </a:lnSpc>
             </a:pPr>
             <a:r>
-              <a:rPr lang="en-US" altLang="ko-KR" sz="1600" dirty="0">
-                <a:solidFill>
-                  <a:prstClr val="black"/>
-                </a:solidFill>
-                <a:latin typeface="맑은 고딕" panose="020B0503020000020004" pitchFamily="50" charset="-127"/>
-              </a:rPr>
-              <a:t>    &gt; [Refactoring] </a:t>
+              <a:rPr lang="en-US" altLang="ko-KR" sz="1400" dirty="0">
+                <a:solidFill>
+                  <a:prstClr val="black"/>
+                </a:solidFill>
+                <a:latin typeface="맑은 고딕" panose="020B0503020000020004" pitchFamily="50" charset="-127"/>
+              </a:rPr>
+              <a:t>    &gt; [Refactoring] 5</a:t>
             </a:r>
           </a:p>
           <a:p>
@@ -5215,7 +5539,7 @@
               </a:lnSpc>
             </a:pPr>
             <a:r>
-              <a:rPr lang="en-US" altLang="ko-KR" sz="1600" dirty="0">
+              <a:rPr lang="en-US" altLang="ko-KR" sz="1400" dirty="0">
                 <a:solidFill>
                   <a:prstClr val="black"/>
                 </a:solidFill>
@@ -5224,7 +5548,7 @@
               <a:t>    &gt; [</a:t>
             </a:r>
             <a:r>
-              <a:rPr lang="en-US" altLang="ko-KR" sz="1600" dirty="0" err="1">
+              <a:rPr lang="en-US" altLang="ko-KR" sz="1400" dirty="0" err="1">
                 <a:solidFill>
                   <a:prstClr val="black"/>
                 </a:solidFill>
@@ -5233,13 +5557,47 @@
               <a:t>BugFix</a:t>
             </a:r>
             <a:r>
-              <a:rPr lang="en-US" altLang="ko-KR" sz="1600" dirty="0">
-                <a:solidFill>
-                  <a:prstClr val="black"/>
-                </a:solidFill>
-                <a:latin typeface="맑은 고딕" panose="020B0503020000020004" pitchFamily="50" charset="-127"/>
-              </a:rPr>
-              <a:t>] </a:t>
+              <a:rPr lang="en-US" altLang="ko-KR" sz="1400" dirty="0">
+                <a:solidFill>
+                  <a:prstClr val="black"/>
+                </a:solidFill>
+                <a:latin typeface="맑은 고딕" panose="020B0503020000020004" pitchFamily="50" charset="-127"/>
+              </a:rPr>
+              <a:t>] 6</a:t>
+            </a:r>
+          </a:p>
+          <a:p>
+            <a:pPr defTabSz="779233">
+              <a:lnSpc>
+                <a:spcPct val="150000"/>
+              </a:lnSpc>
+            </a:pPr>
+            <a:r>
+              <a:rPr lang="en-US" altLang="ko-KR" sz="1400" dirty="0">
+                <a:solidFill>
+                  <a:prstClr val="black"/>
+                </a:solidFill>
+                <a:latin typeface="맑은 고딕" panose="020B0503020000020004" pitchFamily="50" charset="-127"/>
+              </a:rPr>
+              <a:t>    &gt; [Design]</a:t>
+            </a:r>
+            <a:r>
+              <a:rPr lang="ko-KR" altLang="en-US" sz="1400" dirty="0">
+                <a:solidFill>
+                  <a:prstClr val="black"/>
+                </a:solidFill>
+                <a:latin typeface="맑은 고딕" panose="020B0503020000020004" pitchFamily="50" charset="-127"/>
+              </a:rPr>
+              <a:t> </a:t>
+            </a:r>
+            <a:r>
+              <a:rPr lang="en-US" altLang="ko-KR" sz="1400" dirty="0">
+                <a:solidFill>
+                  <a:prstClr val="black"/>
+                </a:solidFill>
+                <a:latin typeface="맑은 고딕" panose="020B0503020000020004" pitchFamily="50" charset="-127"/>
+              </a:rPr>
+              <a:t>8</a:t>
             </a:r>
           </a:p>
           <a:p>
@@ -5262,6 +5620,20 @@
                 <a:spcPct val="150000"/>
               </a:lnSpc>
             </a:pPr>
+            <a:endParaRPr lang="en-US" altLang="ko-KR" sz="1600" b="1" dirty="0">
+              <a:solidFill>
+                <a:prstClr val="black"/>
+              </a:solidFill>
+              <a:latin typeface="맑은 고딕" panose="020B0503020000020004" pitchFamily="50" charset="-127"/>
+              <a:ea typeface="HY견고딕" panose="02030600000101010101" pitchFamily="18" charset="-127"/>
+            </a:endParaRPr>
+          </a:p>
+          <a:p>
+            <a:pPr defTabSz="779233">
+              <a:lnSpc>
+                <a:spcPct val="150000"/>
+              </a:lnSpc>
+            </a:pPr>
             <a:r>
               <a:rPr lang="ko-KR" altLang="en-US" sz="1600" b="1" dirty="0">
                 <a:solidFill>
@@ -5290,8 +5662,192 @@
               <a:ea typeface="HY견고딕" panose="02030600000101010101" pitchFamily="18" charset="-127"/>
             </a:endParaRPr>
           </a:p>
+          <a:p>
+            <a:pPr defTabSz="779233">
+              <a:lnSpc>
+                <a:spcPct val="150000"/>
+              </a:lnSpc>
+            </a:pPr>
+            <a:r>
+              <a:rPr lang="en-US" altLang="ko-KR" sz="1400" dirty="0">
+                <a:solidFill>
+                  <a:prstClr val="black"/>
+                </a:solidFill>
+                <a:latin typeface="맑은 고딕" panose="020B0503020000020004" pitchFamily="50" charset="-127"/>
+              </a:rPr>
+              <a:t>  - PR comment </a:t>
+            </a:r>
+            <a:r>
+              <a:rPr lang="ko-KR" altLang="en-US" sz="1400" dirty="0">
+                <a:solidFill>
+                  <a:prstClr val="black"/>
+                </a:solidFill>
+                <a:latin typeface="맑은 고딕" panose="020B0503020000020004" pitchFamily="50" charset="-127"/>
+              </a:rPr>
+              <a:t>를 통해 리뷰 내용을 의사소통 하였고 </a:t>
+            </a:r>
+            <a:endParaRPr lang="en-US" altLang="ko-KR" sz="1400" dirty="0">
+              <a:solidFill>
+                <a:prstClr val="black"/>
+              </a:solidFill>
+              <a:latin typeface="맑은 고딕" panose="020B0503020000020004" pitchFamily="50" charset="-127"/>
+            </a:endParaRPr>
+          </a:p>
+          <a:p>
+            <a:pPr defTabSz="779233">
+              <a:lnSpc>
+                <a:spcPct val="150000"/>
+              </a:lnSpc>
+            </a:pPr>
+            <a:r>
+              <a:rPr lang="en-US" altLang="ko-KR" sz="1400" dirty="0">
+                <a:solidFill>
+                  <a:prstClr val="black"/>
+                </a:solidFill>
+                <a:latin typeface="맑은 고딕" panose="020B0503020000020004" pitchFamily="50" charset="-127"/>
+              </a:rPr>
+              <a:t>   </a:t>
+            </a:r>
+            <a:r>
+              <a:rPr lang="ko-KR" altLang="en-US" sz="1400" dirty="0">
+                <a:solidFill>
+                  <a:prstClr val="black"/>
+                </a:solidFill>
+                <a:latin typeface="맑은 고딕" panose="020B0503020000020004" pitchFamily="50" charset="-127"/>
+              </a:rPr>
+              <a:t>세부적인 대화가 필요한 경우는 단체방에서 </a:t>
+            </a:r>
+            <a:endParaRPr lang="en-US" altLang="ko-KR" sz="1400" dirty="0">
+              <a:solidFill>
+                <a:prstClr val="black"/>
+              </a:solidFill>
+              <a:latin typeface="맑은 고딕" panose="020B0503020000020004" pitchFamily="50" charset="-127"/>
+            </a:endParaRPr>
+          </a:p>
+          <a:p>
+            <a:pPr defTabSz="779233">
+              <a:lnSpc>
+                <a:spcPct val="150000"/>
+              </a:lnSpc>
+            </a:pPr>
+            <a:r>
+              <a:rPr lang="en-US" altLang="ko-KR" sz="1400" dirty="0">
+                <a:solidFill>
+                  <a:prstClr val="black"/>
+                </a:solidFill>
+                <a:latin typeface="맑은 고딕" panose="020B0503020000020004" pitchFamily="50" charset="-127"/>
+              </a:rPr>
+              <a:t>   </a:t>
+            </a:r>
+            <a:r>
+              <a:rPr lang="ko-KR" altLang="en-US" sz="1400" dirty="0">
+                <a:solidFill>
+                  <a:prstClr val="black"/>
+                </a:solidFill>
+                <a:latin typeface="맑은 고딕" panose="020B0503020000020004" pitchFamily="50" charset="-127"/>
+              </a:rPr>
+              <a:t>서로 의논</a:t>
+            </a:r>
+            <a:r>
+              <a:rPr lang="en-US" altLang="ko-KR" sz="1400" dirty="0">
+                <a:solidFill>
+                  <a:prstClr val="black"/>
+                </a:solidFill>
+                <a:latin typeface="맑은 고딕" panose="020B0503020000020004" pitchFamily="50" charset="-127"/>
+              </a:rPr>
+              <a:t>, </a:t>
+            </a:r>
+            <a:r>
+              <a:rPr lang="ko-KR" altLang="en-US" sz="1400" dirty="0">
+                <a:solidFill>
+                  <a:prstClr val="black"/>
+                </a:solidFill>
+                <a:latin typeface="맑은 고딕" panose="020B0503020000020004" pitchFamily="50" charset="-127"/>
+              </a:rPr>
+              <a:t>토론을 진행함</a:t>
+            </a:r>
+            <a:r>
+              <a:rPr lang="en-US" altLang="ko-KR" sz="1400" dirty="0">
+                <a:solidFill>
+                  <a:prstClr val="black"/>
+                </a:solidFill>
+                <a:latin typeface="맑은 고딕" panose="020B0503020000020004" pitchFamily="50" charset="-127"/>
+              </a:rPr>
+              <a:t>.</a:t>
+            </a:r>
+          </a:p>
         </p:txBody>
       </p:sp>
+      <p:pic>
+        <p:nvPicPr>
+          <p:cNvPr id="9" name="그림 8">
+            <a:extLst>
+              <a:ext uri="{FF2B5EF4-FFF2-40B4-BE49-F238E27FC236}">
+                <a16:creationId xmlns:a16="http://schemas.microsoft.com/office/drawing/2014/main" id="{579214CC-F7F5-49E6-BC7E-D158E958C61F}"/>
+              </a:ext>
+            </a:extLst>
+          </p:cNvPr>
+          <p:cNvPicPr>
+            <a:picLocks noChangeAspect="1"/>
+          </p:cNvPicPr>
+          <p:nvPr/>
+        </p:nvPicPr>
+        <p:blipFill>
+          <a:blip r:embed="rId2"/>
+          <a:stretch>
+            <a:fillRect/>
+          </a:stretch>
+        </p:blipFill>
+        <p:spPr>
+          <a:xfrm>
+            <a:off x="3995936" y="202632"/>
+            <a:ext cx="3024336" cy="3531031"/>
+          </a:xfrm>
+          <a:prstGeom prst="rect">
+            <a:avLst/>
+          </a:prstGeom>
+          <a:ln w="3175">
+            <a:solidFill>
+              <a:schemeClr val="tx1"/>
+            </a:solidFill>
+          </a:ln>
+        </p:spPr>
+      </p:pic>
+      <p:pic>
+        <p:nvPicPr>
+          <p:cNvPr id="11" name="그림 10">
+            <a:extLst>
+              <a:ext uri="{FF2B5EF4-FFF2-40B4-BE49-F238E27FC236}">
+                <a16:creationId xmlns:a16="http://schemas.microsoft.com/office/drawing/2014/main" id="{B3D713B8-0C4E-4C2F-994E-B4184CD5380A}"/>
+              </a:ext>
+            </a:extLst>
+          </p:cNvPr>
+          <p:cNvPicPr>
+            <a:picLocks noChangeAspect="1"/>
+          </p:cNvPicPr>
+          <p:nvPr/>
+        </p:nvPicPr>
+        <p:blipFill>
+          <a:blip r:embed="rId3"/>
+          <a:stretch>
+            <a:fillRect/>
+          </a:stretch>
+        </p:blipFill>
+        <p:spPr>
+          <a:xfrm>
+            <a:off x="5917835" y="2242771"/>
+            <a:ext cx="3028310" cy="2866301"/>
+          </a:xfrm>
+          <a:prstGeom prst="rect">
+            <a:avLst/>
+          </a:prstGeom>
+          <a:ln w="3175">
+            <a:solidFill>
+              <a:schemeClr val="tx1"/>
+            </a:solidFill>
+          </a:ln>
+        </p:spPr>
+      </p:pic>
     </p:spTree>
     <p:extLst>
       <p:ext uri="{BB962C8B-B14F-4D97-AF65-F5344CB8AC3E}">
@@ -5384,375 +5940,11 @@
                 <a:latin typeface="HY견고딕" panose="02030600000101010101" pitchFamily="18" charset="-127"/>
                 <a:ea typeface="HY견고딕" panose="02030600000101010101" pitchFamily="18" charset="-127"/>
               </a:rPr>
-              <a:t>가가</a:t>
-            </a:r>
-            <a:r>
-              <a:rPr lang="en-US" altLang="ko-KR" sz="2400" dirty="0" err="1">
-                <a:latin typeface="HY견고딕" panose="02030600000101010101" pitchFamily="18" charset="-127"/>
-                <a:ea typeface="HY견고딕" panose="02030600000101010101" pitchFamily="18" charset="-127"/>
-              </a:rPr>
-              <a:t>dwded</a:t>
-            </a:r>
-            <a:r>
-              <a:rPr lang="ko-KR" altLang="en-US" sz="2400" dirty="0">
-                <a:latin typeface="HY견고딕" panose="02030600000101010101" pitchFamily="18" charset="-127"/>
-                <a:ea typeface="HY견고딕" panose="02030600000101010101" pitchFamily="18" charset="-127"/>
-              </a:rPr>
-              <a:t>가 </a:t>
-            </a:r>
-            <a:r>
-              <a:rPr lang="en-US" altLang="ko-KR" sz="2400" dirty="0">
-                <a:latin typeface="HY견고딕" panose="02030600000101010101" pitchFamily="18" charset="-127"/>
-                <a:ea typeface="HY견고딕" panose="02030600000101010101" pitchFamily="18" charset="-127"/>
-              </a:rPr>
-              <a:t>| </a:t>
-            </a:r>
-            <a:r>
-              <a:rPr lang="ko-KR" altLang="en-US" sz="1800" dirty="0" err="1">
-                <a:latin typeface="HY견고딕" panose="02030600000101010101" pitchFamily="18" charset="-127"/>
-                <a:ea typeface="HY견고딕" panose="02030600000101010101" pitchFamily="18" charset="-127"/>
-              </a:rPr>
-              <a:t>나나나</a:t>
+              <a:t>회 고</a:t>
             </a:r>
             <a:endParaRPr lang="ko-KR" altLang="en-US" sz="1800" dirty="0">
               <a:latin typeface="HY견고딕" panose="02030600000101010101" pitchFamily="18" charset="-127"/>
               <a:ea typeface="HY견고딕" panose="02030600000101010101" pitchFamily="18" charset="-127"/>
-            </a:endParaRPr>
-          </a:p>
-        </p:txBody>
-      </p:sp>
-      <p:sp>
-        <p:nvSpPr>
-          <p:cNvPr id="5" name="Google Shape;121;p17"/>
-          <p:cNvSpPr txBox="1"/>
-          <p:nvPr/>
-        </p:nvSpPr>
-        <p:spPr>
-          <a:xfrm>
-            <a:off x="149038" y="699542"/>
-            <a:ext cx="8023361" cy="2308284"/>
-          </a:xfrm>
-          <a:prstGeom prst="rect">
-            <a:avLst/>
-          </a:prstGeom>
-          <a:noFill/>
-          <a:ln>
-            <a:noFill/>
-          </a:ln>
-        </p:spPr>
-        <p:txBody>
-          <a:bodyPr spcFirstLastPara="1" wrap="square" lIns="91425" tIns="45700" rIns="91425" bIns="45700" anchor="t" anchorCtr="0">
-            <a:spAutoFit/>
-          </a:bodyPr>
-          <a:lstStyle/>
-          <a:p>
-            <a:pPr marL="0" lvl="0" indent="0" algn="l" rtl="0">
-              <a:lnSpc>
-                <a:spcPct val="150000"/>
-              </a:lnSpc>
-              <a:spcBef>
-                <a:spcPts val="0"/>
-              </a:spcBef>
-              <a:spcAft>
-                <a:spcPts val="0"/>
-              </a:spcAft>
-              <a:buClr>
-                <a:schemeClr val="dk1"/>
-              </a:buClr>
-              <a:buFont typeface="Arial"/>
-              <a:buNone/>
-            </a:pPr>
-            <a:r>
-              <a:rPr lang="ko-KR" sz="1200" dirty="0">
-                <a:solidFill>
-                  <a:schemeClr val="dk1"/>
-                </a:solidFill>
-              </a:rPr>
-              <a:t>■ </a:t>
-            </a:r>
-            <a:r>
-              <a:rPr lang="ko-KR" altLang="en-US" sz="1200" dirty="0">
-                <a:solidFill>
-                  <a:schemeClr val="dk1"/>
-                </a:solidFill>
-              </a:rPr>
-              <a:t>유의사항</a:t>
-            </a:r>
-            <a:endParaRPr lang="en-US" altLang="ko-KR" sz="1200" dirty="0">
-              <a:solidFill>
-                <a:schemeClr val="dk1"/>
-              </a:solidFill>
-            </a:endParaRPr>
-          </a:p>
-          <a:p>
-            <a:pPr marL="0" lvl="0" indent="0" algn="l" rtl="0">
-              <a:lnSpc>
-                <a:spcPct val="150000"/>
-              </a:lnSpc>
-              <a:spcBef>
-                <a:spcPts val="0"/>
-              </a:spcBef>
-              <a:spcAft>
-                <a:spcPts val="0"/>
-              </a:spcAft>
-              <a:buClr>
-                <a:schemeClr val="dk1"/>
-              </a:buClr>
-              <a:buFont typeface="Arial"/>
-              <a:buNone/>
-            </a:pPr>
-            <a:r>
-              <a:rPr lang="en-US" altLang="ko-KR" sz="1200" dirty="0">
-                <a:solidFill>
-                  <a:schemeClr val="dk1"/>
-                </a:solidFill>
-              </a:rPr>
-              <a:t>- TDD practice </a:t>
-            </a:r>
-            <a:r>
-              <a:rPr lang="ko-KR" altLang="en-US" sz="1200" dirty="0">
-                <a:solidFill>
-                  <a:schemeClr val="dk1"/>
-                </a:solidFill>
-              </a:rPr>
-              <a:t>적용 필수</a:t>
-            </a:r>
-            <a:endParaRPr lang="en-US" altLang="ko-KR" sz="1200" dirty="0">
-              <a:solidFill>
-                <a:schemeClr val="dk1"/>
-              </a:solidFill>
-            </a:endParaRPr>
-          </a:p>
-          <a:p>
-            <a:pPr defTabSz="1038977">
-              <a:lnSpc>
-                <a:spcPct val="150000"/>
-              </a:lnSpc>
-            </a:pPr>
-            <a:r>
-              <a:rPr lang="en-US" altLang="ko-KR" sz="1200" dirty="0">
-                <a:solidFill>
-                  <a:prstClr val="black"/>
-                </a:solidFill>
-                <a:latin typeface="맑은 고딕" panose="020B0503020000020004" pitchFamily="50" charset="-127"/>
-              </a:rPr>
-              <a:t>- Test code</a:t>
-            </a:r>
-            <a:r>
-              <a:rPr lang="ko-KR" altLang="en-US" sz="1200" dirty="0">
-                <a:solidFill>
-                  <a:prstClr val="black"/>
-                </a:solidFill>
-                <a:latin typeface="맑은 고딕" panose="020B0503020000020004" pitchFamily="50" charset="-127"/>
-              </a:rPr>
-              <a:t>의 적절성 </a:t>
-            </a:r>
-            <a:r>
-              <a:rPr lang="en-US" altLang="ko-KR" sz="1200" dirty="0">
-                <a:solidFill>
-                  <a:prstClr val="black"/>
-                </a:solidFill>
-                <a:latin typeface="맑은 고딕" panose="020B0503020000020004" pitchFamily="50" charset="-127"/>
-              </a:rPr>
-              <a:t>(TDD </a:t>
-            </a:r>
-            <a:r>
-              <a:rPr lang="ko-KR" altLang="en-US" sz="1200" dirty="0">
-                <a:solidFill>
-                  <a:prstClr val="black"/>
-                </a:solidFill>
-                <a:latin typeface="맑은 고딕" panose="020B0503020000020004" pitchFamily="50" charset="-127"/>
-              </a:rPr>
-              <a:t>측면</a:t>
-            </a:r>
-            <a:r>
-              <a:rPr lang="en-US" altLang="ko-KR" sz="1200" dirty="0">
-                <a:solidFill>
-                  <a:prstClr val="black"/>
-                </a:solidFill>
-                <a:latin typeface="맑은 고딕" panose="020B0503020000020004" pitchFamily="50" charset="-127"/>
-              </a:rPr>
-              <a:t>)</a:t>
-            </a:r>
-          </a:p>
-          <a:p>
-            <a:pPr defTabSz="1038977">
-              <a:lnSpc>
-                <a:spcPct val="150000"/>
-              </a:lnSpc>
-            </a:pPr>
-            <a:r>
-              <a:rPr lang="en-US" altLang="ko-KR" sz="1200" dirty="0">
-                <a:solidFill>
-                  <a:prstClr val="black"/>
-                </a:solidFill>
-                <a:latin typeface="맑은 고딕" panose="020B0503020000020004" pitchFamily="50" charset="-127"/>
-              </a:rPr>
-              <a:t>    - Code Review</a:t>
-            </a:r>
-            <a:r>
-              <a:rPr lang="ko-KR" altLang="en-US" sz="1200" dirty="0">
-                <a:solidFill>
-                  <a:prstClr val="black"/>
-                </a:solidFill>
-                <a:latin typeface="맑은 고딕" panose="020B0503020000020004" pitchFamily="50" charset="-127"/>
-              </a:rPr>
-              <a:t>의 적절성 </a:t>
-            </a:r>
-            <a:r>
-              <a:rPr lang="en-US" altLang="ko-KR" sz="1200" dirty="0">
-                <a:solidFill>
-                  <a:prstClr val="black"/>
-                </a:solidFill>
-                <a:latin typeface="맑은 고딕" panose="020B0503020000020004" pitchFamily="50" charset="-127"/>
-              </a:rPr>
-              <a:t>(Communication Manner)</a:t>
-            </a:r>
-          </a:p>
-          <a:p>
-            <a:pPr defTabSz="1038977">
-              <a:lnSpc>
-                <a:spcPct val="150000"/>
-              </a:lnSpc>
-            </a:pPr>
-            <a:r>
-              <a:rPr lang="en-US" altLang="ko-KR" sz="1200" dirty="0">
-                <a:solidFill>
-                  <a:prstClr val="black"/>
-                </a:solidFill>
-                <a:latin typeface="맑은 고딕" panose="020B0503020000020004" pitchFamily="50" charset="-127"/>
-              </a:rPr>
-              <a:t>    - Production code</a:t>
-            </a:r>
-            <a:r>
-              <a:rPr lang="ko-KR" altLang="en-US" sz="1200" dirty="0">
-                <a:solidFill>
-                  <a:prstClr val="black"/>
-                </a:solidFill>
-                <a:latin typeface="맑은 고딕" panose="020B0503020000020004" pitchFamily="50" charset="-127"/>
-              </a:rPr>
-              <a:t>의 </a:t>
-            </a:r>
-            <a:r>
-              <a:rPr lang="ko-KR" altLang="en-US" sz="1200" dirty="0" err="1">
-                <a:solidFill>
-                  <a:prstClr val="black"/>
-                </a:solidFill>
-                <a:latin typeface="맑은 고딕" panose="020B0503020000020004" pitchFamily="50" charset="-127"/>
-              </a:rPr>
-              <a:t>가독성</a:t>
-            </a:r>
-            <a:r>
-              <a:rPr lang="ko-KR" altLang="en-US" sz="1200" dirty="0">
-                <a:solidFill>
-                  <a:prstClr val="black"/>
-                </a:solidFill>
-                <a:latin typeface="맑은 고딕" panose="020B0503020000020004" pitchFamily="50" charset="-127"/>
-              </a:rPr>
-              <a:t> 및 유지보수성 </a:t>
-            </a:r>
-            <a:r>
-              <a:rPr lang="en-US" altLang="ko-KR" sz="1200" dirty="0">
-                <a:solidFill>
-                  <a:prstClr val="black"/>
-                </a:solidFill>
-                <a:latin typeface="맑은 고딕" panose="020B0503020000020004" pitchFamily="50" charset="-127"/>
-              </a:rPr>
-              <a:t>(Clean Code, Refactoring, Secure Coding)</a:t>
-            </a:r>
-          </a:p>
-          <a:p>
-            <a:pPr defTabSz="1038977">
-              <a:lnSpc>
-                <a:spcPct val="150000"/>
-              </a:lnSpc>
-            </a:pPr>
-            <a:r>
-              <a:rPr lang="en-US" altLang="ko-KR" sz="1200" dirty="0">
-                <a:solidFill>
-                  <a:prstClr val="black"/>
-                </a:solidFill>
-                <a:latin typeface="맑은 고딕" panose="020B0503020000020004" pitchFamily="50" charset="-127"/>
-              </a:rPr>
-              <a:t>    - Commit</a:t>
-            </a:r>
-            <a:r>
-              <a:rPr lang="ko-KR" altLang="en-US" sz="1200" dirty="0">
-                <a:solidFill>
-                  <a:prstClr val="black"/>
-                </a:solidFill>
-                <a:latin typeface="맑은 고딕" panose="020B0503020000020004" pitchFamily="50" charset="-127"/>
-              </a:rPr>
-              <a:t>의 규모</a:t>
-            </a:r>
-            <a:r>
-              <a:rPr lang="en-US" altLang="ko-KR" sz="1200" dirty="0">
-                <a:solidFill>
-                  <a:prstClr val="black"/>
-                </a:solidFill>
-                <a:latin typeface="맑은 고딕" panose="020B0503020000020004" pitchFamily="50" charset="-127"/>
-              </a:rPr>
-              <a:t>(class/method</a:t>
-            </a:r>
-            <a:r>
-              <a:rPr lang="ko-KR" altLang="en-US" sz="1200" dirty="0">
-                <a:solidFill>
-                  <a:prstClr val="black"/>
-                </a:solidFill>
-                <a:latin typeface="맑은 고딕" panose="020B0503020000020004" pitchFamily="50" charset="-127"/>
-              </a:rPr>
-              <a:t> 크기</a:t>
-            </a:r>
-            <a:r>
-              <a:rPr lang="en-US" altLang="ko-KR" sz="1200" dirty="0">
-                <a:solidFill>
-                  <a:prstClr val="black"/>
-                </a:solidFill>
-                <a:latin typeface="맑은 고딕" panose="020B0503020000020004" pitchFamily="50" charset="-127"/>
-              </a:rPr>
-              <a:t>)</a:t>
-            </a:r>
-          </a:p>
-          <a:p>
-            <a:pPr defTabSz="1038977">
-              <a:lnSpc>
-                <a:spcPct val="150000"/>
-              </a:lnSpc>
-            </a:pPr>
-            <a:r>
-              <a:rPr lang="en-US" altLang="ko-KR" sz="1200" dirty="0">
-                <a:solidFill>
-                  <a:prstClr val="black"/>
-                </a:solidFill>
-                <a:latin typeface="맑은 고딕" panose="020B0503020000020004" pitchFamily="50" charset="-127"/>
-              </a:rPr>
-              <a:t>    - </a:t>
-            </a:r>
-            <a:r>
-              <a:rPr lang="ko-KR" altLang="en-US" sz="1200" dirty="0">
-                <a:solidFill>
-                  <a:prstClr val="black"/>
-                </a:solidFill>
-                <a:latin typeface="맑은 고딕" panose="020B0503020000020004" pitchFamily="50" charset="-127"/>
-              </a:rPr>
-              <a:t>코드 복잡도</a:t>
-            </a:r>
-            <a:endParaRPr lang="ko-KR" altLang="en-US" sz="1200" dirty="0"/>
-          </a:p>
-          <a:p>
-            <a:pPr>
-              <a:lnSpc>
-                <a:spcPct val="150000"/>
-              </a:lnSpc>
-              <a:buClr>
-                <a:schemeClr val="dk1"/>
-              </a:buClr>
-            </a:pPr>
-            <a:endParaRPr lang="en-US" altLang="ko-KR" sz="1200" dirty="0">
-              <a:solidFill>
-                <a:prstClr val="black"/>
-              </a:solidFill>
-              <a:latin typeface="맑은 고딕" panose="020B0503020000020004" pitchFamily="50" charset="-127"/>
             </a:endParaRPr>
           </a:p>
         </p:txBody>
@@ -5798,146 +5990,170 @@
       </p:sp>
       <p:sp>
         <p:nvSpPr>
-          <p:cNvPr id="8" name="TextBox 36"/>
-          <p:cNvSpPr txBox="1"/>
+          <p:cNvPr id="7" name="직사각형 6"/>
+          <p:cNvSpPr/>
           <p:nvPr/>
         </p:nvSpPr>
         <p:spPr>
           <a:xfrm>
-            <a:off x="107504" y="2571750"/>
-            <a:ext cx="4360489" cy="2631490"/>
+            <a:off x="179512" y="770992"/>
+            <a:ext cx="8208912" cy="3426772"/>
           </a:xfrm>
           <a:prstGeom prst="rect">
             <a:avLst/>
           </a:prstGeom>
-          <a:noFill/>
         </p:spPr>
         <p:txBody>
-          <a:bodyPr wrap="none" rtlCol="0">
+          <a:bodyPr wrap="square">
             <a:spAutoFit/>
           </a:bodyPr>
-          <a:lstStyle>
-            <a:defPPr>
-              <a:defRPr lang="ko-KR"/>
-            </a:defPPr>
-            <a:lvl1pPr marL="0" algn="l" defTabSz="779252" rtl="0" eaLnBrk="1" latinLnBrk="1" hangingPunct="1">
-              <a:defRPr sz="1500" kern="1200">
-                <a:solidFill>
-                  <a:schemeClr val="tx1"/>
-                </a:solidFill>
-                <a:latin typeface="+mn-lt"/>
-                <a:ea typeface="+mn-ea"/>
-                <a:cs typeface="+mn-cs"/>
-              </a:defRPr>
-            </a:lvl1pPr>
-            <a:lvl2pPr marL="389626" algn="l" defTabSz="779252" rtl="0" eaLnBrk="1" latinLnBrk="1" hangingPunct="1">
-              <a:defRPr sz="1500" kern="1200">
-                <a:solidFill>
-                  <a:schemeClr val="tx1"/>
-                </a:solidFill>
-                <a:latin typeface="+mn-lt"/>
-                <a:ea typeface="+mn-ea"/>
-                <a:cs typeface="+mn-cs"/>
-              </a:defRPr>
-            </a:lvl2pPr>
-            <a:lvl3pPr marL="779252" algn="l" defTabSz="779252" rtl="0" eaLnBrk="1" latinLnBrk="1" hangingPunct="1">
-              <a:defRPr sz="1500" kern="1200">
-                <a:solidFill>
-                  <a:schemeClr val="tx1"/>
-                </a:solidFill>
-                <a:latin typeface="+mn-lt"/>
-                <a:ea typeface="+mn-ea"/>
-                <a:cs typeface="+mn-cs"/>
-              </a:defRPr>
-            </a:lvl3pPr>
-            <a:lvl4pPr marL="1168878" algn="l" defTabSz="779252" rtl="0" eaLnBrk="1" latinLnBrk="1" hangingPunct="1">
-              <a:defRPr sz="1500" kern="1200">
-                <a:solidFill>
-                  <a:schemeClr val="tx1"/>
-                </a:solidFill>
-                <a:latin typeface="+mn-lt"/>
-                <a:ea typeface="+mn-ea"/>
-                <a:cs typeface="+mn-cs"/>
-              </a:defRPr>
-            </a:lvl4pPr>
-            <a:lvl5pPr marL="1558503" algn="l" defTabSz="779252" rtl="0" eaLnBrk="1" latinLnBrk="1" hangingPunct="1">
-              <a:defRPr sz="1500" kern="1200">
-                <a:solidFill>
-                  <a:schemeClr val="tx1"/>
-                </a:solidFill>
-                <a:latin typeface="+mn-lt"/>
-                <a:ea typeface="+mn-ea"/>
-                <a:cs typeface="+mn-cs"/>
-              </a:defRPr>
-            </a:lvl5pPr>
-            <a:lvl6pPr marL="1948129" algn="l" defTabSz="779252" rtl="0" eaLnBrk="1" latinLnBrk="1" hangingPunct="1">
-              <a:defRPr sz="1500" kern="1200">
-                <a:solidFill>
-                  <a:schemeClr val="tx1"/>
-                </a:solidFill>
-                <a:latin typeface="+mn-lt"/>
-                <a:ea typeface="+mn-ea"/>
-                <a:cs typeface="+mn-cs"/>
-              </a:defRPr>
-            </a:lvl6pPr>
-            <a:lvl7pPr marL="2337755" algn="l" defTabSz="779252" rtl="0" eaLnBrk="1" latinLnBrk="1" hangingPunct="1">
-              <a:defRPr sz="1500" kern="1200">
-                <a:solidFill>
-                  <a:schemeClr val="tx1"/>
-                </a:solidFill>
-                <a:latin typeface="+mn-lt"/>
-                <a:ea typeface="+mn-ea"/>
-                <a:cs typeface="+mn-cs"/>
-              </a:defRPr>
-            </a:lvl7pPr>
-            <a:lvl8pPr marL="2727381" algn="l" defTabSz="779252" rtl="0" eaLnBrk="1" latinLnBrk="1" hangingPunct="1">
-              <a:defRPr sz="1500" kern="1200">
-                <a:solidFill>
-                  <a:schemeClr val="tx1"/>
-                </a:solidFill>
-                <a:latin typeface="+mn-lt"/>
-                <a:ea typeface="+mn-ea"/>
-                <a:cs typeface="+mn-cs"/>
-              </a:defRPr>
-            </a:lvl8pPr>
-            <a:lvl9pPr marL="3117007" algn="l" defTabSz="779252" rtl="0" eaLnBrk="1" latinLnBrk="1" hangingPunct="1">
-              <a:defRPr sz="1500" kern="1200">
-                <a:solidFill>
-                  <a:schemeClr val="tx1"/>
-                </a:solidFill>
-                <a:latin typeface="+mn-lt"/>
-                <a:ea typeface="+mn-ea"/>
-                <a:cs typeface="+mn-cs"/>
-              </a:defRPr>
-            </a:lvl9pPr>
-          </a:lstStyle>
-          <a:p>
-            <a:pPr lvl="0">
+          <a:lstStyle/>
+          <a:p>
+            <a:pPr defTabSz="779233">
               <a:lnSpc>
                 <a:spcPct val="150000"/>
               </a:lnSpc>
-              <a:defRPr/>
             </a:pPr>
             <a:r>
-              <a:rPr lang="ko-KR" altLang="en-US" sz="1100" dirty="0">
+              <a:rPr lang="ko-KR" altLang="en-US" sz="1400" b="1" dirty="0">
                 <a:solidFill>
                   <a:prstClr val="black"/>
                 </a:solidFill>
                 <a:latin typeface="HY견고딕" panose="02030600000101010101" pitchFamily="18" charset="-127"/>
                 <a:ea typeface="HY견고딕" panose="02030600000101010101" pitchFamily="18" charset="-127"/>
               </a:rPr>
-              <a:t>■ 가점</a:t>
-            </a:r>
-            <a:r>
-              <a:rPr lang="ko-KR" altLang="en-US" sz="1100" b="1" dirty="0">
-                <a:solidFill>
-                  <a:prstClr val="black"/>
-                </a:solidFill>
-                <a:latin typeface="맑은 고딕" panose="020B0503020000020004" pitchFamily="50" charset="-127"/>
-              </a:rPr>
-              <a:t> 요소</a:t>
-            </a:r>
-            <a:endParaRPr lang="en-US" altLang="ko-KR" sz="1100" b="1" dirty="0">
+              <a:t>■ 팀 프로젝트를 진행하면서 느낀 점</a:t>
+            </a:r>
+            <a:endParaRPr lang="en-US" altLang="ko-KR" sz="1400" b="1" dirty="0">
+              <a:solidFill>
+                <a:prstClr val="black"/>
+              </a:solidFill>
+              <a:latin typeface="HY견고딕" panose="02030600000101010101" pitchFamily="18" charset="-127"/>
+              <a:ea typeface="HY견고딕" panose="02030600000101010101" pitchFamily="18" charset="-127"/>
+            </a:endParaRPr>
+          </a:p>
+          <a:p>
+            <a:pPr defTabSz="779233">
+              <a:lnSpc>
+                <a:spcPct val="150000"/>
+              </a:lnSpc>
+            </a:pPr>
+            <a:r>
+              <a:rPr lang="ko-KR" altLang="en-US" sz="1100" dirty="0">
+                <a:solidFill>
+                  <a:prstClr val="black"/>
+                </a:solidFill>
+                <a:latin typeface="맑은 고딕" panose="020B0503020000020004" pitchFamily="50" charset="-127"/>
+              </a:rPr>
+              <a:t> 온라인 프로젝트 진행이 처음이라 문제를 해결하고 팀원과 소통하는 게 쉽지 않았습니다</a:t>
+            </a:r>
+            <a:r>
+              <a:rPr lang="en-US" altLang="ko-KR" sz="1100" dirty="0">
+                <a:solidFill>
+                  <a:prstClr val="black"/>
+                </a:solidFill>
+                <a:latin typeface="맑은 고딕" panose="020B0503020000020004" pitchFamily="50" charset="-127"/>
+              </a:rPr>
+              <a:t>. </a:t>
+            </a:r>
+            <a:r>
+              <a:rPr lang="ko-KR" altLang="en-US" sz="1100" dirty="0">
+                <a:solidFill>
+                  <a:prstClr val="black"/>
+                </a:solidFill>
+                <a:latin typeface="맑은 고딕" panose="020B0503020000020004" pitchFamily="50" charset="-127"/>
+              </a:rPr>
+              <a:t>이번 과정을 통해 올바른 코드가 무엇인지 생각할 수 있는 계기가 되었고</a:t>
+            </a:r>
+            <a:r>
+              <a:rPr lang="en-US" altLang="ko-KR" sz="1100" dirty="0">
+                <a:solidFill>
+                  <a:prstClr val="black"/>
+                </a:solidFill>
+                <a:latin typeface="맑은 고딕" panose="020B0503020000020004" pitchFamily="50" charset="-127"/>
+              </a:rPr>
+              <a:t> </a:t>
+            </a:r>
+            <a:r>
+              <a:rPr lang="ko-KR" altLang="en-US" sz="1100" dirty="0">
+                <a:solidFill>
+                  <a:prstClr val="black"/>
+                </a:solidFill>
+                <a:latin typeface="맑은 고딕" panose="020B0503020000020004" pitchFamily="50" charset="-127"/>
+              </a:rPr>
+              <a:t>현업에서 어떻게 활용할 수 있을지 고민도 해본 시간이었습니다</a:t>
+            </a:r>
+            <a:r>
+              <a:rPr lang="en-US" altLang="ko-KR" sz="1100" dirty="0">
+                <a:solidFill>
+                  <a:prstClr val="black"/>
+                </a:solidFill>
+                <a:latin typeface="맑은 고딕" panose="020B0503020000020004" pitchFamily="50" charset="-127"/>
+              </a:rPr>
+              <a:t>. Git, </a:t>
+            </a:r>
+            <a:r>
+              <a:rPr lang="en-US" altLang="ko-KR" sz="1100" dirty="0" err="1">
+                <a:solidFill>
+                  <a:prstClr val="black"/>
+                </a:solidFill>
+                <a:latin typeface="맑은 고딕" panose="020B0503020000020004" pitchFamily="50" charset="-127"/>
+              </a:rPr>
+              <a:t>Github</a:t>
+            </a:r>
+            <a:r>
+              <a:rPr lang="en-US" altLang="ko-KR" sz="1100" dirty="0">
+                <a:solidFill>
+                  <a:prstClr val="black"/>
+                </a:solidFill>
+                <a:latin typeface="맑은 고딕" panose="020B0503020000020004" pitchFamily="50" charset="-127"/>
+              </a:rPr>
+              <a:t> </a:t>
+            </a:r>
+            <a:r>
+              <a:rPr lang="ko-KR" altLang="en-US" sz="1100" dirty="0">
+                <a:solidFill>
+                  <a:prstClr val="black"/>
+                </a:solidFill>
+                <a:latin typeface="맑은 고딕" panose="020B0503020000020004" pitchFamily="50" charset="-127"/>
+              </a:rPr>
+              <a:t>같은 낯선 개발 환경에서 적응할 때쯤 </a:t>
+            </a:r>
+            <a:r>
+              <a:rPr lang="en-US" altLang="ko-KR" sz="1100" dirty="0">
+                <a:solidFill>
+                  <a:prstClr val="black"/>
+                </a:solidFill>
+                <a:latin typeface="맑은 고딕" panose="020B0503020000020004" pitchFamily="50" charset="-127"/>
+              </a:rPr>
+              <a:t>CRA </a:t>
+            </a:r>
+            <a:r>
+              <a:rPr lang="ko-KR" altLang="en-US" sz="1100" dirty="0">
+                <a:solidFill>
+                  <a:prstClr val="black"/>
+                </a:solidFill>
+                <a:latin typeface="맑은 고딕" panose="020B0503020000020004" pitchFamily="50" charset="-127"/>
+              </a:rPr>
+              <a:t>과정이 종료되어 아쉽습니다</a:t>
+            </a:r>
+            <a:r>
+              <a:rPr lang="en-US" altLang="ko-KR" sz="1100" dirty="0">
+                <a:solidFill>
+                  <a:prstClr val="black"/>
+                </a:solidFill>
+                <a:latin typeface="맑은 고딕" panose="020B0503020000020004" pitchFamily="50" charset="-127"/>
+              </a:rPr>
+              <a:t>.</a:t>
+            </a:r>
+          </a:p>
+          <a:p>
+            <a:pPr defTabSz="779233">
+              <a:lnSpc>
+                <a:spcPct val="150000"/>
+              </a:lnSpc>
+            </a:pPr>
+            <a:endParaRPr lang="en-US" altLang="ko-KR" sz="1200" dirty="0">
               <a:solidFill>
                 <a:prstClr val="black"/>
               </a:solidFill>
@@ -5945,593 +6161,296 @@
             </a:endParaRPr>
           </a:p>
           <a:p>
-            <a:pPr lvl="0">
+            <a:pPr defTabSz="779233">
               <a:lnSpc>
                 <a:spcPct val="150000"/>
               </a:lnSpc>
-              <a:defRPr/>
             </a:pPr>
             <a:r>
-              <a:rPr lang="en-US" altLang="ko-KR" sz="1100" dirty="0">
-                <a:solidFill>
-                  <a:prstClr val="black"/>
-                </a:solidFill>
-                <a:latin typeface="맑은 고딕" panose="020B0503020000020004" pitchFamily="50" charset="-127"/>
-              </a:rPr>
-              <a:t>    - </a:t>
-            </a:r>
-            <a:r>
-              <a:rPr lang="ko-KR" altLang="en-US" sz="1100" dirty="0">
-                <a:solidFill>
-                  <a:prstClr val="black"/>
-                </a:solidFill>
-                <a:latin typeface="맑은 고딕" panose="020B0503020000020004" pitchFamily="50" charset="-127"/>
-              </a:rPr>
-              <a:t>자체 </a:t>
-            </a:r>
-            <a:r>
-              <a:rPr lang="en-US" altLang="ko-KR" sz="1100" dirty="0">
-                <a:solidFill>
-                  <a:prstClr val="black"/>
-                </a:solidFill>
-                <a:latin typeface="맑은 고딕" panose="020B0503020000020004" pitchFamily="50" charset="-127"/>
-              </a:rPr>
-              <a:t>TC </a:t>
-            </a:r>
-            <a:r>
-              <a:rPr lang="ko-KR" altLang="en-US" sz="1100" dirty="0">
-                <a:solidFill>
-                  <a:prstClr val="black"/>
-                </a:solidFill>
-                <a:latin typeface="맑은 고딕" panose="020B0503020000020004" pitchFamily="50" charset="-127"/>
-              </a:rPr>
-              <a:t>개발한 경우</a:t>
-            </a:r>
-            <a:endParaRPr lang="en-US" altLang="ko-KR" sz="1100" b="1" dirty="0">
-              <a:solidFill>
-                <a:prstClr val="black"/>
-              </a:solidFill>
-              <a:latin typeface="맑은 고딕" panose="020B0503020000020004" pitchFamily="50" charset="-127"/>
-            </a:endParaRPr>
-          </a:p>
-          <a:p>
-            <a:pPr lvl="0">
+              <a:rPr lang="ko-KR" altLang="en-US" sz="1400" b="1" dirty="0">
+                <a:solidFill>
+                  <a:prstClr val="black"/>
+                </a:solidFill>
+                <a:latin typeface="HY견고딕" panose="02030600000101010101" pitchFamily="18" charset="-127"/>
+                <a:ea typeface="HY견고딕" panose="02030600000101010101" pitchFamily="18" charset="-127"/>
+              </a:rPr>
+              <a:t>■ 회고 주요 내용 </a:t>
+            </a:r>
+            <a:r>
+              <a:rPr lang="en-US" altLang="ko-KR" sz="1400" b="1" dirty="0">
+                <a:solidFill>
+                  <a:prstClr val="black"/>
+                </a:solidFill>
+                <a:latin typeface="HY견고딕" panose="02030600000101010101" pitchFamily="18" charset="-127"/>
+                <a:ea typeface="HY견고딕" panose="02030600000101010101" pitchFamily="18" charset="-127"/>
+              </a:rPr>
+              <a:t>(KPT)</a:t>
+            </a:r>
+          </a:p>
+          <a:p>
+            <a:pPr defTabSz="779233">
               <a:lnSpc>
                 <a:spcPct val="150000"/>
               </a:lnSpc>
-              <a:defRPr/>
             </a:pPr>
             <a:r>
-              <a:rPr lang="en-US" altLang="ko-KR" sz="1100" dirty="0">
-                <a:solidFill>
-                  <a:prstClr val="black"/>
-                </a:solidFill>
-                <a:latin typeface="맑은 고딕" panose="020B0503020000020004" pitchFamily="50" charset="-127"/>
-              </a:rPr>
-              <a:t>    - mock</a:t>
-            </a:r>
-            <a:r>
-              <a:rPr lang="ko-KR" altLang="en-US" sz="1100" dirty="0">
-                <a:solidFill>
-                  <a:prstClr val="black"/>
-                </a:solidFill>
-                <a:latin typeface="맑은 고딕" panose="020B0503020000020004" pitchFamily="50" charset="-127"/>
-              </a:rPr>
-              <a:t>을 사용한 경우</a:t>
-            </a:r>
-            <a:endParaRPr lang="en-US" altLang="ko-KR" sz="1100" b="1" dirty="0">
-              <a:solidFill>
-                <a:prstClr val="black"/>
-              </a:solidFill>
-              <a:latin typeface="맑은 고딕" panose="020B0503020000020004" pitchFamily="50" charset="-127"/>
-            </a:endParaRPr>
-          </a:p>
-          <a:p>
-            <a:pPr lvl="0">
+              <a:rPr lang="en-US" altLang="ko-KR" sz="1300" dirty="0">
+                <a:solidFill>
+                  <a:prstClr val="black"/>
+                </a:solidFill>
+                <a:latin typeface="맑은 고딕" panose="020B0503020000020004" pitchFamily="50" charset="-127"/>
+              </a:rPr>
+              <a:t> - Keep</a:t>
+            </a:r>
+          </a:p>
+          <a:p>
+            <a:pPr defTabSz="779233">
               <a:lnSpc>
                 <a:spcPct val="150000"/>
               </a:lnSpc>
-              <a:defRPr/>
             </a:pPr>
             <a:r>
-              <a:rPr lang="en-US" altLang="ko-KR" sz="1100" dirty="0">
-                <a:solidFill>
-                  <a:prstClr val="black"/>
-                </a:solidFill>
-                <a:latin typeface="맑은 고딕" panose="020B0503020000020004" pitchFamily="50" charset="-127"/>
-              </a:rPr>
-              <a:t>    - </a:t>
-            </a:r>
-            <a:r>
-              <a:rPr lang="ko-KR" altLang="en-US" sz="1100" dirty="0">
-                <a:solidFill>
-                  <a:prstClr val="black"/>
-                </a:solidFill>
-                <a:latin typeface="맑은 고딕" panose="020B0503020000020004" pitchFamily="50" charset="-127"/>
-              </a:rPr>
-              <a:t>리뷰 봇을 적용한 경우</a:t>
-            </a:r>
-            <a:endParaRPr kumimoji="0" lang="en-US" altLang="ko-KR" sz="1100" b="0" i="0" u="none" strike="noStrike" kern="1200" cap="none" spc="0" normalizeH="0" baseline="0" noProof="0" dirty="0">
-              <a:ln>
-                <a:noFill/>
-              </a:ln>
-              <a:solidFill>
-                <a:prstClr val="black"/>
-              </a:solidFill>
-              <a:effectLst/>
-              <a:uLnTx/>
-              <a:uFillTx/>
-              <a:latin typeface="HY견고딕" panose="02030600000101010101" pitchFamily="18" charset="-127"/>
-              <a:ea typeface="HY견고딕" panose="02030600000101010101" pitchFamily="18" charset="-127"/>
-            </a:endParaRPr>
-          </a:p>
-          <a:p>
-            <a:pPr marL="0" marR="0" lvl="0" indent="0" algn="l" defTabSz="779252" rtl="0" eaLnBrk="1" fontAlgn="auto" latinLnBrk="1" hangingPunct="1">
+              <a:rPr lang="en-US" altLang="ko-KR" sz="1200" dirty="0">
+                <a:solidFill>
+                  <a:prstClr val="black"/>
+                </a:solidFill>
+                <a:latin typeface="맑은 고딕" panose="020B0503020000020004" pitchFamily="50" charset="-127"/>
+              </a:rPr>
+              <a:t> 1. </a:t>
+            </a:r>
+            <a:r>
+              <a:rPr lang="ko-KR" altLang="en-US" sz="1200" dirty="0">
+                <a:solidFill>
+                  <a:prstClr val="black"/>
+                </a:solidFill>
+                <a:latin typeface="맑은 고딕" panose="020B0503020000020004" pitchFamily="50" charset="-127"/>
+              </a:rPr>
+              <a:t>적극적인 리뷰활동으로 동료들의 피드백을 받을 수 있었습니다</a:t>
+            </a:r>
+            <a:r>
+              <a:rPr lang="en-US" altLang="ko-KR" sz="1200" dirty="0">
+                <a:solidFill>
+                  <a:prstClr val="black"/>
+                </a:solidFill>
+                <a:latin typeface="맑은 고딕" panose="020B0503020000020004" pitchFamily="50" charset="-127"/>
+              </a:rPr>
+              <a:t>.</a:t>
+            </a:r>
+          </a:p>
+          <a:p>
+            <a:pPr defTabSz="779233">
               <a:lnSpc>
                 <a:spcPct val="150000"/>
               </a:lnSpc>
-              <a:spcBef>
-                <a:spcPts val="0"/>
-              </a:spcBef>
-              <a:spcAft>
-                <a:spcPts val="0"/>
-              </a:spcAft>
-              <a:buClrTx/>
-              <a:buSzTx/>
-              <a:buFontTx/>
-              <a:buNone/>
-              <a:tabLst/>
-              <a:defRPr/>
             </a:pPr>
             <a:r>
-              <a:rPr kumimoji="0" lang="ko-KR" altLang="en-US" sz="1100" b="0" i="0" u="none" strike="noStrike" kern="1200" cap="none" spc="0" normalizeH="0" baseline="0" noProof="0" dirty="0">
-                <a:ln>
-                  <a:noFill/>
-                </a:ln>
-                <a:solidFill>
-                  <a:prstClr val="black"/>
-                </a:solidFill>
-                <a:effectLst/>
-                <a:uLnTx/>
-                <a:uFillTx/>
-                <a:latin typeface="HY견고딕" panose="02030600000101010101" pitchFamily="18" charset="-127"/>
-                <a:ea typeface="HY견고딕" panose="02030600000101010101" pitchFamily="18" charset="-127"/>
-              </a:rPr>
-              <a:t>■ </a:t>
-            </a:r>
-            <a:r>
-              <a:rPr kumimoji="0" lang="ko-KR" altLang="en-US" sz="1100" b="1" i="0" u="none" strike="noStrike" kern="1200" cap="none" spc="0" normalizeH="0" baseline="0" noProof="0" dirty="0">
-                <a:ln>
-                  <a:noFill/>
-                </a:ln>
-                <a:solidFill>
-                  <a:prstClr val="black"/>
-                </a:solidFill>
-                <a:effectLst/>
-                <a:uLnTx/>
-                <a:uFillTx/>
-                <a:latin typeface="맑은 고딕" panose="020B0503020000020004" pitchFamily="50" charset="-127"/>
-                <a:ea typeface="맑은 고딕" panose="020B0503020000020004" pitchFamily="50" charset="-127"/>
-              </a:rPr>
-              <a:t>주요 감점 요소</a:t>
-            </a:r>
-            <a:endParaRPr kumimoji="0" lang="en-US" altLang="ko-KR" sz="1100" b="1" i="0" u="none" strike="noStrike" kern="1200" cap="none" spc="0" normalizeH="0" baseline="0" noProof="0" dirty="0">
-              <a:ln>
-                <a:noFill/>
-              </a:ln>
-              <a:solidFill>
-                <a:prstClr val="black"/>
-              </a:solidFill>
-              <a:effectLst/>
-              <a:uLnTx/>
-              <a:uFillTx/>
-              <a:latin typeface="맑은 고딕" panose="020B0503020000020004" pitchFamily="50" charset="-127"/>
-              <a:ea typeface="맑은 고딕" panose="020B0503020000020004" pitchFamily="50" charset="-127"/>
-            </a:endParaRPr>
-          </a:p>
-          <a:p>
-            <a:pPr marL="0" marR="0" lvl="0" indent="0" algn="l" defTabSz="779252" rtl="0" eaLnBrk="1" fontAlgn="auto" latinLnBrk="1" hangingPunct="1">
+              <a:rPr lang="en-US" altLang="ko-KR" sz="1200" dirty="0">
+                <a:solidFill>
+                  <a:prstClr val="black"/>
+                </a:solidFill>
+                <a:latin typeface="맑은 고딕" panose="020B0503020000020004" pitchFamily="50" charset="-127"/>
+              </a:rPr>
+              <a:t> 2. TDD </a:t>
+            </a:r>
+            <a:r>
+              <a:rPr lang="ko-KR" altLang="en-US" sz="1200" dirty="0">
+                <a:solidFill>
+                  <a:prstClr val="black"/>
+                </a:solidFill>
+                <a:latin typeface="맑은 고딕" panose="020B0503020000020004" pitchFamily="50" charset="-127"/>
+              </a:rPr>
+              <a:t>활동으로 </a:t>
+            </a:r>
+            <a:r>
+              <a:rPr lang="en-US" altLang="ko-KR" sz="1200" dirty="0" err="1">
+                <a:solidFill>
+                  <a:prstClr val="black"/>
+                </a:solidFill>
+                <a:latin typeface="맑은 고딕" panose="020B0503020000020004" pitchFamily="50" charset="-127"/>
+              </a:rPr>
+              <a:t>Unittest</a:t>
+            </a:r>
+            <a:r>
+              <a:rPr lang="en-US" altLang="ko-KR" sz="1200" dirty="0">
+                <a:solidFill>
+                  <a:prstClr val="black"/>
+                </a:solidFill>
+                <a:latin typeface="맑은 고딕" panose="020B0503020000020004" pitchFamily="50" charset="-127"/>
+              </a:rPr>
+              <a:t> case</a:t>
+            </a:r>
+            <a:r>
+              <a:rPr lang="ko-KR" altLang="en-US" sz="1200" dirty="0">
+                <a:solidFill>
+                  <a:prstClr val="black"/>
+                </a:solidFill>
+                <a:latin typeface="맑은 고딕" panose="020B0503020000020004" pitchFamily="50" charset="-127"/>
+              </a:rPr>
+              <a:t>를 확보하여 타인의 </a:t>
+            </a:r>
+            <a:r>
+              <a:rPr lang="en-US" altLang="ko-KR" sz="1200" dirty="0">
+                <a:solidFill>
+                  <a:prstClr val="black"/>
+                </a:solidFill>
+                <a:latin typeface="맑은 고딕" panose="020B0503020000020004" pitchFamily="50" charset="-127"/>
+              </a:rPr>
+              <a:t>code </a:t>
+            </a:r>
+            <a:r>
+              <a:rPr lang="ko-KR" altLang="en-US" sz="1200" dirty="0">
+                <a:solidFill>
+                  <a:prstClr val="black"/>
+                </a:solidFill>
+                <a:latin typeface="맑은 고딕" panose="020B0503020000020004" pitchFamily="50" charset="-127"/>
+              </a:rPr>
+              <a:t>를</a:t>
+            </a:r>
+            <a:r>
+              <a:rPr lang="en-US" altLang="ko-KR" sz="1200" dirty="0">
+                <a:solidFill>
+                  <a:prstClr val="black"/>
+                </a:solidFill>
+                <a:latin typeface="맑은 고딕" panose="020B0503020000020004" pitchFamily="50" charset="-127"/>
+              </a:rPr>
+              <a:t> </a:t>
+            </a:r>
+            <a:r>
+              <a:rPr lang="ko-KR" altLang="en-US" sz="1200" dirty="0">
+                <a:solidFill>
+                  <a:prstClr val="black"/>
+                </a:solidFill>
+                <a:latin typeface="맑은 고딕" panose="020B0503020000020004" pitchFamily="50" charset="-127"/>
+              </a:rPr>
+              <a:t>수정해도 불안감이 없었습니다</a:t>
+            </a:r>
+            <a:r>
+              <a:rPr lang="en-US" altLang="ko-KR" sz="1200" dirty="0">
+                <a:solidFill>
+                  <a:prstClr val="black"/>
+                </a:solidFill>
+                <a:latin typeface="맑은 고딕" panose="020B0503020000020004" pitchFamily="50" charset="-127"/>
+              </a:rPr>
+              <a:t>.</a:t>
+            </a:r>
+          </a:p>
+          <a:p>
+            <a:pPr defTabSz="779233">
               <a:lnSpc>
                 <a:spcPct val="150000"/>
               </a:lnSpc>
-              <a:spcBef>
-                <a:spcPts val="0"/>
-              </a:spcBef>
-              <a:spcAft>
-                <a:spcPts val="0"/>
-              </a:spcAft>
-              <a:buClrTx/>
-              <a:buSzTx/>
-              <a:buFontTx/>
-              <a:buNone/>
-              <a:tabLst/>
-              <a:defRPr/>
             </a:pPr>
             <a:r>
-              <a:rPr kumimoji="0" lang="en-US" altLang="ko-KR" sz="1100" b="0" i="0" u="none" strike="noStrike" kern="1200" cap="none" spc="0" normalizeH="0" baseline="0" noProof="0" dirty="0">
-                <a:ln>
-                  <a:noFill/>
-                </a:ln>
-                <a:solidFill>
-                  <a:prstClr val="black"/>
-                </a:solidFill>
-                <a:effectLst/>
-                <a:uLnTx/>
-                <a:uFillTx/>
-                <a:latin typeface="맑은 고딕" panose="020B0503020000020004" pitchFamily="50" charset="-127"/>
-                <a:ea typeface="맑은 고딕" panose="020B0503020000020004" pitchFamily="50" charset="-127"/>
-              </a:rPr>
-              <a:t>    - comment</a:t>
-            </a:r>
-            <a:r>
-              <a:rPr kumimoji="0" lang="ko-KR" altLang="en-US" sz="1100" b="0" i="0" u="none" strike="noStrike" kern="1200" cap="none" spc="0" normalizeH="0" baseline="0" noProof="0" dirty="0">
-                <a:ln>
-                  <a:noFill/>
-                </a:ln>
-                <a:solidFill>
-                  <a:prstClr val="black"/>
-                </a:solidFill>
-                <a:effectLst/>
-                <a:uLnTx/>
-                <a:uFillTx/>
-                <a:latin typeface="맑은 고딕" panose="020B0503020000020004" pitchFamily="50" charset="-127"/>
-                <a:ea typeface="맑은 고딕" panose="020B0503020000020004" pitchFamily="50" charset="-127"/>
-              </a:rPr>
-              <a:t>나 </a:t>
-            </a:r>
-            <a:r>
-              <a:rPr kumimoji="0" lang="en-US" altLang="ko-KR" sz="1100" b="0" i="0" u="none" strike="noStrike" kern="1200" cap="none" spc="0" normalizeH="0" baseline="0" noProof="0" dirty="0">
-                <a:ln>
-                  <a:noFill/>
-                </a:ln>
-                <a:solidFill>
-                  <a:prstClr val="black"/>
-                </a:solidFill>
-                <a:effectLst/>
-                <a:uLnTx/>
-                <a:uFillTx/>
-                <a:latin typeface="맑은 고딕" panose="020B0503020000020004" pitchFamily="50" charset="-127"/>
-                <a:ea typeface="맑은 고딕" panose="020B0503020000020004" pitchFamily="50" charset="-127"/>
-              </a:rPr>
-              <a:t>approve</a:t>
-            </a:r>
-            <a:r>
-              <a:rPr kumimoji="0" lang="ko-KR" altLang="en-US" sz="1100" b="0" i="0" u="none" strike="noStrike" kern="1200" cap="none" spc="0" normalizeH="0" baseline="0" noProof="0" dirty="0">
-                <a:ln>
-                  <a:noFill/>
-                </a:ln>
-                <a:solidFill>
-                  <a:prstClr val="black"/>
-                </a:solidFill>
-                <a:effectLst/>
-                <a:uLnTx/>
-                <a:uFillTx/>
-                <a:latin typeface="맑은 고딕" panose="020B0503020000020004" pitchFamily="50" charset="-127"/>
-                <a:ea typeface="맑은 고딕" panose="020B0503020000020004" pitchFamily="50" charset="-127"/>
-              </a:rPr>
-              <a:t>가 없는 </a:t>
-            </a:r>
-            <a:r>
-              <a:rPr kumimoji="0" lang="en-US" altLang="ko-KR" sz="1100" b="0" i="0" u="none" strike="noStrike" kern="1200" cap="none" spc="0" normalizeH="0" baseline="0" noProof="0" dirty="0">
-                <a:ln>
-                  <a:noFill/>
-                </a:ln>
-                <a:solidFill>
-                  <a:prstClr val="black"/>
-                </a:solidFill>
-                <a:effectLst/>
-                <a:uLnTx/>
-                <a:uFillTx/>
-                <a:latin typeface="맑은 고딕" panose="020B0503020000020004" pitchFamily="50" charset="-127"/>
-                <a:ea typeface="맑은 고딕" panose="020B0503020000020004" pitchFamily="50" charset="-127"/>
-              </a:rPr>
-              <a:t>PR</a:t>
-            </a:r>
-          </a:p>
-          <a:p>
-            <a:pPr lvl="0">
+              <a:rPr lang="en-US" altLang="ko-KR" sz="1200" dirty="0">
+                <a:solidFill>
+                  <a:prstClr val="black"/>
+                </a:solidFill>
+                <a:latin typeface="맑은 고딕" panose="020B0503020000020004" pitchFamily="50" charset="-127"/>
+              </a:rPr>
+              <a:t> 3. </a:t>
+            </a:r>
+            <a:r>
+              <a:rPr lang="ko-KR" altLang="en-US" sz="1200" dirty="0">
+                <a:solidFill>
+                  <a:prstClr val="black"/>
+                </a:solidFill>
+                <a:latin typeface="맑은 고딕" panose="020B0503020000020004" pitchFamily="50" charset="-127"/>
+              </a:rPr>
+              <a:t>리뷰활동으로 다른 사람의 코드를 보고 코딩 스킬을 배울 수 있었습니다</a:t>
+            </a:r>
+            <a:r>
+              <a:rPr lang="en-US" altLang="ko-KR" sz="1200" dirty="0">
+                <a:solidFill>
+                  <a:prstClr val="black"/>
+                </a:solidFill>
+                <a:latin typeface="맑은 고딕" panose="020B0503020000020004" pitchFamily="50" charset="-127"/>
+              </a:rPr>
+              <a:t>.</a:t>
+            </a:r>
+          </a:p>
+          <a:p>
+            <a:pPr defTabSz="779233">
               <a:lnSpc>
                 <a:spcPct val="150000"/>
               </a:lnSpc>
-              <a:defRPr/>
             </a:pPr>
             <a:r>
-              <a:rPr kumimoji="0" lang="en-US" altLang="ko-KR" sz="1100" b="0" i="0" u="none" strike="noStrike" kern="1200" cap="none" spc="0" normalizeH="0" baseline="0" noProof="0" dirty="0">
-                <a:ln>
-                  <a:noFill/>
-                </a:ln>
-                <a:solidFill>
-                  <a:prstClr val="black"/>
-                </a:solidFill>
-                <a:effectLst/>
-                <a:uLnTx/>
-                <a:uFillTx/>
-                <a:latin typeface="맑은 고딕" panose="020B0503020000020004" pitchFamily="50" charset="-127"/>
-                <a:ea typeface="맑은 고딕" panose="020B0503020000020004" pitchFamily="50" charset="-127"/>
-              </a:rPr>
-              <a:t>    - </a:t>
-            </a:r>
-            <a:r>
-              <a:rPr kumimoji="0" lang="en-US" altLang="ko-KR" sz="1100" b="1" i="0" u="none" strike="noStrike" kern="1200" cap="none" spc="0" normalizeH="0" baseline="0" noProof="0" dirty="0">
-                <a:ln>
-                  <a:noFill/>
-                </a:ln>
-                <a:solidFill>
-                  <a:prstClr val="black"/>
-                </a:solidFill>
-                <a:effectLst/>
-                <a:uLnTx/>
-                <a:uFillTx/>
-                <a:latin typeface="맑은 고딕" panose="020B0503020000020004" pitchFamily="50" charset="-127"/>
-                <a:ea typeface="맑은 고딕" panose="020B0503020000020004" pitchFamily="50" charset="-127"/>
-              </a:rPr>
-              <a:t>TDD </a:t>
-            </a:r>
-            <a:r>
-              <a:rPr kumimoji="0" lang="ko-KR" altLang="en-US" sz="1100" b="1" i="0" u="none" strike="noStrike" kern="1200" cap="none" spc="0" normalizeH="0" baseline="0" noProof="0" dirty="0">
-                <a:ln>
-                  <a:noFill/>
-                </a:ln>
-                <a:solidFill>
-                  <a:prstClr val="black"/>
-                </a:solidFill>
-                <a:effectLst/>
-                <a:uLnTx/>
-                <a:uFillTx/>
-                <a:latin typeface="맑은 고딕" panose="020B0503020000020004" pitchFamily="50" charset="-127"/>
-                <a:ea typeface="맑은 고딕" panose="020B0503020000020004" pitchFamily="50" charset="-127"/>
-              </a:rPr>
-              <a:t>개발 순서가 </a:t>
-            </a:r>
-            <a:r>
-              <a:rPr kumimoji="0" lang="ko-KR" altLang="en-US" sz="1100" b="0" i="0" u="none" strike="noStrike" kern="1200" cap="none" spc="0" normalizeH="0" baseline="0" noProof="0" dirty="0">
-                <a:ln>
-                  <a:noFill/>
-                </a:ln>
-                <a:solidFill>
-                  <a:prstClr val="black"/>
-                </a:solidFill>
-                <a:effectLst/>
-                <a:uLnTx/>
-                <a:uFillTx/>
-                <a:latin typeface="맑은 고딕" panose="020B0503020000020004" pitchFamily="50" charset="-127"/>
-                <a:ea typeface="맑은 고딕" panose="020B0503020000020004" pitchFamily="50" charset="-127"/>
-              </a:rPr>
-              <a:t>지켜지지 않은 경우</a:t>
-            </a:r>
-            <a:endParaRPr kumimoji="0" lang="en-US" altLang="ko-KR" sz="1100" b="0" i="0" u="none" strike="noStrike" kern="1200" cap="none" spc="0" normalizeH="0" baseline="0" noProof="0" dirty="0">
-              <a:ln>
-                <a:noFill/>
-              </a:ln>
-              <a:solidFill>
-                <a:prstClr val="black"/>
-              </a:solidFill>
-              <a:effectLst/>
-              <a:uLnTx/>
-              <a:uFillTx/>
-              <a:latin typeface="맑은 고딕" panose="020B0503020000020004" pitchFamily="50" charset="-127"/>
-              <a:ea typeface="맑은 고딕" panose="020B0503020000020004" pitchFamily="50" charset="-127"/>
-            </a:endParaRPr>
-          </a:p>
-          <a:p>
-            <a:pPr lvl="0">
+              <a:rPr lang="en-US" altLang="ko-KR" sz="1200" dirty="0">
+                <a:solidFill>
+                  <a:prstClr val="black"/>
+                </a:solidFill>
+                <a:latin typeface="맑은 고딕" panose="020B0503020000020004" pitchFamily="50" charset="-127"/>
+              </a:rPr>
+              <a:t> 4. </a:t>
+            </a:r>
+            <a:r>
+              <a:rPr lang="ko-KR" altLang="en-US" sz="1200" dirty="0">
+                <a:solidFill>
+                  <a:prstClr val="black"/>
+                </a:solidFill>
+                <a:latin typeface="맑은 고딕" panose="020B0503020000020004" pitchFamily="50" charset="-127"/>
+              </a:rPr>
+              <a:t>버그가 발견되거나</a:t>
+            </a:r>
+            <a:r>
+              <a:rPr lang="en-US" altLang="ko-KR" sz="1200" dirty="0">
+                <a:solidFill>
+                  <a:prstClr val="black"/>
+                </a:solidFill>
+                <a:latin typeface="맑은 고딕" panose="020B0503020000020004" pitchFamily="50" charset="-127"/>
+              </a:rPr>
+              <a:t> </a:t>
+            </a:r>
+            <a:r>
+              <a:rPr lang="ko-KR" altLang="en-US" sz="1200" dirty="0">
+                <a:solidFill>
+                  <a:prstClr val="black"/>
+                </a:solidFill>
+                <a:latin typeface="맑은 고딕" panose="020B0503020000020004" pitchFamily="50" charset="-127"/>
+              </a:rPr>
+              <a:t>신규 구현이 있을 시 팀원들의 적극적인 자세에 배울 점이 많았습니다</a:t>
+            </a:r>
+            <a:r>
+              <a:rPr lang="en-US" altLang="ko-KR" sz="1200" dirty="0">
+                <a:solidFill>
+                  <a:prstClr val="black"/>
+                </a:solidFill>
+                <a:latin typeface="맑은 고딕" panose="020B0503020000020004" pitchFamily="50" charset="-127"/>
+              </a:rPr>
+              <a:t>.</a:t>
+            </a:r>
+          </a:p>
+          <a:p>
+            <a:pPr defTabSz="779233">
               <a:lnSpc>
                 <a:spcPct val="150000"/>
               </a:lnSpc>
-              <a:defRPr/>
             </a:pPr>
             <a:r>
-              <a:rPr lang="en-US" altLang="ko-KR" sz="1100" noProof="0" dirty="0">
-                <a:solidFill>
-                  <a:prstClr val="black"/>
-                </a:solidFill>
-                <a:latin typeface="맑은 고딕" panose="020B0503020000020004" pitchFamily="50" charset="-127"/>
-                <a:ea typeface="맑은 고딕" panose="020B0503020000020004" pitchFamily="50" charset="-127"/>
-              </a:rPr>
-              <a:t>      - </a:t>
-            </a:r>
-            <a:r>
-              <a:rPr kumimoji="0" lang="en-US" altLang="ko-KR" sz="1100" b="0" i="0" u="none" strike="noStrike" kern="1200" cap="none" spc="0" normalizeH="0" baseline="0" noProof="0" dirty="0">
-                <a:ln>
-                  <a:noFill/>
-                </a:ln>
-                <a:solidFill>
-                  <a:prstClr val="black"/>
-                </a:solidFill>
-                <a:effectLst/>
-                <a:uLnTx/>
-                <a:uFillTx/>
-                <a:latin typeface="맑은 고딕" panose="020B0503020000020004" pitchFamily="50" charset="-127"/>
-                <a:ea typeface="맑은 고딕" panose="020B0503020000020004" pitchFamily="50" charset="-127"/>
-              </a:rPr>
-              <a:t>Product code </a:t>
-            </a:r>
-            <a:r>
-              <a:rPr kumimoji="0" lang="ko-KR" altLang="en-US" sz="1100" b="0" i="0" u="none" strike="noStrike" kern="1200" cap="none" spc="0" normalizeH="0" baseline="0" noProof="0" dirty="0">
-                <a:ln>
-                  <a:noFill/>
-                </a:ln>
-                <a:solidFill>
-                  <a:prstClr val="black"/>
-                </a:solidFill>
-                <a:effectLst/>
-                <a:uLnTx/>
-                <a:uFillTx/>
-                <a:latin typeface="맑은 고딕" panose="020B0503020000020004" pitchFamily="50" charset="-127"/>
-                <a:ea typeface="맑은 고딕" panose="020B0503020000020004" pitchFamily="50" charset="-127"/>
-              </a:rPr>
-              <a:t>작성 후</a:t>
-            </a:r>
-            <a:r>
-              <a:rPr kumimoji="0" lang="en-US" altLang="ko-KR" sz="1100" b="0" i="0" u="none" strike="noStrike" kern="1200" cap="none" spc="0" normalizeH="0" baseline="0" noProof="0" dirty="0">
-                <a:ln>
-                  <a:noFill/>
-                </a:ln>
-                <a:solidFill>
-                  <a:prstClr val="black"/>
-                </a:solidFill>
-                <a:effectLst/>
-                <a:uLnTx/>
-                <a:uFillTx/>
-                <a:latin typeface="맑은 고딕" panose="020B0503020000020004" pitchFamily="50" charset="-127"/>
-                <a:ea typeface="맑은 고딕" panose="020B0503020000020004" pitchFamily="50" charset="-127"/>
-              </a:rPr>
-              <a:t>, Test code </a:t>
-            </a:r>
-            <a:r>
-              <a:rPr kumimoji="0" lang="ko-KR" altLang="en-US" sz="1100" b="0" i="0" u="none" strike="noStrike" kern="1200" cap="none" spc="0" normalizeH="0" baseline="0" noProof="0" dirty="0">
-                <a:ln>
-                  <a:noFill/>
-                </a:ln>
-                <a:solidFill>
-                  <a:prstClr val="black"/>
-                </a:solidFill>
-                <a:effectLst/>
-                <a:uLnTx/>
-                <a:uFillTx/>
-                <a:latin typeface="맑은 고딕" panose="020B0503020000020004" pitchFamily="50" charset="-127"/>
-                <a:ea typeface="맑은 고딕" panose="020B0503020000020004" pitchFamily="50" charset="-127"/>
-              </a:rPr>
-              <a:t>작성</a:t>
-            </a:r>
-            <a:r>
-              <a:rPr lang="en-US" altLang="ko-KR" sz="1100" noProof="0" dirty="0">
-                <a:solidFill>
-                  <a:prstClr val="black"/>
-                </a:solidFill>
-                <a:latin typeface="맑은 고딕" panose="020B0503020000020004" pitchFamily="50" charset="-127"/>
-              </a:rPr>
-              <a:t> / </a:t>
-            </a:r>
-            <a:r>
-              <a:rPr lang="en-US" altLang="ko-KR" sz="1100" noProof="0" dirty="0" err="1">
-                <a:solidFill>
-                  <a:prstClr val="black"/>
-                </a:solidFill>
-                <a:latin typeface="맑은 고딕" panose="020B0503020000020004" pitchFamily="50" charset="-127"/>
-              </a:rPr>
-              <a:t>Bugfix</a:t>
-            </a:r>
-            <a:r>
-              <a:rPr lang="ko-KR" altLang="en-US" sz="1100" noProof="0" dirty="0">
-                <a:solidFill>
-                  <a:prstClr val="black"/>
-                </a:solidFill>
-                <a:latin typeface="맑은 고딕" panose="020B0503020000020004" pitchFamily="50" charset="-127"/>
-              </a:rPr>
-              <a:t>만 있는 경우</a:t>
-            </a:r>
-            <a:endParaRPr lang="en-US" altLang="ko-KR" sz="1100" dirty="0">
-              <a:solidFill>
-                <a:prstClr val="black"/>
-              </a:solidFill>
-              <a:latin typeface="맑은 고딕" panose="020B0503020000020004" pitchFamily="50" charset="-127"/>
-            </a:endParaRPr>
-          </a:p>
-          <a:p>
-            <a:pPr lvl="0">
-              <a:lnSpc>
-                <a:spcPct val="150000"/>
-              </a:lnSpc>
-              <a:defRPr/>
-            </a:pPr>
-            <a:r>
-              <a:rPr lang="en-US" altLang="ko-KR" sz="1100" dirty="0">
-                <a:solidFill>
-                  <a:prstClr val="black"/>
-                </a:solidFill>
-                <a:latin typeface="맑은 고딕" panose="020B0503020000020004" pitchFamily="50" charset="-127"/>
-              </a:rPr>
-              <a:t>    - Reviewer</a:t>
-            </a:r>
-            <a:r>
-              <a:rPr lang="ko-KR" altLang="en-US" sz="1100" dirty="0">
-                <a:solidFill>
-                  <a:prstClr val="black"/>
-                </a:solidFill>
-                <a:latin typeface="맑은 고딕" panose="020B0503020000020004" pitchFamily="50" charset="-127"/>
-              </a:rPr>
-              <a:t>의 </a:t>
-            </a:r>
-            <a:r>
-              <a:rPr lang="en-US" altLang="ko-KR" sz="1100" dirty="0">
-                <a:solidFill>
-                  <a:prstClr val="black"/>
-                </a:solidFill>
-                <a:latin typeface="맑은 고딕" panose="020B0503020000020004" pitchFamily="50" charset="-127"/>
-              </a:rPr>
-              <a:t>Review</a:t>
-            </a:r>
-            <a:r>
-              <a:rPr lang="ko-KR" altLang="en-US" sz="1100" dirty="0">
-                <a:solidFill>
-                  <a:prstClr val="black"/>
-                </a:solidFill>
-                <a:latin typeface="맑은 고딕" panose="020B0503020000020004" pitchFamily="50" charset="-127"/>
-              </a:rPr>
-              <a:t>에 답변이 없는 경우</a:t>
-            </a:r>
-            <a:endParaRPr lang="en-US" altLang="ko-KR" sz="1100" dirty="0">
-              <a:solidFill>
-                <a:prstClr val="black"/>
-              </a:solidFill>
-              <a:latin typeface="맑은 고딕" panose="020B0503020000020004" pitchFamily="50" charset="-127"/>
-            </a:endParaRPr>
-          </a:p>
-          <a:p>
-            <a:pPr lvl="0">
-              <a:lnSpc>
-                <a:spcPct val="150000"/>
-              </a:lnSpc>
-              <a:defRPr/>
-            </a:pPr>
-            <a:r>
-              <a:rPr lang="en-US" altLang="ko-KR" sz="1100" dirty="0">
-                <a:solidFill>
-                  <a:prstClr val="black"/>
-                </a:solidFill>
-                <a:latin typeface="맑은 고딕" panose="020B0503020000020004" pitchFamily="50" charset="-127"/>
-              </a:rPr>
-              <a:t>    - </a:t>
-            </a:r>
-            <a:r>
-              <a:rPr lang="ko-KR" altLang="en-US" sz="1100" b="1" dirty="0">
-                <a:solidFill>
-                  <a:prstClr val="black"/>
-                </a:solidFill>
-                <a:latin typeface="맑은 고딕" panose="020B0503020000020004" pitchFamily="50" charset="-127"/>
-              </a:rPr>
-              <a:t>예외처리</a:t>
-            </a:r>
-            <a:r>
-              <a:rPr lang="ko-KR" altLang="en-US" sz="1100" dirty="0">
-                <a:solidFill>
-                  <a:prstClr val="black"/>
-                </a:solidFill>
-                <a:latin typeface="맑은 고딕" panose="020B0503020000020004" pitchFamily="50" charset="-127"/>
-              </a:rPr>
-              <a:t> 없는 코드</a:t>
-            </a:r>
-            <a:endParaRPr kumimoji="0" lang="en-US" altLang="ko-KR" sz="1100" b="0" i="0" u="none" strike="noStrike" kern="1200" cap="none" spc="0" normalizeH="0" baseline="0" noProof="0" dirty="0">
-              <a:ln>
-                <a:noFill/>
-              </a:ln>
-              <a:solidFill>
-                <a:prstClr val="black"/>
-              </a:solidFill>
-              <a:effectLst/>
-              <a:uLnTx/>
-              <a:uFillTx/>
-              <a:latin typeface="맑은 고딕" panose="020B0503020000020004" pitchFamily="50" charset="-127"/>
-              <a:ea typeface="맑은 고딕" panose="020B0503020000020004" pitchFamily="50" charset="-127"/>
-            </a:endParaRPr>
+              <a:rPr lang="en-US" altLang="ko-KR" sz="1200" dirty="0">
+                <a:solidFill>
+                  <a:prstClr val="black"/>
+                </a:solidFill>
+                <a:latin typeface="맑은 고딕" panose="020B0503020000020004" pitchFamily="50" charset="-127"/>
+              </a:rPr>
+              <a:t> 5. TDD </a:t>
+            </a:r>
+            <a:r>
+              <a:rPr lang="ko-KR" altLang="en-US" sz="1200" dirty="0">
+                <a:solidFill>
+                  <a:prstClr val="black"/>
+                </a:solidFill>
+                <a:latin typeface="맑은 고딕" panose="020B0503020000020004" pitchFamily="50" charset="-127"/>
+              </a:rPr>
+              <a:t>는 자기가 만든 코드를 테스트 할 수 있어 코드 완성도를 높일 수 있었습니다</a:t>
+            </a:r>
           </a:p>
         </p:txBody>
       </p:sp>
     </p:spTree>
     <p:extLst>
       <p:ext uri="{BB962C8B-B14F-4D97-AF65-F5344CB8AC3E}">
-        <p14:creationId xmlns:p14="http://schemas.microsoft.com/office/powerpoint/2010/main" val="1388754633"/>
+        <p14:creationId xmlns:p14="http://schemas.microsoft.com/office/powerpoint/2010/main" val="2395644788"/>
       </p:ext>
     </p:extLst>
   </p:cSld>
@@ -6542,6 +6461,738 @@
 </file>
 
 <file path=ppt/slides/slide14.xml><?xml version="1.0" encoding="utf-8"?>
+<p:sld xmlns:a="http://schemas.openxmlformats.org/drawingml/2006/main" xmlns:r="http://schemas.openxmlformats.org/officeDocument/2006/relationships" xmlns:p="http://schemas.openxmlformats.org/presentationml/2006/main">
+  <p:cSld>
+    <p:spTree>
+      <p:nvGrpSpPr>
+        <p:cNvPr id="1" name=""/>
+        <p:cNvGrpSpPr/>
+        <p:nvPr/>
+      </p:nvGrpSpPr>
+      <p:grpSpPr>
+        <a:xfrm>
+          <a:off x="0" y="0"/>
+          <a:ext cx="0" cy="0"/>
+          <a:chOff x="0" y="0"/>
+          <a:chExt cx="0" cy="0"/>
+        </a:xfrm>
+      </p:grpSpPr>
+      <p:cxnSp>
+        <p:nvCxnSpPr>
+          <p:cNvPr id="4" name="직선 연결선 3"/>
+          <p:cNvCxnSpPr/>
+          <p:nvPr/>
+        </p:nvCxnSpPr>
+        <p:spPr>
+          <a:xfrm>
+            <a:off x="0" y="735546"/>
+            <a:ext cx="9144000" cy="0"/>
+          </a:xfrm>
+          <a:prstGeom prst="line">
+            <a:avLst/>
+          </a:prstGeom>
+          <a:ln w="25400">
+            <a:solidFill>
+              <a:srgbClr val="5F5F5F"/>
+            </a:solidFill>
+          </a:ln>
+        </p:spPr>
+        <p:style>
+          <a:lnRef idx="1">
+            <a:schemeClr val="accent1"/>
+          </a:lnRef>
+          <a:fillRef idx="0">
+            <a:schemeClr val="accent1"/>
+          </a:fillRef>
+          <a:effectRef idx="0">
+            <a:schemeClr val="accent1"/>
+          </a:effectRef>
+          <a:fontRef idx="minor">
+            <a:schemeClr val="tx1"/>
+          </a:fontRef>
+        </p:style>
+      </p:cxnSp>
+      <p:sp>
+        <p:nvSpPr>
+          <p:cNvPr id="6" name="TextBox 5"/>
+          <p:cNvSpPr txBox="1"/>
+          <p:nvPr/>
+        </p:nvSpPr>
+        <p:spPr>
+          <a:xfrm>
+            <a:off x="179512" y="141480"/>
+            <a:ext cx="6408712" cy="448019"/>
+          </a:xfrm>
+          <a:prstGeom prst="rect">
+            <a:avLst/>
+          </a:prstGeom>
+          <a:noFill/>
+        </p:spPr>
+        <p:txBody>
+          <a:bodyPr wrap="square" lIns="77925" tIns="38963" rIns="77925" bIns="38963" rtlCol="0">
+            <a:spAutoFit/>
+          </a:bodyPr>
+          <a:lstStyle/>
+          <a:p>
+            <a:r>
+              <a:rPr lang="ko-KR" altLang="en-US" sz="2400" dirty="0">
+                <a:latin typeface="HY견고딕" panose="02030600000101010101" pitchFamily="18" charset="-127"/>
+                <a:ea typeface="HY견고딕" panose="02030600000101010101" pitchFamily="18" charset="-127"/>
+              </a:rPr>
+              <a:t>회 고</a:t>
+            </a:r>
+            <a:endParaRPr lang="ko-KR" altLang="en-US" sz="1800" dirty="0">
+              <a:latin typeface="HY견고딕" panose="02030600000101010101" pitchFamily="18" charset="-127"/>
+              <a:ea typeface="HY견고딕" panose="02030600000101010101" pitchFamily="18" charset="-127"/>
+            </a:endParaRPr>
+          </a:p>
+        </p:txBody>
+      </p:sp>
+      <p:sp>
+        <p:nvSpPr>
+          <p:cNvPr id="2" name="직사각형 1"/>
+          <p:cNvSpPr/>
+          <p:nvPr/>
+        </p:nvSpPr>
+        <p:spPr>
+          <a:xfrm>
+            <a:off x="174579" y="3579862"/>
+            <a:ext cx="6246440" cy="333617"/>
+          </a:xfrm>
+          <a:prstGeom prst="rect">
+            <a:avLst/>
+          </a:prstGeom>
+        </p:spPr>
+        <p:txBody>
+          <a:bodyPr wrap="square">
+            <a:spAutoFit/>
+          </a:bodyPr>
+          <a:lstStyle/>
+          <a:p>
+            <a:pPr defTabSz="1038977">
+              <a:lnSpc>
+                <a:spcPct val="150000"/>
+              </a:lnSpc>
+            </a:pPr>
+            <a:r>
+              <a:rPr lang="en-US" altLang="ko-KR" sz="1200" dirty="0">
+                <a:solidFill>
+                  <a:prstClr val="black"/>
+                </a:solidFill>
+                <a:latin typeface="맑은 고딕" panose="020B0503020000020004" pitchFamily="50" charset="-127"/>
+              </a:rPr>
+              <a:t> </a:t>
+            </a:r>
+            <a:endParaRPr lang="ko-KR" altLang="en-US" sz="1200" dirty="0"/>
+          </a:p>
+        </p:txBody>
+      </p:sp>
+      <p:sp>
+        <p:nvSpPr>
+          <p:cNvPr id="7" name="직사각형 6"/>
+          <p:cNvSpPr/>
+          <p:nvPr/>
+        </p:nvSpPr>
+        <p:spPr>
+          <a:xfrm>
+            <a:off x="179512" y="770992"/>
+            <a:ext cx="8208912" cy="4257769"/>
+          </a:xfrm>
+          <a:prstGeom prst="rect">
+            <a:avLst/>
+          </a:prstGeom>
+        </p:spPr>
+        <p:txBody>
+          <a:bodyPr wrap="square">
+            <a:spAutoFit/>
+          </a:bodyPr>
+          <a:lstStyle/>
+          <a:p>
+            <a:pPr defTabSz="779233">
+              <a:lnSpc>
+                <a:spcPct val="150000"/>
+              </a:lnSpc>
+            </a:pPr>
+            <a:r>
+              <a:rPr lang="en-US" altLang="ko-KR" sz="1300" dirty="0">
+                <a:solidFill>
+                  <a:prstClr val="black"/>
+                </a:solidFill>
+                <a:latin typeface="맑은 고딕" panose="020B0503020000020004" pitchFamily="50" charset="-127"/>
+              </a:rPr>
+              <a:t>- Problem</a:t>
+            </a:r>
+          </a:p>
+          <a:p>
+            <a:pPr defTabSz="779233">
+              <a:lnSpc>
+                <a:spcPct val="150000"/>
+              </a:lnSpc>
+            </a:pPr>
+            <a:r>
+              <a:rPr lang="en-US" altLang="ko-KR" sz="1200" dirty="0">
+                <a:solidFill>
+                  <a:prstClr val="black"/>
+                </a:solidFill>
+                <a:latin typeface="맑은 고딕" panose="020B0503020000020004" pitchFamily="50" charset="-127"/>
+              </a:rPr>
+              <a:t>1. </a:t>
+            </a:r>
+            <a:r>
+              <a:rPr lang="ko-KR" altLang="en-US" sz="1200" dirty="0">
+                <a:solidFill>
+                  <a:prstClr val="black"/>
+                </a:solidFill>
+                <a:latin typeface="맑은 고딕" panose="020B0503020000020004" pitchFamily="50" charset="-127"/>
+              </a:rPr>
+              <a:t>온라인을 통해서만 진행되어 서로의 진행과정 및 상황 파악이 어려웠습니다</a:t>
+            </a:r>
+            <a:r>
+              <a:rPr lang="en-US" altLang="ko-KR" sz="1200" dirty="0">
+                <a:solidFill>
+                  <a:prstClr val="black"/>
+                </a:solidFill>
+                <a:latin typeface="맑은 고딕" panose="020B0503020000020004" pitchFamily="50" charset="-127"/>
+              </a:rPr>
+              <a:t>.</a:t>
+            </a:r>
+          </a:p>
+          <a:p>
+            <a:pPr defTabSz="779233">
+              <a:lnSpc>
+                <a:spcPct val="150000"/>
+              </a:lnSpc>
+            </a:pPr>
+            <a:r>
+              <a:rPr lang="en-US" altLang="ko-KR" sz="1200" dirty="0">
+                <a:solidFill>
+                  <a:prstClr val="black"/>
+                </a:solidFill>
+                <a:latin typeface="맑은 고딕" panose="020B0503020000020004" pitchFamily="50" charset="-127"/>
+              </a:rPr>
+              <a:t>2. </a:t>
+            </a:r>
+            <a:r>
+              <a:rPr lang="ko-KR" altLang="en-US" sz="1200" dirty="0">
+                <a:solidFill>
+                  <a:prstClr val="black"/>
+                </a:solidFill>
+                <a:latin typeface="맑은 고딕" panose="020B0503020000020004" pitchFamily="50" charset="-127"/>
+              </a:rPr>
+              <a:t>초반에 요구 사항의 정확한 분석이 되지 않아 몇번의 중간 수정이 있어 디자인의 중요성을 다시 느꼈습니다</a:t>
+            </a:r>
+            <a:r>
+              <a:rPr lang="en-US" altLang="ko-KR" sz="1200" dirty="0">
+                <a:solidFill>
+                  <a:prstClr val="black"/>
+                </a:solidFill>
+                <a:latin typeface="맑은 고딕" panose="020B0503020000020004" pitchFamily="50" charset="-127"/>
+              </a:rPr>
+              <a:t>.</a:t>
+            </a:r>
+          </a:p>
+          <a:p>
+            <a:pPr defTabSz="779233">
+              <a:lnSpc>
+                <a:spcPct val="150000"/>
+              </a:lnSpc>
+            </a:pPr>
+            <a:r>
+              <a:rPr lang="en-US" altLang="ko-KR" sz="1200" dirty="0">
+                <a:solidFill>
+                  <a:prstClr val="black"/>
+                </a:solidFill>
+                <a:latin typeface="맑은 고딕" panose="020B0503020000020004" pitchFamily="50" charset="-127"/>
+              </a:rPr>
+              <a:t>3. </a:t>
+            </a:r>
+            <a:r>
+              <a:rPr lang="ko-KR" altLang="en-US" sz="1200" dirty="0">
+                <a:solidFill>
+                  <a:prstClr val="black"/>
+                </a:solidFill>
+                <a:latin typeface="맑은 고딕" panose="020B0503020000020004" pitchFamily="50" charset="-127"/>
+              </a:rPr>
+              <a:t>시간 제약 등의 문제로 기능들에 비해 </a:t>
+            </a:r>
+            <a:r>
+              <a:rPr lang="en-US" altLang="ko-KR" sz="1200" dirty="0">
+                <a:solidFill>
+                  <a:prstClr val="black"/>
+                </a:solidFill>
+                <a:latin typeface="맑은 고딕" panose="020B0503020000020004" pitchFamily="50" charset="-127"/>
+              </a:rPr>
+              <a:t>Unit Test</a:t>
+            </a:r>
+            <a:r>
+              <a:rPr lang="ko-KR" altLang="en-US" sz="1200" dirty="0">
+                <a:solidFill>
+                  <a:prstClr val="black"/>
+                </a:solidFill>
+                <a:latin typeface="맑은 고딕" panose="020B0503020000020004" pitchFamily="50" charset="-127"/>
+              </a:rPr>
+              <a:t>의 보강이 많이 되지 않은 점이 아쉬웠습니다</a:t>
+            </a:r>
+            <a:endParaRPr lang="en-US" altLang="ko-KR" sz="1200" dirty="0">
+              <a:solidFill>
+                <a:prstClr val="black"/>
+              </a:solidFill>
+              <a:latin typeface="맑은 고딕" panose="020B0503020000020004" pitchFamily="50" charset="-127"/>
+            </a:endParaRPr>
+          </a:p>
+          <a:p>
+            <a:pPr defTabSz="779233">
+              <a:lnSpc>
+                <a:spcPct val="150000"/>
+              </a:lnSpc>
+            </a:pPr>
+            <a:r>
+              <a:rPr lang="en-US" altLang="ko-KR" sz="1200" dirty="0">
+                <a:solidFill>
+                  <a:prstClr val="black"/>
+                </a:solidFill>
+                <a:latin typeface="맑은 고딕" panose="020B0503020000020004" pitchFamily="50" charset="-127"/>
+              </a:rPr>
+              <a:t>4. </a:t>
+            </a:r>
+            <a:r>
+              <a:rPr lang="ko-KR" altLang="en-US" sz="1200" dirty="0">
+                <a:solidFill>
+                  <a:prstClr val="black"/>
+                </a:solidFill>
+                <a:latin typeface="맑은 고딕" panose="020B0503020000020004" pitchFamily="50" charset="-127"/>
+              </a:rPr>
+              <a:t>코드 개발과정 중에 서로 겹치는 코드 들이 생기는 등 협업이 쉽지 않았다</a:t>
+            </a:r>
+            <a:r>
+              <a:rPr lang="en-US" altLang="ko-KR" sz="1200" dirty="0">
+                <a:solidFill>
+                  <a:prstClr val="black"/>
+                </a:solidFill>
+                <a:latin typeface="맑은 고딕" panose="020B0503020000020004" pitchFamily="50" charset="-127"/>
+              </a:rPr>
+              <a:t>. </a:t>
+            </a:r>
+          </a:p>
+          <a:p>
+            <a:pPr defTabSz="779233">
+              <a:lnSpc>
+                <a:spcPct val="150000"/>
+              </a:lnSpc>
+            </a:pPr>
+            <a:r>
+              <a:rPr lang="en-US" altLang="ko-KR" sz="1200" dirty="0">
+                <a:solidFill>
+                  <a:prstClr val="black"/>
+                </a:solidFill>
+                <a:latin typeface="맑은 고딕" panose="020B0503020000020004" pitchFamily="50" charset="-127"/>
+              </a:rPr>
+              <a:t>5. </a:t>
+            </a:r>
+            <a:r>
+              <a:rPr lang="ko-KR" altLang="en-US" sz="1200" dirty="0">
+                <a:solidFill>
+                  <a:prstClr val="black"/>
+                </a:solidFill>
+                <a:latin typeface="맑은 고딕" panose="020B0503020000020004" pitchFamily="50" charset="-127"/>
+              </a:rPr>
+              <a:t>리뷰 시간의 압박감을 느껴졌습니다</a:t>
+            </a:r>
+            <a:r>
+              <a:rPr lang="en-US" altLang="ko-KR" sz="1200" dirty="0">
+                <a:solidFill>
+                  <a:prstClr val="black"/>
+                </a:solidFill>
+                <a:latin typeface="맑은 고딕" panose="020B0503020000020004" pitchFamily="50" charset="-127"/>
+              </a:rPr>
+              <a:t>.</a:t>
+            </a:r>
+          </a:p>
+          <a:p>
+            <a:pPr defTabSz="779233">
+              <a:lnSpc>
+                <a:spcPct val="150000"/>
+              </a:lnSpc>
+            </a:pPr>
+            <a:r>
+              <a:rPr lang="en-US" altLang="ko-KR" sz="1200" dirty="0">
+                <a:solidFill>
+                  <a:prstClr val="black"/>
+                </a:solidFill>
+                <a:latin typeface="맑은 고딕" panose="020B0503020000020004" pitchFamily="50" charset="-127"/>
+              </a:rPr>
+              <a:t>6. TDD </a:t>
+            </a:r>
+            <a:r>
+              <a:rPr lang="ko-KR" altLang="en-US" sz="1200" dirty="0">
+                <a:solidFill>
+                  <a:prstClr val="black"/>
+                </a:solidFill>
+                <a:latin typeface="맑은 고딕" panose="020B0503020000020004" pitchFamily="50" charset="-127"/>
+              </a:rPr>
+              <a:t>도 자기가 만든 시나리오를 기반으로 하는 것이라 틀에 </a:t>
+            </a:r>
+            <a:r>
+              <a:rPr lang="ko-KR" altLang="en-US" sz="1200" dirty="0" err="1">
+                <a:solidFill>
+                  <a:prstClr val="black"/>
+                </a:solidFill>
+                <a:latin typeface="맑은 고딕" panose="020B0503020000020004" pitchFamily="50" charset="-127"/>
+              </a:rPr>
+              <a:t>갖혀서</a:t>
+            </a:r>
+            <a:r>
+              <a:rPr lang="ko-KR" altLang="en-US" sz="1200" dirty="0">
+                <a:solidFill>
+                  <a:prstClr val="black"/>
+                </a:solidFill>
+                <a:latin typeface="맑은 고딕" panose="020B0503020000020004" pitchFamily="50" charset="-127"/>
+              </a:rPr>
+              <a:t> </a:t>
+            </a:r>
+            <a:r>
+              <a:rPr lang="en-US" altLang="ko-KR" sz="1200" dirty="0">
+                <a:solidFill>
+                  <a:prstClr val="black"/>
+                </a:solidFill>
+                <a:latin typeface="맑은 고딕" panose="020B0503020000020004" pitchFamily="50" charset="-127"/>
+              </a:rPr>
+              <a:t>testing </a:t>
+            </a:r>
+            <a:r>
+              <a:rPr lang="ko-KR" altLang="en-US" sz="1200" dirty="0">
+                <a:solidFill>
+                  <a:prstClr val="black"/>
+                </a:solidFill>
+                <a:latin typeface="맑은 고딕" panose="020B0503020000020004" pitchFamily="50" charset="-127"/>
+              </a:rPr>
+              <a:t>이 이루어 지는 거 같아</a:t>
+            </a:r>
+            <a:r>
+              <a:rPr lang="en-US" altLang="ko-KR" sz="1200" dirty="0">
+                <a:solidFill>
+                  <a:prstClr val="black"/>
+                </a:solidFill>
+                <a:latin typeface="맑은 고딕" panose="020B0503020000020004" pitchFamily="50" charset="-127"/>
+              </a:rPr>
+              <a:t> TDD </a:t>
+            </a:r>
+            <a:r>
+              <a:rPr lang="ko-KR" altLang="en-US" sz="1200" dirty="0">
+                <a:solidFill>
+                  <a:prstClr val="black"/>
+                </a:solidFill>
+                <a:latin typeface="맑은 고딕" panose="020B0503020000020004" pitchFamily="50" charset="-127"/>
+              </a:rPr>
+              <a:t>코드에 대해서도 활발하게 리뷰할 필요성이 있어 보입니다</a:t>
+            </a:r>
+            <a:r>
+              <a:rPr lang="en-US" altLang="ko-KR" sz="1200" dirty="0">
+                <a:solidFill>
+                  <a:prstClr val="black"/>
+                </a:solidFill>
+                <a:latin typeface="맑은 고딕" panose="020B0503020000020004" pitchFamily="50" charset="-127"/>
+              </a:rPr>
+              <a:t>. </a:t>
+            </a:r>
+          </a:p>
+          <a:p>
+            <a:pPr defTabSz="779233">
+              <a:lnSpc>
+                <a:spcPct val="150000"/>
+              </a:lnSpc>
+            </a:pPr>
+            <a:endParaRPr lang="en-US" altLang="ko-KR" sz="1200" dirty="0">
+              <a:solidFill>
+                <a:prstClr val="black"/>
+              </a:solidFill>
+              <a:latin typeface="맑은 고딕" panose="020B0503020000020004" pitchFamily="50" charset="-127"/>
+            </a:endParaRPr>
+          </a:p>
+          <a:p>
+            <a:pPr indent="-171450" defTabSz="779233">
+              <a:lnSpc>
+                <a:spcPct val="150000"/>
+              </a:lnSpc>
+              <a:buFontTx/>
+              <a:buChar char="-"/>
+            </a:pPr>
+            <a:r>
+              <a:rPr lang="en-US" altLang="ko-KR" sz="1300" dirty="0">
+                <a:solidFill>
+                  <a:prstClr val="black"/>
+                </a:solidFill>
+                <a:latin typeface="맑은 고딕" panose="020B0503020000020004" pitchFamily="50" charset="-127"/>
+              </a:rPr>
+              <a:t>Try</a:t>
+            </a:r>
+          </a:p>
+          <a:p>
+            <a:pPr defTabSz="779233">
+              <a:lnSpc>
+                <a:spcPct val="150000"/>
+              </a:lnSpc>
+            </a:pPr>
+            <a:r>
+              <a:rPr lang="en-US" altLang="ko-KR" sz="1200" dirty="0">
+                <a:solidFill>
+                  <a:prstClr val="black"/>
+                </a:solidFill>
+                <a:latin typeface="맑은 고딕" panose="020B0503020000020004" pitchFamily="50" charset="-127"/>
+              </a:rPr>
+              <a:t>1. Zoom </a:t>
+            </a:r>
+            <a:r>
+              <a:rPr lang="ko-KR" altLang="en-US" sz="1200" dirty="0">
+                <a:solidFill>
+                  <a:prstClr val="black"/>
+                </a:solidFill>
+                <a:latin typeface="맑은 고딕" panose="020B0503020000020004" pitchFamily="50" charset="-127"/>
+              </a:rPr>
+              <a:t>같은 화상회의 시스템을 이용한 즉각적인 의사소통</a:t>
+            </a:r>
+          </a:p>
+          <a:p>
+            <a:pPr defTabSz="779233">
+              <a:lnSpc>
+                <a:spcPct val="150000"/>
+              </a:lnSpc>
+            </a:pPr>
+            <a:r>
+              <a:rPr lang="en-US" altLang="ko-KR" sz="1200" dirty="0">
+                <a:solidFill>
+                  <a:prstClr val="black"/>
+                </a:solidFill>
+                <a:latin typeface="맑은 고딕" panose="020B0503020000020004" pitchFamily="50" charset="-127"/>
+              </a:rPr>
+              <a:t>2. </a:t>
+            </a:r>
+            <a:r>
+              <a:rPr lang="ko-KR" altLang="en-US" sz="1200" dirty="0">
+                <a:solidFill>
+                  <a:prstClr val="black"/>
+                </a:solidFill>
+                <a:latin typeface="맑은 고딕" panose="020B0503020000020004" pitchFamily="50" charset="-127"/>
+              </a:rPr>
+              <a:t>팀 영상 회의방을 만들어 음성 </a:t>
+            </a:r>
+            <a:r>
+              <a:rPr lang="en-US" altLang="ko-KR" sz="1200" dirty="0">
+                <a:solidFill>
+                  <a:prstClr val="black"/>
+                </a:solidFill>
+                <a:latin typeface="맑은 고딕" panose="020B0503020000020004" pitchFamily="50" charset="-127"/>
+              </a:rPr>
+              <a:t>on </a:t>
+            </a:r>
+            <a:r>
+              <a:rPr lang="ko-KR" altLang="en-US" sz="1200" dirty="0">
+                <a:solidFill>
+                  <a:prstClr val="black"/>
+                </a:solidFill>
+                <a:latin typeface="맑은 고딕" panose="020B0503020000020004" pitchFamily="50" charset="-127"/>
+              </a:rPr>
+              <a:t>하고 화면 공유하면서 작업하는 </a:t>
+            </a:r>
+            <a:r>
+              <a:rPr lang="en-US" altLang="ko-KR" sz="1200" dirty="0">
+                <a:solidFill>
+                  <a:prstClr val="black"/>
+                </a:solidFill>
+                <a:latin typeface="맑은 고딕" panose="020B0503020000020004" pitchFamily="50" charset="-127"/>
+              </a:rPr>
+              <a:t>peer programming</a:t>
+            </a:r>
+          </a:p>
+          <a:p>
+            <a:pPr defTabSz="779233">
+              <a:lnSpc>
+                <a:spcPct val="150000"/>
+              </a:lnSpc>
+            </a:pPr>
+            <a:r>
+              <a:rPr lang="en-US" altLang="ko-KR" sz="1200" dirty="0">
+                <a:solidFill>
+                  <a:prstClr val="black"/>
+                </a:solidFill>
+                <a:latin typeface="맑은 고딕" panose="020B0503020000020004" pitchFamily="50" charset="-127"/>
+              </a:rPr>
+              <a:t>3.</a:t>
+            </a:r>
+            <a:r>
+              <a:rPr lang="ko-KR" altLang="en-US" sz="1200" dirty="0">
+                <a:solidFill>
+                  <a:prstClr val="black"/>
+                </a:solidFill>
+                <a:latin typeface="맑은 고딕" panose="020B0503020000020004" pitchFamily="50" charset="-127"/>
+              </a:rPr>
+              <a:t> </a:t>
+            </a:r>
+            <a:r>
+              <a:rPr lang="en-US" altLang="ko-KR" sz="1200" dirty="0">
+                <a:solidFill>
+                  <a:prstClr val="black"/>
+                </a:solidFill>
+                <a:latin typeface="맑은 고딕" panose="020B0503020000020004" pitchFamily="50" charset="-127"/>
+              </a:rPr>
+              <a:t>TDD </a:t>
+            </a:r>
+            <a:r>
+              <a:rPr lang="ko-KR" altLang="en-US" sz="1200" dirty="0">
+                <a:solidFill>
+                  <a:prstClr val="black"/>
+                </a:solidFill>
+                <a:latin typeface="맑은 고딕" panose="020B0503020000020004" pitchFamily="50" charset="-127"/>
+              </a:rPr>
+              <a:t>방식으로 코드를 개발하려고 시도하였으나</a:t>
+            </a:r>
+            <a:r>
+              <a:rPr lang="en-US" altLang="ko-KR" sz="1200" dirty="0">
+                <a:solidFill>
+                  <a:prstClr val="black"/>
+                </a:solidFill>
+                <a:latin typeface="맑은 고딕" panose="020B0503020000020004" pitchFamily="50" charset="-127"/>
+              </a:rPr>
+              <a:t>, Bug</a:t>
+            </a:r>
+            <a:r>
+              <a:rPr lang="ko-KR" altLang="en-US" sz="1200" dirty="0">
+                <a:solidFill>
+                  <a:prstClr val="black"/>
+                </a:solidFill>
+                <a:latin typeface="맑은 고딕" panose="020B0503020000020004" pitchFamily="50" charset="-127"/>
+              </a:rPr>
+              <a:t>들을 </a:t>
+            </a:r>
+            <a:r>
+              <a:rPr lang="en-US" altLang="ko-KR" sz="1200" dirty="0">
+                <a:solidFill>
+                  <a:prstClr val="black"/>
+                </a:solidFill>
+                <a:latin typeface="맑은 고딕" panose="020B0503020000020004" pitchFamily="50" charset="-127"/>
+              </a:rPr>
+              <a:t>UT</a:t>
+            </a:r>
+            <a:r>
+              <a:rPr lang="ko-KR" altLang="en-US" sz="1200" dirty="0">
+                <a:solidFill>
+                  <a:prstClr val="black"/>
+                </a:solidFill>
+                <a:latin typeface="맑은 고딕" panose="020B0503020000020004" pitchFamily="50" charset="-127"/>
+              </a:rPr>
+              <a:t>에서 걸러내는 것이 </a:t>
+            </a:r>
+            <a:r>
+              <a:rPr lang="ko-KR" altLang="en-US" sz="1200" dirty="0" err="1">
+                <a:solidFill>
+                  <a:prstClr val="black"/>
+                </a:solidFill>
+                <a:latin typeface="맑은 고딕" panose="020B0503020000020004" pitchFamily="50" charset="-127"/>
+              </a:rPr>
+              <a:t>익숙치</a:t>
+            </a:r>
+            <a:r>
+              <a:rPr lang="ko-KR" altLang="en-US" sz="1200" dirty="0">
+                <a:solidFill>
+                  <a:prstClr val="black"/>
+                </a:solidFill>
+                <a:latin typeface="맑은 고딕" panose="020B0503020000020004" pitchFamily="50" charset="-127"/>
+              </a:rPr>
+              <a:t> 않아 짧은 단위로 프로그램을 만들고 </a:t>
+            </a:r>
+            <a:r>
+              <a:rPr lang="en-US" altLang="ko-KR" sz="1200" dirty="0">
+                <a:solidFill>
+                  <a:prstClr val="black"/>
+                </a:solidFill>
+                <a:latin typeface="맑은 고딕" panose="020B0503020000020004" pitchFamily="50" charset="-127"/>
+              </a:rPr>
+              <a:t>TC </a:t>
+            </a:r>
+            <a:r>
+              <a:rPr lang="ko-KR" altLang="en-US" sz="1200" dirty="0">
+                <a:solidFill>
+                  <a:prstClr val="black"/>
+                </a:solidFill>
+                <a:latin typeface="맑은 고딕" panose="020B0503020000020004" pitchFamily="50" charset="-127"/>
+              </a:rPr>
+              <a:t>를 수행하여 </a:t>
+            </a:r>
+            <a:r>
+              <a:rPr lang="en-US" altLang="ko-KR" sz="1200" dirty="0">
+                <a:solidFill>
+                  <a:prstClr val="black"/>
+                </a:solidFill>
+                <a:latin typeface="맑은 고딕" panose="020B0503020000020004" pitchFamily="50" charset="-127"/>
+              </a:rPr>
+              <a:t>Bug</a:t>
+            </a:r>
+            <a:r>
+              <a:rPr lang="ko-KR" altLang="en-US" sz="1200" dirty="0">
+                <a:solidFill>
+                  <a:prstClr val="black"/>
+                </a:solidFill>
+                <a:latin typeface="맑은 고딕" panose="020B0503020000020004" pitchFamily="50" charset="-127"/>
+              </a:rPr>
+              <a:t>를 미리 찾을 수 있도록 시도</a:t>
+            </a:r>
+            <a:r>
+              <a:rPr lang="en-US" altLang="ko-KR" sz="1200" dirty="0">
+                <a:solidFill>
+                  <a:prstClr val="black"/>
+                </a:solidFill>
+                <a:latin typeface="맑은 고딕" panose="020B0503020000020004" pitchFamily="50" charset="-127"/>
+              </a:rPr>
+              <a:t> </a:t>
+            </a:r>
+          </a:p>
+          <a:p>
+            <a:pPr defTabSz="779233">
+              <a:lnSpc>
+                <a:spcPct val="150000"/>
+              </a:lnSpc>
+            </a:pPr>
+            <a:r>
+              <a:rPr lang="en-US" altLang="ko-KR" sz="1200" dirty="0">
+                <a:solidFill>
+                  <a:prstClr val="black"/>
+                </a:solidFill>
+                <a:latin typeface="맑은 고딕" panose="020B0503020000020004" pitchFamily="50" charset="-127"/>
+              </a:rPr>
+              <a:t>4. TDD </a:t>
+            </a:r>
+            <a:r>
+              <a:rPr lang="ko-KR" altLang="en-US" sz="1200" dirty="0">
+                <a:solidFill>
+                  <a:prstClr val="black"/>
+                </a:solidFill>
+                <a:latin typeface="맑은 고딕" panose="020B0503020000020004" pitchFamily="50" charset="-127"/>
+              </a:rPr>
+              <a:t>를 현업에 적용해서 테스트 해보기</a:t>
+            </a:r>
+            <a:endParaRPr lang="en-US" altLang="ko-KR" sz="1200" dirty="0">
+              <a:solidFill>
+                <a:prstClr val="black"/>
+              </a:solidFill>
+              <a:latin typeface="맑은 고딕" panose="020B0503020000020004" pitchFamily="50" charset="-127"/>
+            </a:endParaRPr>
+          </a:p>
+        </p:txBody>
+      </p:sp>
+    </p:spTree>
+    <p:extLst>
+      <p:ext uri="{BB962C8B-B14F-4D97-AF65-F5344CB8AC3E}">
+        <p14:creationId xmlns:p14="http://schemas.microsoft.com/office/powerpoint/2010/main" val="3305759378"/>
+      </p:ext>
+    </p:extLst>
+  </p:cSld>
+  <p:clrMapOvr>
+    <a:masterClrMapping/>
+  </p:clrMapOvr>
+</p:sld>
+</file>
+
+<file path=ppt/slides/slide15.xml><?xml version="1.0" encoding="utf-8"?>
 <p:sld xmlns:a="http://schemas.openxmlformats.org/drawingml/2006/main" xmlns:r="http://schemas.openxmlformats.org/officeDocument/2006/relationships" xmlns:p="http://schemas.openxmlformats.org/presentationml/2006/main">
   <p:cSld>
     <p:spTree>
@@ -8724,7 +9375,7 @@
 </p:sld>
 </file>
 
-<file path=ppt/slides/slide15.xml><?xml version="1.0" encoding="utf-8"?>
+<file path=ppt/slides/slide16.xml><?xml version="1.0" encoding="utf-8"?>
 <p:sld xmlns:a="http://schemas.openxmlformats.org/drawingml/2006/main" xmlns:r="http://schemas.openxmlformats.org/officeDocument/2006/relationships" xmlns:p="http://schemas.openxmlformats.org/presentationml/2006/main">
   <p:cSld>
     <p:spTree>
@@ -12465,7 +13116,7 @@
 </p:sld>
 </file>
 
-<file path=ppt/slides/slide16.xml><?xml version="1.0" encoding="utf-8"?>
+<file path=ppt/slides/slide17.xml><?xml version="1.0" encoding="utf-8"?>
 <p:sld xmlns:a="http://schemas.openxmlformats.org/drawingml/2006/main" xmlns:r="http://schemas.openxmlformats.org/officeDocument/2006/relationships" xmlns:p="http://schemas.openxmlformats.org/presentationml/2006/main">
   <p:cSld>
     <p:spTree>
@@ -15672,7 +16323,7 @@
                 </a:solidFill>
                 <a:latin typeface="맑은 고딕" panose="020B0503020000020004" pitchFamily="50" charset="-127"/>
               </a:rPr>
-              <a:t>] </a:t>
+              <a:t>] / [Design] </a:t>
             </a:r>
             <a:r>
               <a:rPr lang="ko-KR" altLang="en-US" sz="1400" dirty="0">
@@ -16349,7 +17000,7 @@
           <p:nvPr>
             <p:extLst>
               <p:ext uri="{D42A27DB-BD31-4B8C-83A1-F6EECF244321}">
-                <p14:modId xmlns:p14="http://schemas.microsoft.com/office/powerpoint/2010/main" val="2715925989"/>
+                <p14:modId xmlns:p14="http://schemas.microsoft.com/office/powerpoint/2010/main" val="1401836262"/>
               </p:ext>
             </p:extLst>
           </p:nvPr>
@@ -17274,15 +17925,7 @@
                       </a:r>
                       <a:r>
                         <a:rPr lang="en-US" altLang="ko-KR" sz="1200" dirty="0"/>
-                        <a:t>1, </a:t>
-                      </a:r>
-                      <a:r>
-                        <a:rPr lang="ko-KR" altLang="en-US" sz="1200" dirty="0"/>
-                        <a:t>옵션</a:t>
-                      </a:r>
-                      <a:r>
-                        <a:rPr lang="en-US" altLang="ko-KR" sz="1200" dirty="0"/>
-                        <a:t>2</a:t>
+                        <a:t>1,2</a:t>
                       </a:r>
                       <a:r>
                         <a:rPr lang="ko-KR" altLang="en-US" sz="1200" baseline="0" dirty="0"/>
@@ -17294,7 +17937,31 @@
                       </a:r>
                       <a:r>
                         <a:rPr lang="ko-KR" altLang="en-US" sz="1200" baseline="0" dirty="0"/>
-                        <a:t> 추가를 제외한 다른 기능의 동작을 달라진다</a:t>
+                        <a:t> 추가를 제외한 다른 기능의 동작을 달라지고</a:t>
+                      </a:r>
+                      <a:r>
+                        <a:rPr lang="en-US" altLang="ko-KR" sz="1200" baseline="0" dirty="0"/>
+                        <a:t> </a:t>
+                      </a:r>
+                      <a:r>
+                        <a:rPr lang="ko-KR" altLang="en-US" sz="1200" baseline="0" dirty="0"/>
+                        <a:t>옵션</a:t>
+                      </a:r>
+                      <a:r>
+                        <a:rPr lang="en-US" altLang="ko-KR" sz="1200" baseline="0" dirty="0"/>
+                        <a:t>3 </a:t>
+                      </a:r>
+                      <a:r>
+                        <a:rPr lang="ko-KR" altLang="en-US" sz="1200" baseline="0" dirty="0"/>
+                        <a:t>은</a:t>
+                      </a:r>
+                      <a:r>
+                        <a:rPr lang="en-US" altLang="ko-KR" sz="1200" baseline="0" dirty="0"/>
+                        <a:t> </a:t>
+                      </a:r>
+                      <a:r>
+                        <a:rPr lang="ko-KR" altLang="en-US" sz="1200" baseline="0" dirty="0"/>
+                        <a:t>생략한다</a:t>
                       </a:r>
                       <a:r>
                         <a:rPr lang="en-US" altLang="ko-KR" sz="1200" baseline="0" dirty="0"/>
@@ -19787,7 +20454,7 @@
         <p:spPr>
           <a:xfrm>
             <a:off x="179512" y="770992"/>
-            <a:ext cx="5544616" cy="1938992"/>
+            <a:ext cx="5544616" cy="2989536"/>
           </a:xfrm>
           <a:prstGeom prst="rect">
             <a:avLst/>
@@ -19849,14 +20516,29 @@
               </a:lnSpc>
             </a:pPr>
             <a:r>
-              <a:rPr lang="en-US" altLang="ko-KR" sz="1600" dirty="0">
-                <a:solidFill>
-                  <a:prstClr val="black"/>
-                </a:solidFill>
-                <a:latin typeface="맑은 고딕" panose="020B0503020000020004" pitchFamily="50" charset="-127"/>
-              </a:rPr>
-              <a:t>  -</a:t>
-            </a:r>
+              <a:rPr lang="en-US" altLang="ko-KR" dirty="0">
+                <a:solidFill>
+                  <a:prstClr val="black"/>
+                </a:solidFill>
+                <a:latin typeface="맑은 고딕" panose="020B0503020000020004" pitchFamily="50" charset="-127"/>
+              </a:rPr>
+              <a:t>  -Hit\Source\</a:t>
+            </a:r>
+            <a:r>
+              <a:rPr lang="en-US" altLang="ko-KR" dirty="0" err="1">
+                <a:solidFill>
+                  <a:prstClr val="black"/>
+                </a:solidFill>
+                <a:latin typeface="맑은 고딕" panose="020B0503020000020004" pitchFamily="50" charset="-127"/>
+              </a:rPr>
+              <a:t>EmployeeManagementTest</a:t>
+            </a:r>
+            <a:endParaRPr lang="en-US" altLang="ko-KR" dirty="0">
+              <a:solidFill>
+                <a:prstClr val="black"/>
+              </a:solidFill>
+              <a:latin typeface="맑은 고딕" panose="020B0503020000020004" pitchFamily="50" charset="-127"/>
+            </a:endParaRPr>
           </a:p>
           <a:p>
             <a:pPr defTabSz="779233">
@@ -19865,7 +20547,7 @@
               </a:lnSpc>
             </a:pPr>
             <a:r>
-              <a:rPr lang="ko-KR" altLang="en-US" sz="1600" dirty="0">
+              <a:rPr lang="ko-KR" altLang="en-US" dirty="0">
                 <a:solidFill>
                   <a:prstClr val="black"/>
                 </a:solidFill>
@@ -19874,14 +20556,60 @@
               <a:t>  </a:t>
             </a:r>
             <a:r>
-              <a:rPr lang="en-US" altLang="ko-KR" sz="1600" dirty="0">
-                <a:solidFill>
-                  <a:prstClr val="black"/>
-                </a:solidFill>
-                <a:latin typeface="맑은 고딕" panose="020B0503020000020004" pitchFamily="50" charset="-127"/>
-              </a:rPr>
-              <a:t>-</a:t>
-            </a:r>
+              <a:rPr lang="en-US" altLang="ko-KR" dirty="0">
+                <a:solidFill>
+                  <a:prstClr val="black"/>
+                </a:solidFill>
+                <a:latin typeface="맑은 고딕" panose="020B0503020000020004" pitchFamily="50" charset="-127"/>
+              </a:rPr>
+              <a:t>-Hit\Source\</a:t>
+            </a:r>
+            <a:r>
+              <a:rPr lang="en-US" altLang="ko-KR" dirty="0" err="1">
+                <a:solidFill>
+                  <a:prstClr val="black"/>
+                </a:solidFill>
+                <a:latin typeface="맑은 고딕" panose="020B0503020000020004" pitchFamily="50" charset="-127"/>
+              </a:rPr>
+              <a:t>CommandTest</a:t>
+            </a:r>
+            <a:endParaRPr lang="en-US" altLang="ko-KR" dirty="0">
+              <a:solidFill>
+                <a:prstClr val="black"/>
+              </a:solidFill>
+              <a:latin typeface="맑은 고딕" panose="020B0503020000020004" pitchFamily="50" charset="-127"/>
+            </a:endParaRPr>
+          </a:p>
+          <a:p>
+            <a:pPr defTabSz="779233">
+              <a:lnSpc>
+                <a:spcPct val="150000"/>
+              </a:lnSpc>
+            </a:pPr>
+            <a:r>
+              <a:rPr lang="en-US" altLang="ko-KR" dirty="0">
+                <a:solidFill>
+                  <a:prstClr val="black"/>
+                </a:solidFill>
+                <a:latin typeface="맑은 고딕" panose="020B0503020000020004" pitchFamily="50" charset="-127"/>
+              </a:rPr>
+              <a:t>  -Hit\Source\</a:t>
+            </a:r>
+            <a:r>
+              <a:rPr lang="en-US" altLang="ko-KR" dirty="0" err="1">
+                <a:solidFill>
+                  <a:prstClr val="black"/>
+                </a:solidFill>
+                <a:latin typeface="맑은 고딕" panose="020B0503020000020004" pitchFamily="50" charset="-127"/>
+              </a:rPr>
+              <a:t>UserInterfaceTest</a:t>
+            </a:r>
+            <a:endParaRPr lang="en-US" altLang="ko-KR" dirty="0">
+              <a:solidFill>
+                <a:prstClr val="black"/>
+              </a:solidFill>
+              <a:latin typeface="맑은 고딕" panose="020B0503020000020004" pitchFamily="50" charset="-127"/>
+            </a:endParaRPr>
           </a:p>
           <a:p>
             <a:pPr defTabSz="779233">
@@ -19913,24 +20641,14 @@
               <a:t>■ </a:t>
             </a:r>
             <a:r>
-              <a:rPr lang="en-US" altLang="ko-KR" sz="1600" b="1" dirty="0" err="1">
+              <a:rPr lang="en-US" altLang="ko-KR" sz="1600" b="1" dirty="0">
                 <a:solidFill>
                   <a:prstClr val="black"/>
                 </a:solidFill>
                 <a:latin typeface="HY견고딕" panose="02030600000101010101" pitchFamily="18" charset="-127"/>
                 <a:ea typeface="HY견고딕" panose="02030600000101010101" pitchFamily="18" charset="-127"/>
               </a:rPr>
-              <a:t>Fexture</a:t>
-            </a:r>
-            <a:r>
-              <a:rPr lang="en-US" altLang="ko-KR" sz="1600" b="1" dirty="0">
-                <a:solidFill>
-                  <a:prstClr val="black"/>
-                </a:solidFill>
-                <a:latin typeface="HY견고딕" panose="02030600000101010101" pitchFamily="18" charset="-127"/>
-                <a:ea typeface="HY견고딕" panose="02030600000101010101" pitchFamily="18" charset="-127"/>
-              </a:rPr>
-              <a:t> </a:t>
+              <a:t>Fixture </a:t>
             </a:r>
             <a:r>
               <a:rPr lang="ko-KR" altLang="en-US" sz="1600" b="1" dirty="0">
@@ -19950,8 +20668,187 @@
               <a:ea typeface="HY견고딕" panose="02030600000101010101" pitchFamily="18" charset="-127"/>
             </a:endParaRPr>
           </a:p>
+          <a:p>
+            <a:pPr defTabSz="779233">
+              <a:lnSpc>
+                <a:spcPct val="150000"/>
+              </a:lnSpc>
+            </a:pPr>
+            <a:r>
+              <a:rPr lang="en-US" altLang="ko-KR" sz="1600" dirty="0">
+                <a:solidFill>
+                  <a:prstClr val="black"/>
+                </a:solidFill>
+                <a:latin typeface="맑은 고딕" panose="020B0503020000020004" pitchFamily="50" charset="-127"/>
+              </a:rPr>
+              <a:t>  - </a:t>
+            </a:r>
+            <a:r>
+              <a:rPr lang="ko-KR" altLang="en-US" sz="1600" dirty="0">
+                <a:solidFill>
+                  <a:prstClr val="black"/>
+                </a:solidFill>
+                <a:latin typeface="맑은 고딕" panose="020B0503020000020004" pitchFamily="50" charset="-127"/>
+              </a:rPr>
+              <a:t>동일 </a:t>
+            </a:r>
+            <a:r>
+              <a:rPr lang="en-US" altLang="ko-KR" sz="1600" dirty="0">
+                <a:solidFill>
+                  <a:prstClr val="black"/>
+                </a:solidFill>
+                <a:latin typeface="맑은 고딕" panose="020B0503020000020004" pitchFamily="50" charset="-127"/>
+              </a:rPr>
+              <a:t>data</a:t>
+            </a:r>
+            <a:r>
+              <a:rPr lang="ko-KR" altLang="en-US" sz="1600" dirty="0">
+                <a:solidFill>
+                  <a:prstClr val="black"/>
+                </a:solidFill>
+                <a:latin typeface="맑은 고딕" panose="020B0503020000020004" pitchFamily="50" charset="-127"/>
+              </a:rPr>
+              <a:t>를 여러 시나리오에 </a:t>
+            </a:r>
+            <a:r>
+              <a:rPr lang="en-US" altLang="ko-KR" sz="1600" dirty="0">
+                <a:solidFill>
+                  <a:prstClr val="black"/>
+                </a:solidFill>
+                <a:latin typeface="맑은 고딕" panose="020B0503020000020004" pitchFamily="50" charset="-127"/>
+              </a:rPr>
+              <a:t>reuse </a:t>
+            </a:r>
+            <a:r>
+              <a:rPr lang="ko-KR" altLang="en-US" sz="1600" dirty="0">
+                <a:solidFill>
+                  <a:prstClr val="black"/>
+                </a:solidFill>
+                <a:latin typeface="맑은 고딕" panose="020B0503020000020004" pitchFamily="50" charset="-127"/>
+              </a:rPr>
+              <a:t>하기 위해 </a:t>
+            </a:r>
+            <a:endParaRPr lang="en-US" altLang="ko-KR" sz="1600" dirty="0">
+              <a:solidFill>
+                <a:prstClr val="black"/>
+              </a:solidFill>
+              <a:latin typeface="맑은 고딕" panose="020B0503020000020004" pitchFamily="50" charset="-127"/>
+            </a:endParaRPr>
+          </a:p>
+          <a:p>
+            <a:pPr defTabSz="779233">
+              <a:lnSpc>
+                <a:spcPct val="150000"/>
+              </a:lnSpc>
+            </a:pPr>
+            <a:r>
+              <a:rPr lang="en-US" altLang="ko-KR" sz="1600" dirty="0">
+                <a:solidFill>
+                  <a:prstClr val="black"/>
+                </a:solidFill>
+                <a:latin typeface="맑은 고딕" panose="020B0503020000020004" pitchFamily="50" charset="-127"/>
+              </a:rPr>
+              <a:t>    fixture </a:t>
+            </a:r>
+            <a:r>
+              <a:rPr lang="ko-KR" altLang="en-US" sz="1600" dirty="0">
+                <a:solidFill>
+                  <a:prstClr val="black"/>
+                </a:solidFill>
+                <a:latin typeface="맑은 고딕" panose="020B0503020000020004" pitchFamily="50" charset="-127"/>
+              </a:rPr>
+              <a:t>를 활용하여 </a:t>
+            </a:r>
+            <a:r>
+              <a:rPr lang="en-US" altLang="ko-KR" sz="1600" dirty="0">
+                <a:solidFill>
+                  <a:prstClr val="black"/>
+                </a:solidFill>
+                <a:latin typeface="맑은 고딕" panose="020B0503020000020004" pitchFamily="50" charset="-127"/>
+              </a:rPr>
+              <a:t>TDD</a:t>
+            </a:r>
+            <a:r>
+              <a:rPr lang="ko-KR" altLang="en-US" sz="1600" dirty="0">
+                <a:solidFill>
+                  <a:prstClr val="black"/>
+                </a:solidFill>
+                <a:latin typeface="맑은 고딕" panose="020B0503020000020004" pitchFamily="50" charset="-127"/>
+              </a:rPr>
+              <a:t>진행</a:t>
+            </a:r>
+            <a:r>
+              <a:rPr lang="en-US" altLang="ko-KR" sz="1600" dirty="0">
+                <a:solidFill>
+                  <a:prstClr val="black"/>
+                </a:solidFill>
+                <a:latin typeface="맑은 고딕" panose="020B0503020000020004" pitchFamily="50" charset="-127"/>
+              </a:rPr>
+              <a:t>.</a:t>
+            </a:r>
+          </a:p>
         </p:txBody>
       </p:sp>
+      <p:pic>
+        <p:nvPicPr>
+          <p:cNvPr id="9" name="그림 8">
+            <a:extLst>
+              <a:ext uri="{FF2B5EF4-FFF2-40B4-BE49-F238E27FC236}">
+                <a16:creationId xmlns:a16="http://schemas.microsoft.com/office/drawing/2014/main" id="{5965244B-F37A-439B-9A83-587A00D8D388}"/>
+              </a:ext>
+            </a:extLst>
+          </p:cNvPr>
+          <p:cNvPicPr>
+            <a:picLocks noChangeAspect="1"/>
+          </p:cNvPicPr>
+          <p:nvPr/>
+        </p:nvPicPr>
+        <p:blipFill>
+          <a:blip r:embed="rId2"/>
+          <a:stretch>
+            <a:fillRect/>
+          </a:stretch>
+        </p:blipFill>
+        <p:spPr>
+          <a:xfrm>
+            <a:off x="4932040" y="2469005"/>
+            <a:ext cx="3216743" cy="2570341"/>
+          </a:xfrm>
+          <a:prstGeom prst="rect">
+            <a:avLst/>
+          </a:prstGeom>
+        </p:spPr>
+      </p:pic>
+      <p:pic>
+        <p:nvPicPr>
+          <p:cNvPr id="11" name="그림 10">
+            <a:extLst>
+              <a:ext uri="{FF2B5EF4-FFF2-40B4-BE49-F238E27FC236}">
+                <a16:creationId xmlns:a16="http://schemas.microsoft.com/office/drawing/2014/main" id="{AB83FDD6-0745-429A-ACE9-F1378BD7109D}"/>
+              </a:ext>
+            </a:extLst>
+          </p:cNvPr>
+          <p:cNvPicPr>
+            <a:picLocks noChangeAspect="1"/>
+          </p:cNvPicPr>
+          <p:nvPr/>
+        </p:nvPicPr>
+        <p:blipFill>
+          <a:blip r:embed="rId3"/>
+          <a:stretch>
+            <a:fillRect/>
+          </a:stretch>
+        </p:blipFill>
+        <p:spPr>
+          <a:xfrm>
+            <a:off x="4932040" y="849138"/>
+            <a:ext cx="3547864" cy="1535133"/>
+          </a:xfrm>
+          <a:prstGeom prst="rect">
+            <a:avLst/>
+          </a:prstGeom>
+        </p:spPr>
+      </p:pic>
     </p:spTree>
     <p:extLst>
       <p:ext uri="{BB962C8B-B14F-4D97-AF65-F5344CB8AC3E}">

</xml_diff>